<commit_message>
Added program flow in the ppt file
</commit_message>
<xml_diff>
--- a/source/MySEProject/Documentation/ML2223_15 Approve Prediction of Multisequence Learning.pptx
+++ b/source/MySEProject/Documentation/ML2223_15 Approve Prediction of Multisequence Learning.pptx
@@ -13,8 +13,9 @@
     <p:sldId id="258" r:id="rId7"/>
     <p:sldId id="259" r:id="rId8"/>
     <p:sldId id="262" r:id="rId9"/>
-    <p:sldId id="260" r:id="rId10"/>
-    <p:sldId id="266" r:id="rId11"/>
+    <p:sldId id="267" r:id="rId10"/>
+    <p:sldId id="260" r:id="rId11"/>
+    <p:sldId id="266" r:id="rId12"/>
   </p:sldIdLst>
   <p:sldSz cx="12192000" cy="6858000"/>
   <p:notesSz cx="6858000" cy="9144000"/>
@@ -252,7 +253,7 @@
           <a:p>
             <a:fld id="{54BB0E1A-2A42-4456-B338-6C031B28DAA4}" type="datetimeFigureOut">
               <a:rPr lang="en-IN" smtClean="0"/>
-              <a:t>27-03-2023</a:t>
+              <a:t>28-03-2023</a:t>
             </a:fld>
             <a:endParaRPr lang="en-IN"/>
           </a:p>
@@ -422,7 +423,7 @@
           <a:p>
             <a:fld id="{54BB0E1A-2A42-4456-B338-6C031B28DAA4}" type="datetimeFigureOut">
               <a:rPr lang="en-IN" smtClean="0"/>
-              <a:t>27-03-2023</a:t>
+              <a:t>28-03-2023</a:t>
             </a:fld>
             <a:endParaRPr lang="en-IN"/>
           </a:p>
@@ -602,7 +603,7 @@
           <a:p>
             <a:fld id="{54BB0E1A-2A42-4456-B338-6C031B28DAA4}" type="datetimeFigureOut">
               <a:rPr lang="en-IN" smtClean="0"/>
-              <a:t>27-03-2023</a:t>
+              <a:t>28-03-2023</a:t>
             </a:fld>
             <a:endParaRPr lang="en-IN"/>
           </a:p>
@@ -772,7 +773,7 @@
           <a:p>
             <a:fld id="{54BB0E1A-2A42-4456-B338-6C031B28DAA4}" type="datetimeFigureOut">
               <a:rPr lang="en-IN" smtClean="0"/>
-              <a:t>27-03-2023</a:t>
+              <a:t>28-03-2023</a:t>
             </a:fld>
             <a:endParaRPr lang="en-IN"/>
           </a:p>
@@ -1018,7 +1019,7 @@
           <a:p>
             <a:fld id="{54BB0E1A-2A42-4456-B338-6C031B28DAA4}" type="datetimeFigureOut">
               <a:rPr lang="en-IN" smtClean="0"/>
-              <a:t>27-03-2023</a:t>
+              <a:t>28-03-2023</a:t>
             </a:fld>
             <a:endParaRPr lang="en-IN"/>
           </a:p>
@@ -1250,7 +1251,7 @@
           <a:p>
             <a:fld id="{54BB0E1A-2A42-4456-B338-6C031B28DAA4}" type="datetimeFigureOut">
               <a:rPr lang="en-IN" smtClean="0"/>
-              <a:t>27-03-2023</a:t>
+              <a:t>28-03-2023</a:t>
             </a:fld>
             <a:endParaRPr lang="en-IN"/>
           </a:p>
@@ -1617,7 +1618,7 @@
           <a:p>
             <a:fld id="{54BB0E1A-2A42-4456-B338-6C031B28DAA4}" type="datetimeFigureOut">
               <a:rPr lang="en-IN" smtClean="0"/>
-              <a:t>27-03-2023</a:t>
+              <a:t>28-03-2023</a:t>
             </a:fld>
             <a:endParaRPr lang="en-IN"/>
           </a:p>
@@ -1735,7 +1736,7 @@
           <a:p>
             <a:fld id="{54BB0E1A-2A42-4456-B338-6C031B28DAA4}" type="datetimeFigureOut">
               <a:rPr lang="en-IN" smtClean="0"/>
-              <a:t>27-03-2023</a:t>
+              <a:t>28-03-2023</a:t>
             </a:fld>
             <a:endParaRPr lang="en-IN"/>
           </a:p>
@@ -1830,7 +1831,7 @@
           <a:p>
             <a:fld id="{54BB0E1A-2A42-4456-B338-6C031B28DAA4}" type="datetimeFigureOut">
               <a:rPr lang="en-IN" smtClean="0"/>
-              <a:t>27-03-2023</a:t>
+              <a:t>28-03-2023</a:t>
             </a:fld>
             <a:endParaRPr lang="en-IN"/>
           </a:p>
@@ -2107,7 +2108,7 @@
           <a:p>
             <a:fld id="{54BB0E1A-2A42-4456-B338-6C031B28DAA4}" type="datetimeFigureOut">
               <a:rPr lang="en-IN" smtClean="0"/>
-              <a:t>27-03-2023</a:t>
+              <a:t>28-03-2023</a:t>
             </a:fld>
             <a:endParaRPr lang="en-IN"/>
           </a:p>
@@ -2364,7 +2365,7 @@
           <a:p>
             <a:fld id="{54BB0E1A-2A42-4456-B338-6C031B28DAA4}" type="datetimeFigureOut">
               <a:rPr lang="en-IN" smtClean="0"/>
-              <a:t>27-03-2023</a:t>
+              <a:t>28-03-2023</a:t>
             </a:fld>
             <a:endParaRPr lang="en-IN"/>
           </a:p>
@@ -2577,7 +2578,7 @@
           <a:p>
             <a:fld id="{54BB0E1A-2A42-4456-B338-6C031B28DAA4}" type="datetimeFigureOut">
               <a:rPr lang="en-IN" smtClean="0"/>
-              <a:t>27-03-2023</a:t>
+              <a:t>28-03-2023</a:t>
             </a:fld>
             <a:endParaRPr lang="en-IN"/>
           </a:p>
@@ -3366,6 +3367,71 @@
           <p:cNvPr id="2" name="Title 1">
             <a:extLst>
               <a:ext uri="{FF2B5EF4-FFF2-40B4-BE49-F238E27FC236}">
+                <a16:creationId xmlns:a16="http://schemas.microsoft.com/office/drawing/2014/main" id="{2EAB8300-8A6C-D1EE-D8C7-C1ACB6308305}"/>
+              </a:ext>
+            </a:extLst>
+          </p:cNvPr>
+          <p:cNvSpPr>
+            <a:spLocks noGrp="1"/>
+          </p:cNvSpPr>
+          <p:nvPr>
+            <p:ph type="ctrTitle"/>
+          </p:nvPr>
+        </p:nvSpPr>
+        <p:spPr>
+          <a:xfrm>
+            <a:off x="1524000" y="1122363"/>
+            <a:ext cx="9144000" cy="706437"/>
+          </a:xfrm>
+        </p:spPr>
+        <p:txBody>
+          <a:bodyPr>
+            <a:normAutofit fontScale="90000"/>
+          </a:bodyPr>
+          <a:lstStyle/>
+          <a:p>
+            <a:r>
+              <a:rPr lang="en-IN" dirty="0"/>
+              <a:t>Output Screenshot</a:t>
+            </a:r>
+          </a:p>
+        </p:txBody>
+      </p:sp>
+    </p:spTree>
+    <p:extLst>
+      <p:ext uri="{BB962C8B-B14F-4D97-AF65-F5344CB8AC3E}">
+        <p14:creationId xmlns:p14="http://schemas.microsoft.com/office/powerpoint/2010/main" val="3304583892"/>
+      </p:ext>
+    </p:extLst>
+  </p:cSld>
+  <p:clrMapOvr>
+    <a:masterClrMapping/>
+  </p:clrMapOvr>
+</p:sld>
+</file>
+
+<file path=ppt/slides/slide11.xml><?xml version="1.0" encoding="utf-8"?>
+<p:sld xmlns:a="http://schemas.openxmlformats.org/drawingml/2006/main" xmlns:r="http://schemas.openxmlformats.org/officeDocument/2006/relationships" xmlns:p="http://schemas.openxmlformats.org/presentationml/2006/main">
+  <p:cSld>
+    <p:spTree>
+      <p:nvGrpSpPr>
+        <p:cNvPr id="1" name=""/>
+        <p:cNvGrpSpPr/>
+        <p:nvPr/>
+      </p:nvGrpSpPr>
+      <p:grpSpPr>
+        <a:xfrm>
+          <a:off x="0" y="0"/>
+          <a:ext cx="0" cy="0"/>
+          <a:chOff x="0" y="0"/>
+          <a:chExt cx="0" cy="0"/>
+        </a:xfrm>
+      </p:grpSpPr>
+      <p:sp>
+        <p:nvSpPr>
+          <p:cNvPr id="2" name="Title 1">
+            <a:extLst>
+              <a:ext uri="{FF2B5EF4-FFF2-40B4-BE49-F238E27FC236}">
                 <a16:creationId xmlns:a16="http://schemas.microsoft.com/office/drawing/2014/main" id="{4AB60701-9E36-FC64-6A81-FE34471EF1EB}"/>
               </a:ext>
             </a:extLst>
@@ -3475,8 +3541,8 @@
         </p:nvSpPr>
         <p:spPr>
           <a:xfrm>
-            <a:off x="1524000" y="1122363"/>
-            <a:ext cx="9144000" cy="883719"/>
+            <a:off x="1617306" y="285005"/>
+            <a:ext cx="9144000" cy="818404"/>
           </a:xfrm>
         </p:spPr>
         <p:txBody>
@@ -3486,13 +3552,157 @@
           <a:lstStyle/>
           <a:p>
             <a:r>
-              <a:rPr lang="en-US" dirty="0"/>
-              <a:t>	</a:t>
-            </a:r>
-            <a:r>
               <a:rPr lang="en-IN" dirty="0"/>
               <a:t>Index</a:t>
             </a:r>
+          </a:p>
+        </p:txBody>
+      </p:sp>
+      <p:sp>
+        <p:nvSpPr>
+          <p:cNvPr id="4" name="Subtitle 3">
+            <a:extLst>
+              <a:ext uri="{FF2B5EF4-FFF2-40B4-BE49-F238E27FC236}">
+                <a16:creationId xmlns:a16="http://schemas.microsoft.com/office/drawing/2014/main" id="{10F56BD9-E9E4-01EE-6408-7DBF6540BE9D}"/>
+              </a:ext>
+            </a:extLst>
+          </p:cNvPr>
+          <p:cNvSpPr>
+            <a:spLocks noGrp="1"/>
+          </p:cNvSpPr>
+          <p:nvPr>
+            <p:ph type="subTitle" idx="1"/>
+          </p:nvPr>
+        </p:nvSpPr>
+        <p:spPr>
+          <a:xfrm>
+            <a:off x="1524000" y="1436914"/>
+            <a:ext cx="9144000" cy="3820886"/>
+          </a:xfrm>
+        </p:spPr>
+        <p:txBody>
+          <a:bodyPr/>
+          <a:lstStyle/>
+          <a:p>
+            <a:pPr marL="514350" indent="-514350" algn="l">
+              <a:buAutoNum type="romanLcPeriod"/>
+            </a:pPr>
+            <a:r>
+              <a:rPr lang="en-IN" dirty="0"/>
+              <a:t>Introduction</a:t>
+            </a:r>
+          </a:p>
+          <a:p>
+            <a:pPr marL="514350" indent="-514350" algn="l">
+              <a:buAutoNum type="romanLcPeriod"/>
+            </a:pPr>
+            <a:r>
+              <a:rPr lang="en-IN" dirty="0"/>
+              <a:t>Methodology</a:t>
+            </a:r>
+          </a:p>
+          <a:p>
+            <a:pPr marL="514350" indent="-514350" algn="l">
+              <a:buAutoNum type="romanLcPeriod"/>
+            </a:pPr>
+            <a:r>
+              <a:rPr lang="en-IN" sz="2400" dirty="0">
+                <a:effectLst/>
+                <a:latin typeface="Calibri" panose="020F0502020204030204" pitchFamily="34" charset="0"/>
+                <a:ea typeface="Calibri" panose="020F0502020204030204" pitchFamily="34" charset="0"/>
+                <a:cs typeface="Times New Roman" panose="02020603050405020304" pitchFamily="18" charset="0"/>
+              </a:rPr>
+              <a:t>Hierarchical Temporal Memory</a:t>
+            </a:r>
+          </a:p>
+          <a:p>
+            <a:pPr marL="514350" indent="-514350" algn="l">
+              <a:buAutoNum type="romanLcPeriod"/>
+            </a:pPr>
+            <a:r>
+              <a:rPr lang="en-IN" sz="2400" dirty="0">
+                <a:effectLst/>
+                <a:latin typeface="Calibri" panose="020F0502020204030204" pitchFamily="34" charset="0"/>
+                <a:ea typeface="Calibri" panose="020F0502020204030204" pitchFamily="34" charset="0"/>
+                <a:cs typeface="Times New Roman" panose="02020603050405020304" pitchFamily="18" charset="0"/>
+              </a:rPr>
+              <a:t>Spatial Pooler and Temporal Memory</a:t>
+            </a:r>
+          </a:p>
+          <a:p>
+            <a:pPr marL="514350" indent="-514350" algn="l">
+              <a:buAutoNum type="romanLcPeriod"/>
+            </a:pPr>
+            <a:r>
+              <a:rPr lang="en-IN" dirty="0"/>
+              <a:t>Program Flow – Training Phase</a:t>
+            </a:r>
+          </a:p>
+          <a:p>
+            <a:pPr marL="514350" indent="-514350" algn="l">
+              <a:buFont typeface="Arial" panose="020B0604020202020204" pitchFamily="34" charset="0"/>
+              <a:buAutoNum type="romanLcPeriod"/>
+            </a:pPr>
+            <a:r>
+              <a:rPr lang="en-IN" dirty="0"/>
+              <a:t>Program Flow – Prediction Phase</a:t>
+            </a:r>
+          </a:p>
+          <a:p>
+            <a:pPr marL="514350" indent="-514350" algn="l">
+              <a:buFont typeface="Arial" panose="020B0604020202020204" pitchFamily="34" charset="0"/>
+              <a:buAutoNum type="romanLcPeriod"/>
+            </a:pPr>
+            <a:r>
+              <a:rPr lang="en-IN" dirty="0"/>
+              <a:t>Output Screenshot</a:t>
+            </a:r>
+          </a:p>
+          <a:p>
+            <a:pPr marL="514350" indent="-514350" algn="l">
+              <a:buFont typeface="Arial" panose="020B0604020202020204" pitchFamily="34" charset="0"/>
+              <a:buAutoNum type="romanLcPeriod"/>
+            </a:pPr>
+            <a:r>
+              <a:rPr lang="en-IN" dirty="0"/>
+              <a:t>Conclusion</a:t>
+            </a:r>
+          </a:p>
+          <a:p>
+            <a:pPr marL="514350" indent="-514350" algn="l">
+              <a:buAutoNum type="romanLcPeriod"/>
+            </a:pPr>
+            <a:endParaRPr lang="en-IN" dirty="0">
+              <a:latin typeface="Calibri" panose="020F0502020204030204" pitchFamily="34" charset="0"/>
+              <a:cs typeface="Times New Roman" panose="02020603050405020304" pitchFamily="18" charset="0"/>
+            </a:endParaRPr>
+          </a:p>
+          <a:p>
+            <a:pPr marL="514350" indent="-514350" algn="l">
+              <a:buAutoNum type="romanLcPeriod"/>
+            </a:pPr>
+            <a:endParaRPr lang="en-IN" dirty="0">
+              <a:latin typeface="Calibri" panose="020F0502020204030204" pitchFamily="34" charset="0"/>
+              <a:ea typeface="Calibri" panose="020F0502020204030204" pitchFamily="34" charset="0"/>
+              <a:cs typeface="Times New Roman" panose="02020603050405020304" pitchFamily="18" charset="0"/>
+            </a:endParaRPr>
+          </a:p>
+          <a:p>
+            <a:pPr marL="514350" indent="-514350" algn="l">
+              <a:buAutoNum type="romanLcPeriod"/>
+            </a:pPr>
+            <a:endParaRPr lang="en-IN" sz="2400" dirty="0">
+              <a:effectLst/>
+              <a:latin typeface="Calibri" panose="020F0502020204030204" pitchFamily="34" charset="0"/>
+              <a:ea typeface="Calibri" panose="020F0502020204030204" pitchFamily="34" charset="0"/>
+              <a:cs typeface="Times New Roman" panose="02020603050405020304" pitchFamily="18" charset="0"/>
+            </a:endParaRPr>
+          </a:p>
+          <a:p>
+            <a:pPr marL="514350" indent="-514350" algn="l">
+              <a:buAutoNum type="romanLcPeriod"/>
+            </a:pPr>
+            <a:endParaRPr lang="en-IN" dirty="0"/>
           </a:p>
         </p:txBody>
       </p:sp>
@@ -4593,8 +4803,9 @@
           </a:bodyPr>
           <a:lstStyle/>
           <a:p>
-            <a:r>
-              <a:rPr lang="en-IN" sz="1800" b="1" u="sng" dirty="0">
+            <a:pPr algn="ctr"/>
+            <a:r>
+              <a:rPr lang="en-IN" sz="3600" b="1" u="sng" dirty="0">
                 <a:effectLst/>
                 <a:latin typeface="Calibri" panose="020F0502020204030204" pitchFamily="34" charset="0"/>
                 <a:ea typeface="Calibri" panose="020F0502020204030204" pitchFamily="34" charset="0"/>
@@ -4602,7 +4813,7 @@
               </a:rPr>
               <a:t>Hierarchical Temporal Memory</a:t>
             </a:r>
-            <a:endParaRPr lang="en-IN" u="sng" dirty="0"/>
+            <a:endParaRPr lang="en-IN" sz="3600" u="sng" dirty="0"/>
           </a:p>
         </p:txBody>
       </p:sp>
@@ -5169,7 +5380,7 @@
         </p:nvSpPr>
         <p:spPr>
           <a:xfrm>
-            <a:off x="1524000" y="1122363"/>
+            <a:off x="1309396" y="226624"/>
             <a:ext cx="9144000" cy="809074"/>
           </a:xfrm>
         </p:spPr>
@@ -5181,11 +5392,715 @@
           <a:p>
             <a:r>
               <a:rPr lang="en-IN" dirty="0"/>
-              <a:t>Program Flow</a:t>
-            </a:r>
-          </a:p>
-        </p:txBody>
-      </p:sp>
+              <a:t>Program Flow – Training Phase</a:t>
+            </a:r>
+          </a:p>
+        </p:txBody>
+      </p:sp>
+      <p:sp>
+        <p:nvSpPr>
+          <p:cNvPr id="3" name="Rectangle 2">
+            <a:extLst>
+              <a:ext uri="{FF2B5EF4-FFF2-40B4-BE49-F238E27FC236}">
+                <a16:creationId xmlns:a16="http://schemas.microsoft.com/office/drawing/2014/main" id="{81BF1C30-BB81-2960-A284-CD0D4813D2BF}"/>
+              </a:ext>
+            </a:extLst>
+          </p:cNvPr>
+          <p:cNvSpPr/>
+          <p:nvPr/>
+        </p:nvSpPr>
+        <p:spPr>
+          <a:xfrm>
+            <a:off x="3875311" y="1205743"/>
+            <a:ext cx="5156664" cy="447869"/>
+          </a:xfrm>
+          <a:prstGeom prst="rect">
+            <a:avLst/>
+          </a:prstGeom>
+        </p:spPr>
+        <p:style>
+          <a:lnRef idx="2">
+            <a:schemeClr val="accent1">
+              <a:shade val="50000"/>
+            </a:schemeClr>
+          </a:lnRef>
+          <a:fillRef idx="1">
+            <a:schemeClr val="accent1"/>
+          </a:fillRef>
+          <a:effectRef idx="0">
+            <a:schemeClr val="accent1"/>
+          </a:effectRef>
+          <a:fontRef idx="minor">
+            <a:schemeClr val="lt1"/>
+          </a:fontRef>
+        </p:style>
+        <p:txBody>
+          <a:bodyPr rtlCol="0" anchor="ctr"/>
+          <a:lstStyle/>
+          <a:p>
+            <a:pPr algn="ctr"/>
+            <a:endParaRPr lang="en-IN"/>
+          </a:p>
+        </p:txBody>
+      </p:sp>
+      <p:sp>
+        <p:nvSpPr>
+          <p:cNvPr id="4" name="TextBox 3">
+            <a:extLst>
+              <a:ext uri="{FF2B5EF4-FFF2-40B4-BE49-F238E27FC236}">
+                <a16:creationId xmlns:a16="http://schemas.microsoft.com/office/drawing/2014/main" id="{57E175C9-A3BC-346D-8C02-EB5C03236DC8}"/>
+              </a:ext>
+            </a:extLst>
+          </p:cNvPr>
+          <p:cNvSpPr txBox="1"/>
+          <p:nvPr/>
+        </p:nvSpPr>
+        <p:spPr>
+          <a:xfrm flipH="1">
+            <a:off x="3875308" y="1272443"/>
+            <a:ext cx="2599040" cy="369332"/>
+          </a:xfrm>
+          <a:prstGeom prst="rect">
+            <a:avLst/>
+          </a:prstGeom>
+          <a:noFill/>
+        </p:spPr>
+        <p:txBody>
+          <a:bodyPr wrap="square" rtlCol="0">
+            <a:spAutoFit/>
+          </a:bodyPr>
+          <a:lstStyle/>
+          <a:p>
+            <a:r>
+              <a:rPr lang="en-IN" dirty="0"/>
+              <a:t>File containing the inputs</a:t>
+            </a:r>
+          </a:p>
+        </p:txBody>
+      </p:sp>
+      <p:sp>
+        <p:nvSpPr>
+          <p:cNvPr id="5" name="Rectangle 4">
+            <a:extLst>
+              <a:ext uri="{FF2B5EF4-FFF2-40B4-BE49-F238E27FC236}">
+                <a16:creationId xmlns:a16="http://schemas.microsoft.com/office/drawing/2014/main" id="{03C0ACEC-416B-7D24-BFED-ACA22A48C2E8}"/>
+              </a:ext>
+            </a:extLst>
+          </p:cNvPr>
+          <p:cNvSpPr/>
+          <p:nvPr/>
+        </p:nvSpPr>
+        <p:spPr>
+          <a:xfrm>
+            <a:off x="3875311" y="2030606"/>
+            <a:ext cx="5156664" cy="447869"/>
+          </a:xfrm>
+          <a:prstGeom prst="rect">
+            <a:avLst/>
+          </a:prstGeom>
+        </p:spPr>
+        <p:style>
+          <a:lnRef idx="2">
+            <a:schemeClr val="accent1">
+              <a:shade val="50000"/>
+            </a:schemeClr>
+          </a:lnRef>
+          <a:fillRef idx="1">
+            <a:schemeClr val="accent1"/>
+          </a:fillRef>
+          <a:effectRef idx="0">
+            <a:schemeClr val="accent1"/>
+          </a:effectRef>
+          <a:fontRef idx="minor">
+            <a:schemeClr val="lt1"/>
+          </a:fontRef>
+        </p:style>
+        <p:txBody>
+          <a:bodyPr rtlCol="0" anchor="ctr"/>
+          <a:lstStyle/>
+          <a:p>
+            <a:pPr algn="ctr"/>
+            <a:endParaRPr lang="en-IN"/>
+          </a:p>
+        </p:txBody>
+      </p:sp>
+      <p:sp>
+        <p:nvSpPr>
+          <p:cNvPr id="6" name="Rectangle 5">
+            <a:extLst>
+              <a:ext uri="{FF2B5EF4-FFF2-40B4-BE49-F238E27FC236}">
+                <a16:creationId xmlns:a16="http://schemas.microsoft.com/office/drawing/2014/main" id="{B0127E96-AEF5-B184-A0C7-8BDBFC92740B}"/>
+              </a:ext>
+            </a:extLst>
+          </p:cNvPr>
+          <p:cNvSpPr/>
+          <p:nvPr/>
+        </p:nvSpPr>
+        <p:spPr>
+          <a:xfrm>
+            <a:off x="3875312" y="2882197"/>
+            <a:ext cx="5156688" cy="447869"/>
+          </a:xfrm>
+          <a:prstGeom prst="rect">
+            <a:avLst/>
+          </a:prstGeom>
+        </p:spPr>
+        <p:style>
+          <a:lnRef idx="2">
+            <a:schemeClr val="accent1">
+              <a:shade val="50000"/>
+            </a:schemeClr>
+          </a:lnRef>
+          <a:fillRef idx="1">
+            <a:schemeClr val="accent1"/>
+          </a:fillRef>
+          <a:effectRef idx="0">
+            <a:schemeClr val="accent1"/>
+          </a:effectRef>
+          <a:fontRef idx="minor">
+            <a:schemeClr val="lt1"/>
+          </a:fontRef>
+        </p:style>
+        <p:txBody>
+          <a:bodyPr rtlCol="0" anchor="ctr"/>
+          <a:lstStyle/>
+          <a:p>
+            <a:pPr algn="ctr"/>
+            <a:endParaRPr lang="en-IN"/>
+          </a:p>
+        </p:txBody>
+      </p:sp>
+      <p:sp>
+        <p:nvSpPr>
+          <p:cNvPr id="10" name="Rectangle 9">
+            <a:extLst>
+              <a:ext uri="{FF2B5EF4-FFF2-40B4-BE49-F238E27FC236}">
+                <a16:creationId xmlns:a16="http://schemas.microsoft.com/office/drawing/2014/main" id="{2922B7F5-8AF7-0A94-DF0C-998B7614DA91}"/>
+              </a:ext>
+            </a:extLst>
+          </p:cNvPr>
+          <p:cNvSpPr/>
+          <p:nvPr/>
+        </p:nvSpPr>
+        <p:spPr>
+          <a:xfrm>
+            <a:off x="3875312" y="3709912"/>
+            <a:ext cx="5156691" cy="447869"/>
+          </a:xfrm>
+          <a:prstGeom prst="rect">
+            <a:avLst/>
+          </a:prstGeom>
+        </p:spPr>
+        <p:style>
+          <a:lnRef idx="2">
+            <a:schemeClr val="accent1">
+              <a:shade val="50000"/>
+            </a:schemeClr>
+          </a:lnRef>
+          <a:fillRef idx="1">
+            <a:schemeClr val="accent1"/>
+          </a:fillRef>
+          <a:effectRef idx="0">
+            <a:schemeClr val="accent1"/>
+          </a:effectRef>
+          <a:fontRef idx="minor">
+            <a:schemeClr val="lt1"/>
+          </a:fontRef>
+        </p:style>
+        <p:txBody>
+          <a:bodyPr rtlCol="0" anchor="ctr"/>
+          <a:lstStyle/>
+          <a:p>
+            <a:pPr algn="ctr"/>
+            <a:endParaRPr lang="en-IN"/>
+          </a:p>
+        </p:txBody>
+      </p:sp>
+      <p:sp>
+        <p:nvSpPr>
+          <p:cNvPr id="11" name="Rectangle 10">
+            <a:extLst>
+              <a:ext uri="{FF2B5EF4-FFF2-40B4-BE49-F238E27FC236}">
+                <a16:creationId xmlns:a16="http://schemas.microsoft.com/office/drawing/2014/main" id="{E597307D-B459-94B7-E2A1-1AA98F7072D2}"/>
+              </a:ext>
+            </a:extLst>
+          </p:cNvPr>
+          <p:cNvSpPr/>
+          <p:nvPr/>
+        </p:nvSpPr>
+        <p:spPr>
+          <a:xfrm>
+            <a:off x="3875311" y="5365342"/>
+            <a:ext cx="5156719" cy="447869"/>
+          </a:xfrm>
+          <a:prstGeom prst="rect">
+            <a:avLst/>
+          </a:prstGeom>
+        </p:spPr>
+        <p:style>
+          <a:lnRef idx="2">
+            <a:schemeClr val="accent1">
+              <a:shade val="50000"/>
+            </a:schemeClr>
+          </a:lnRef>
+          <a:fillRef idx="1">
+            <a:schemeClr val="accent1"/>
+          </a:fillRef>
+          <a:effectRef idx="0">
+            <a:schemeClr val="accent1"/>
+          </a:effectRef>
+          <a:fontRef idx="minor">
+            <a:schemeClr val="lt1"/>
+          </a:fontRef>
+        </p:style>
+        <p:txBody>
+          <a:bodyPr rtlCol="0" anchor="ctr"/>
+          <a:lstStyle/>
+          <a:p>
+            <a:pPr algn="ctr"/>
+            <a:endParaRPr lang="en-IN"/>
+          </a:p>
+        </p:txBody>
+      </p:sp>
+      <p:sp>
+        <p:nvSpPr>
+          <p:cNvPr id="12" name="Rectangle 11">
+            <a:extLst>
+              <a:ext uri="{FF2B5EF4-FFF2-40B4-BE49-F238E27FC236}">
+                <a16:creationId xmlns:a16="http://schemas.microsoft.com/office/drawing/2014/main" id="{DAE31CA6-73EE-1077-BE7F-8F5AF5A1CD89}"/>
+              </a:ext>
+            </a:extLst>
+          </p:cNvPr>
+          <p:cNvSpPr/>
+          <p:nvPr/>
+        </p:nvSpPr>
+        <p:spPr>
+          <a:xfrm>
+            <a:off x="3875312" y="4537627"/>
+            <a:ext cx="5156706" cy="447869"/>
+          </a:xfrm>
+          <a:prstGeom prst="rect">
+            <a:avLst/>
+          </a:prstGeom>
+        </p:spPr>
+        <p:style>
+          <a:lnRef idx="2">
+            <a:schemeClr val="accent1">
+              <a:shade val="50000"/>
+            </a:schemeClr>
+          </a:lnRef>
+          <a:fillRef idx="1">
+            <a:schemeClr val="accent1"/>
+          </a:fillRef>
+          <a:effectRef idx="0">
+            <a:schemeClr val="accent1"/>
+          </a:effectRef>
+          <a:fontRef idx="minor">
+            <a:schemeClr val="lt1"/>
+          </a:fontRef>
+        </p:style>
+        <p:txBody>
+          <a:bodyPr rtlCol="0" anchor="ctr"/>
+          <a:lstStyle/>
+          <a:p>
+            <a:pPr algn="ctr"/>
+            <a:endParaRPr lang="en-IN"/>
+          </a:p>
+        </p:txBody>
+      </p:sp>
+      <p:cxnSp>
+        <p:nvCxnSpPr>
+          <p:cNvPr id="14" name="Straight Arrow Connector 13">
+            <a:extLst>
+              <a:ext uri="{FF2B5EF4-FFF2-40B4-BE49-F238E27FC236}">
+                <a16:creationId xmlns:a16="http://schemas.microsoft.com/office/drawing/2014/main" id="{A317850D-B40E-F86B-F2FE-D99B6FD4F303}"/>
+              </a:ext>
+            </a:extLst>
+          </p:cNvPr>
+          <p:cNvCxnSpPr>
+            <a:cxnSpLocks/>
+          </p:cNvCxnSpPr>
+          <p:nvPr/>
+        </p:nvCxnSpPr>
+        <p:spPr>
+          <a:xfrm>
+            <a:off x="5881392" y="2531832"/>
+            <a:ext cx="3" cy="369614"/>
+          </a:xfrm>
+          <a:prstGeom prst="straightConnector1">
+            <a:avLst/>
+          </a:prstGeom>
+          <a:ln>
+            <a:tailEnd type="triangle"/>
+          </a:ln>
+        </p:spPr>
+        <p:style>
+          <a:lnRef idx="3">
+            <a:schemeClr val="dk1"/>
+          </a:lnRef>
+          <a:fillRef idx="0">
+            <a:schemeClr val="dk1"/>
+          </a:fillRef>
+          <a:effectRef idx="2">
+            <a:schemeClr val="dk1"/>
+          </a:effectRef>
+          <a:fontRef idx="minor">
+            <a:schemeClr val="tx1"/>
+          </a:fontRef>
+        </p:style>
+      </p:cxnSp>
+      <p:cxnSp>
+        <p:nvCxnSpPr>
+          <p:cNvPr id="15" name="Straight Arrow Connector 14">
+            <a:extLst>
+              <a:ext uri="{FF2B5EF4-FFF2-40B4-BE49-F238E27FC236}">
+                <a16:creationId xmlns:a16="http://schemas.microsoft.com/office/drawing/2014/main" id="{28323110-002C-4CC2-7F05-F99D6D366000}"/>
+              </a:ext>
+            </a:extLst>
+          </p:cNvPr>
+          <p:cNvCxnSpPr>
+            <a:cxnSpLocks/>
+          </p:cNvCxnSpPr>
+          <p:nvPr/>
+        </p:nvCxnSpPr>
+        <p:spPr>
+          <a:xfrm>
+            <a:off x="5881389" y="3343128"/>
+            <a:ext cx="3" cy="369614"/>
+          </a:xfrm>
+          <a:prstGeom prst="straightConnector1">
+            <a:avLst/>
+          </a:prstGeom>
+          <a:ln>
+            <a:tailEnd type="triangle"/>
+          </a:ln>
+        </p:spPr>
+        <p:style>
+          <a:lnRef idx="3">
+            <a:schemeClr val="dk1"/>
+          </a:lnRef>
+          <a:fillRef idx="0">
+            <a:schemeClr val="dk1"/>
+          </a:fillRef>
+          <a:effectRef idx="2">
+            <a:schemeClr val="dk1"/>
+          </a:effectRef>
+          <a:fontRef idx="minor">
+            <a:schemeClr val="tx1"/>
+          </a:fontRef>
+        </p:style>
+      </p:cxnSp>
+      <p:cxnSp>
+        <p:nvCxnSpPr>
+          <p:cNvPr id="16" name="Straight Arrow Connector 15">
+            <a:extLst>
+              <a:ext uri="{FF2B5EF4-FFF2-40B4-BE49-F238E27FC236}">
+                <a16:creationId xmlns:a16="http://schemas.microsoft.com/office/drawing/2014/main" id="{8F4944D6-1366-8EE3-6B0D-D6EFF4B6E6D1}"/>
+              </a:ext>
+            </a:extLst>
+          </p:cNvPr>
+          <p:cNvCxnSpPr>
+            <a:cxnSpLocks/>
+          </p:cNvCxnSpPr>
+          <p:nvPr/>
+        </p:nvCxnSpPr>
+        <p:spPr>
+          <a:xfrm>
+            <a:off x="5881386" y="4195934"/>
+            <a:ext cx="3" cy="369614"/>
+          </a:xfrm>
+          <a:prstGeom prst="straightConnector1">
+            <a:avLst/>
+          </a:prstGeom>
+          <a:ln>
+            <a:tailEnd type="triangle"/>
+          </a:ln>
+        </p:spPr>
+        <p:style>
+          <a:lnRef idx="3">
+            <a:schemeClr val="dk1"/>
+          </a:lnRef>
+          <a:fillRef idx="0">
+            <a:schemeClr val="dk1"/>
+          </a:fillRef>
+          <a:effectRef idx="2">
+            <a:schemeClr val="dk1"/>
+          </a:effectRef>
+          <a:fontRef idx="minor">
+            <a:schemeClr val="tx1"/>
+          </a:fontRef>
+        </p:style>
+      </p:cxnSp>
+      <p:cxnSp>
+        <p:nvCxnSpPr>
+          <p:cNvPr id="17" name="Straight Arrow Connector 16">
+            <a:extLst>
+              <a:ext uri="{FF2B5EF4-FFF2-40B4-BE49-F238E27FC236}">
+                <a16:creationId xmlns:a16="http://schemas.microsoft.com/office/drawing/2014/main" id="{6A9C9A93-9F40-92B9-E42A-7B332C2DDCF8}"/>
+              </a:ext>
+            </a:extLst>
+          </p:cNvPr>
+          <p:cNvCxnSpPr>
+            <a:cxnSpLocks/>
+          </p:cNvCxnSpPr>
+          <p:nvPr/>
+        </p:nvCxnSpPr>
+        <p:spPr>
+          <a:xfrm>
+            <a:off x="5881386" y="4997656"/>
+            <a:ext cx="3" cy="369614"/>
+          </a:xfrm>
+          <a:prstGeom prst="straightConnector1">
+            <a:avLst/>
+          </a:prstGeom>
+          <a:ln>
+            <a:tailEnd type="triangle"/>
+          </a:ln>
+        </p:spPr>
+        <p:style>
+          <a:lnRef idx="3">
+            <a:schemeClr val="dk1"/>
+          </a:lnRef>
+          <a:fillRef idx="0">
+            <a:schemeClr val="dk1"/>
+          </a:fillRef>
+          <a:effectRef idx="2">
+            <a:schemeClr val="dk1"/>
+          </a:effectRef>
+          <a:fontRef idx="minor">
+            <a:schemeClr val="tx1"/>
+          </a:fontRef>
+        </p:style>
+      </p:cxnSp>
+      <p:sp>
+        <p:nvSpPr>
+          <p:cNvPr id="18" name="TextBox 17">
+            <a:extLst>
+              <a:ext uri="{FF2B5EF4-FFF2-40B4-BE49-F238E27FC236}">
+                <a16:creationId xmlns:a16="http://schemas.microsoft.com/office/drawing/2014/main" id="{3CAFD385-4B96-6E15-A8BC-B753B7322A8D}"/>
+              </a:ext>
+            </a:extLst>
+          </p:cNvPr>
+          <p:cNvSpPr txBox="1"/>
+          <p:nvPr/>
+        </p:nvSpPr>
+        <p:spPr>
+          <a:xfrm flipH="1">
+            <a:off x="3875308" y="2073435"/>
+            <a:ext cx="3732229" cy="369332"/>
+          </a:xfrm>
+          <a:prstGeom prst="rect">
+            <a:avLst/>
+          </a:prstGeom>
+          <a:noFill/>
+        </p:spPr>
+        <p:txBody>
+          <a:bodyPr wrap="square" rtlCol="0">
+            <a:spAutoFit/>
+          </a:bodyPr>
+          <a:lstStyle/>
+          <a:p>
+            <a:r>
+              <a:rPr lang="en-IN" dirty="0"/>
+              <a:t>Storing the elements in Dictionary</a:t>
+            </a:r>
+          </a:p>
+        </p:txBody>
+      </p:sp>
+      <p:sp>
+        <p:nvSpPr>
+          <p:cNvPr id="19" name="TextBox 18">
+            <a:extLst>
+              <a:ext uri="{FF2B5EF4-FFF2-40B4-BE49-F238E27FC236}">
+                <a16:creationId xmlns:a16="http://schemas.microsoft.com/office/drawing/2014/main" id="{39E6DFC2-F035-3BD9-394B-577E0BCAB00C}"/>
+              </a:ext>
+            </a:extLst>
+          </p:cNvPr>
+          <p:cNvSpPr txBox="1"/>
+          <p:nvPr/>
+        </p:nvSpPr>
+        <p:spPr>
+          <a:xfrm flipH="1">
+            <a:off x="3875308" y="2935643"/>
+            <a:ext cx="4354291" cy="369332"/>
+          </a:xfrm>
+          <a:prstGeom prst="rect">
+            <a:avLst/>
+          </a:prstGeom>
+          <a:noFill/>
+        </p:spPr>
+        <p:txBody>
+          <a:bodyPr wrap="square" rtlCol="0">
+            <a:spAutoFit/>
+          </a:bodyPr>
+          <a:lstStyle/>
+          <a:p>
+            <a:r>
+              <a:rPr lang="en-IN" dirty="0" err="1"/>
+              <a:t>RunPredictionMultiSequenceExperiment</a:t>
+            </a:r>
+            <a:endParaRPr lang="en-IN" dirty="0"/>
+          </a:p>
+        </p:txBody>
+      </p:sp>
+      <p:sp>
+        <p:nvSpPr>
+          <p:cNvPr id="20" name="TextBox 19">
+            <a:extLst>
+              <a:ext uri="{FF2B5EF4-FFF2-40B4-BE49-F238E27FC236}">
+                <a16:creationId xmlns:a16="http://schemas.microsoft.com/office/drawing/2014/main" id="{7F69F0E3-A20F-06B2-B077-3768D564F7F9}"/>
+              </a:ext>
+            </a:extLst>
+          </p:cNvPr>
+          <p:cNvSpPr txBox="1"/>
+          <p:nvPr/>
+        </p:nvSpPr>
+        <p:spPr>
+          <a:xfrm flipH="1">
+            <a:off x="3956179" y="3778090"/>
+            <a:ext cx="4926557" cy="369332"/>
+          </a:xfrm>
+          <a:prstGeom prst="rect">
+            <a:avLst/>
+          </a:prstGeom>
+          <a:noFill/>
+        </p:spPr>
+        <p:txBody>
+          <a:bodyPr wrap="square" rtlCol="0">
+            <a:spAutoFit/>
+          </a:bodyPr>
+          <a:lstStyle/>
+          <a:p>
+            <a:r>
+              <a:rPr lang="en-IN" dirty="0" err="1"/>
+              <a:t>Multisequencelearning.cs</a:t>
+            </a:r>
+            <a:r>
+              <a:rPr lang="en-IN" dirty="0"/>
+              <a:t> </a:t>
+            </a:r>
+            <a:r>
+              <a:rPr lang="en-IN" dirty="0" err="1"/>
+              <a:t>RunExperiment</a:t>
+            </a:r>
+            <a:r>
+              <a:rPr lang="en-IN" dirty="0"/>
+              <a:t> method</a:t>
+            </a:r>
+          </a:p>
+        </p:txBody>
+      </p:sp>
+      <p:sp>
+        <p:nvSpPr>
+          <p:cNvPr id="21" name="TextBox 20">
+            <a:extLst>
+              <a:ext uri="{FF2B5EF4-FFF2-40B4-BE49-F238E27FC236}">
+                <a16:creationId xmlns:a16="http://schemas.microsoft.com/office/drawing/2014/main" id="{C76ED853-A205-E3ED-F3F9-37A16E3401B1}"/>
+              </a:ext>
+            </a:extLst>
+          </p:cNvPr>
+          <p:cNvSpPr txBox="1"/>
+          <p:nvPr/>
+        </p:nvSpPr>
+        <p:spPr>
+          <a:xfrm flipH="1">
+            <a:off x="3956178" y="4576062"/>
+            <a:ext cx="4693295" cy="369332"/>
+          </a:xfrm>
+          <a:prstGeom prst="rect">
+            <a:avLst/>
+          </a:prstGeom>
+          <a:noFill/>
+        </p:spPr>
+        <p:txBody>
+          <a:bodyPr wrap="square" rtlCol="0">
+            <a:spAutoFit/>
+          </a:bodyPr>
+          <a:lstStyle/>
+          <a:p>
+            <a:r>
+              <a:rPr lang="en-IN" dirty="0"/>
+              <a:t>Training Spatial Pooler to reach at the stable</a:t>
+            </a:r>
+          </a:p>
+        </p:txBody>
+      </p:sp>
+      <p:sp>
+        <p:nvSpPr>
+          <p:cNvPr id="22" name="TextBox 21">
+            <a:extLst>
+              <a:ext uri="{FF2B5EF4-FFF2-40B4-BE49-F238E27FC236}">
+                <a16:creationId xmlns:a16="http://schemas.microsoft.com/office/drawing/2014/main" id="{1D1FDD33-F946-4069-C035-B1164467DED0}"/>
+              </a:ext>
+            </a:extLst>
+          </p:cNvPr>
+          <p:cNvSpPr txBox="1"/>
+          <p:nvPr/>
+        </p:nvSpPr>
+        <p:spPr>
+          <a:xfrm flipH="1">
+            <a:off x="3956178" y="5353182"/>
+            <a:ext cx="5075852" cy="369332"/>
+          </a:xfrm>
+          <a:prstGeom prst="rect">
+            <a:avLst/>
+          </a:prstGeom>
+          <a:noFill/>
+        </p:spPr>
+        <p:txBody>
+          <a:bodyPr wrap="square" rtlCol="0">
+            <a:spAutoFit/>
+          </a:bodyPr>
+          <a:lstStyle/>
+          <a:p>
+            <a:r>
+              <a:rPr lang="en-IN" dirty="0"/>
+              <a:t>Training temporal memory with pre trained spat</a:t>
+            </a:r>
+          </a:p>
+        </p:txBody>
+      </p:sp>
+      <p:cxnSp>
+        <p:nvCxnSpPr>
+          <p:cNvPr id="24" name="Straight Arrow Connector 23">
+            <a:extLst>
+              <a:ext uri="{FF2B5EF4-FFF2-40B4-BE49-F238E27FC236}">
+                <a16:creationId xmlns:a16="http://schemas.microsoft.com/office/drawing/2014/main" id="{31D8367A-FDE1-3B2C-6B16-D2AE0988FEBE}"/>
+              </a:ext>
+            </a:extLst>
+          </p:cNvPr>
+          <p:cNvCxnSpPr>
+            <a:cxnSpLocks/>
+          </p:cNvCxnSpPr>
+          <p:nvPr/>
+        </p:nvCxnSpPr>
+        <p:spPr>
+          <a:xfrm>
+            <a:off x="5881383" y="1667578"/>
+            <a:ext cx="3" cy="369614"/>
+          </a:xfrm>
+          <a:prstGeom prst="straightConnector1">
+            <a:avLst/>
+          </a:prstGeom>
+          <a:ln>
+            <a:tailEnd type="triangle"/>
+          </a:ln>
+        </p:spPr>
+        <p:style>
+          <a:lnRef idx="3">
+            <a:schemeClr val="dk1"/>
+          </a:lnRef>
+          <a:fillRef idx="0">
+            <a:schemeClr val="dk1"/>
+          </a:fillRef>
+          <a:effectRef idx="2">
+            <a:schemeClr val="dk1"/>
+          </a:effectRef>
+          <a:fontRef idx="minor">
+            <a:schemeClr val="tx1"/>
+          </a:fontRef>
+        </p:style>
+      </p:cxnSp>
     </p:spTree>
     <p:extLst>
       <p:ext uri="{BB962C8B-B14F-4D97-AF65-F5344CB8AC3E}">
@@ -5218,10 +6133,10 @@
       </p:grpSpPr>
       <p:sp>
         <p:nvSpPr>
-          <p:cNvPr id="2" name="Title 1">
+          <p:cNvPr id="3" name="Content Placeholder 2">
             <a:extLst>
               <a:ext uri="{FF2B5EF4-FFF2-40B4-BE49-F238E27FC236}">
-                <a16:creationId xmlns:a16="http://schemas.microsoft.com/office/drawing/2014/main" id="{2EAB8300-8A6C-D1EE-D8C7-C1ACB6308305}"/>
+                <a16:creationId xmlns:a16="http://schemas.microsoft.com/office/drawing/2014/main" id="{4CA0EC46-C32D-E884-E9B3-F68BAE705FEE}"/>
               </a:ext>
             </a:extLst>
           </p:cNvPr>
@@ -5229,24 +6144,68 @@
             <a:spLocks noGrp="1"/>
           </p:cNvSpPr>
           <p:nvPr>
-            <p:ph type="ctrTitle"/>
-          </p:nvPr>
+            <p:ph idx="1"/>
+          </p:nvPr>
+        </p:nvSpPr>
+        <p:spPr/>
+        <p:txBody>
+          <a:bodyPr/>
+          <a:lstStyle/>
+          <a:p>
+            <a:endParaRPr lang="en-IN"/>
+          </a:p>
+        </p:txBody>
+      </p:sp>
+      <p:sp>
+        <p:nvSpPr>
+          <p:cNvPr id="4" name="Title 1">
+            <a:extLst>
+              <a:ext uri="{FF2B5EF4-FFF2-40B4-BE49-F238E27FC236}">
+                <a16:creationId xmlns:a16="http://schemas.microsoft.com/office/drawing/2014/main" id="{D8E04A14-4850-858B-EBB9-E5F331EC04E7}"/>
+              </a:ext>
+            </a:extLst>
+          </p:cNvPr>
+          <p:cNvSpPr txBox="1">
+            <a:spLocks/>
+          </p:cNvSpPr>
+          <p:nvPr/>
         </p:nvSpPr>
         <p:spPr>
           <a:xfrm>
-            <a:off x="1524000" y="1122363"/>
-            <a:ext cx="9144000" cy="706437"/>
+            <a:off x="1309396" y="226624"/>
+            <a:ext cx="9144000" cy="809074"/>
           </a:xfrm>
+          <a:prstGeom prst="rect">
+            <a:avLst/>
+          </a:prstGeom>
         </p:spPr>
         <p:txBody>
-          <a:bodyPr>
-            <a:normAutofit fontScale="90000"/>
+          <a:bodyPr vert="horz" lIns="91440" tIns="45720" rIns="91440" bIns="45720" rtlCol="0" anchor="ctr">
+            <a:normAutofit fontScale="97500"/>
           </a:bodyPr>
-          <a:lstStyle/>
+          <a:lstStyle>
+            <a:lvl1pPr algn="l" defTabSz="914400" rtl="0" eaLnBrk="1" latinLnBrk="0" hangingPunct="1">
+              <a:lnSpc>
+                <a:spcPct val="90000"/>
+              </a:lnSpc>
+              <a:spcBef>
+                <a:spcPct val="0"/>
+              </a:spcBef>
+              <a:buNone/>
+              <a:defRPr sz="4400" kern="1200">
+                <a:solidFill>
+                  <a:schemeClr val="tx1"/>
+                </a:solidFill>
+                <a:latin typeface="+mj-lt"/>
+                <a:ea typeface="+mj-ea"/>
+                <a:cs typeface="+mj-cs"/>
+              </a:defRPr>
+            </a:lvl1pPr>
+          </a:lstStyle>
           <a:p>
             <a:r>
               <a:rPr lang="en-IN" dirty="0"/>
-              <a:t>Output Screenshot</a:t>
+              <a:t>Program Flow – Prediction Phase</a:t>
             </a:r>
           </a:p>
         </p:txBody>
@@ -5254,7 +6213,7 @@
     </p:spTree>
     <p:extLst>
       <p:ext uri="{BB962C8B-B14F-4D97-AF65-F5344CB8AC3E}">
-        <p14:creationId xmlns:p14="http://schemas.microsoft.com/office/powerpoint/2010/main" val="3304583892"/>
+        <p14:creationId xmlns:p14="http://schemas.microsoft.com/office/powerpoint/2010/main" val="2903721002"/>
       </p:ext>
     </p:extLst>
   </p:cSld>

</xml_diff>

<commit_message>
Modified presentation and added Introduction, methodology, result and conclusion
</commit_message>
<xml_diff>
--- a/source/MySEProject/Documentation/ML2223_15 Approve Prediction of Multisequence Learning.pptx
+++ b/source/MySEProject/Documentation/ML2223_15 Approve Prediction of Multisequence Learning.pptx
@@ -9,12 +9,14 @@
     <p:sldId id="261" r:id="rId3"/>
     <p:sldId id="263" r:id="rId4"/>
     <p:sldId id="264" r:id="rId5"/>
-    <p:sldId id="265" r:id="rId6"/>
-    <p:sldId id="258" r:id="rId7"/>
-    <p:sldId id="259" r:id="rId8"/>
-    <p:sldId id="262" r:id="rId9"/>
-    <p:sldId id="260" r:id="rId10"/>
-    <p:sldId id="266" r:id="rId11"/>
+    <p:sldId id="268" r:id="rId6"/>
+    <p:sldId id="269" r:id="rId7"/>
+    <p:sldId id="270" r:id="rId8"/>
+    <p:sldId id="267" r:id="rId9"/>
+    <p:sldId id="271" r:id="rId10"/>
+    <p:sldId id="272" r:id="rId11"/>
+    <p:sldId id="273" r:id="rId12"/>
+    <p:sldId id="274" r:id="rId13"/>
   </p:sldIdLst>
   <p:sldSz cx="12192000" cy="6858000"/>
   <p:notesSz cx="6858000" cy="9144000"/>
@@ -252,7 +254,7 @@
           <a:p>
             <a:fld id="{54BB0E1A-2A42-4456-B338-6C031B28DAA4}" type="datetimeFigureOut">
               <a:rPr lang="en-IN" smtClean="0"/>
-              <a:t>27-03-2023</a:t>
+              <a:t>28-03-2023</a:t>
             </a:fld>
             <a:endParaRPr lang="en-IN"/>
           </a:p>
@@ -422,7 +424,7 @@
           <a:p>
             <a:fld id="{54BB0E1A-2A42-4456-B338-6C031B28DAA4}" type="datetimeFigureOut">
               <a:rPr lang="en-IN" smtClean="0"/>
-              <a:t>27-03-2023</a:t>
+              <a:t>28-03-2023</a:t>
             </a:fld>
             <a:endParaRPr lang="en-IN"/>
           </a:p>
@@ -602,7 +604,7 @@
           <a:p>
             <a:fld id="{54BB0E1A-2A42-4456-B338-6C031B28DAA4}" type="datetimeFigureOut">
               <a:rPr lang="en-IN" smtClean="0"/>
-              <a:t>27-03-2023</a:t>
+              <a:t>28-03-2023</a:t>
             </a:fld>
             <a:endParaRPr lang="en-IN"/>
           </a:p>
@@ -772,7 +774,7 @@
           <a:p>
             <a:fld id="{54BB0E1A-2A42-4456-B338-6C031B28DAA4}" type="datetimeFigureOut">
               <a:rPr lang="en-IN" smtClean="0"/>
-              <a:t>27-03-2023</a:t>
+              <a:t>28-03-2023</a:t>
             </a:fld>
             <a:endParaRPr lang="en-IN"/>
           </a:p>
@@ -1018,7 +1020,7 @@
           <a:p>
             <a:fld id="{54BB0E1A-2A42-4456-B338-6C031B28DAA4}" type="datetimeFigureOut">
               <a:rPr lang="en-IN" smtClean="0"/>
-              <a:t>27-03-2023</a:t>
+              <a:t>28-03-2023</a:t>
             </a:fld>
             <a:endParaRPr lang="en-IN"/>
           </a:p>
@@ -1250,7 +1252,7 @@
           <a:p>
             <a:fld id="{54BB0E1A-2A42-4456-B338-6C031B28DAA4}" type="datetimeFigureOut">
               <a:rPr lang="en-IN" smtClean="0"/>
-              <a:t>27-03-2023</a:t>
+              <a:t>28-03-2023</a:t>
             </a:fld>
             <a:endParaRPr lang="en-IN"/>
           </a:p>
@@ -1617,7 +1619,7 @@
           <a:p>
             <a:fld id="{54BB0E1A-2A42-4456-B338-6C031B28DAA4}" type="datetimeFigureOut">
               <a:rPr lang="en-IN" smtClean="0"/>
-              <a:t>27-03-2023</a:t>
+              <a:t>28-03-2023</a:t>
             </a:fld>
             <a:endParaRPr lang="en-IN"/>
           </a:p>
@@ -1735,7 +1737,7 @@
           <a:p>
             <a:fld id="{54BB0E1A-2A42-4456-B338-6C031B28DAA4}" type="datetimeFigureOut">
               <a:rPr lang="en-IN" smtClean="0"/>
-              <a:t>27-03-2023</a:t>
+              <a:t>28-03-2023</a:t>
             </a:fld>
             <a:endParaRPr lang="en-IN"/>
           </a:p>
@@ -1830,7 +1832,7 @@
           <a:p>
             <a:fld id="{54BB0E1A-2A42-4456-B338-6C031B28DAA4}" type="datetimeFigureOut">
               <a:rPr lang="en-IN" smtClean="0"/>
-              <a:t>27-03-2023</a:t>
+              <a:t>28-03-2023</a:t>
             </a:fld>
             <a:endParaRPr lang="en-IN"/>
           </a:p>
@@ -2107,7 +2109,7 @@
           <a:p>
             <a:fld id="{54BB0E1A-2A42-4456-B338-6C031B28DAA4}" type="datetimeFigureOut">
               <a:rPr lang="en-IN" smtClean="0"/>
-              <a:t>27-03-2023</a:t>
+              <a:t>28-03-2023</a:t>
             </a:fld>
             <a:endParaRPr lang="en-IN"/>
           </a:p>
@@ -2364,7 +2366,7 @@
           <a:p>
             <a:fld id="{54BB0E1A-2A42-4456-B338-6C031B28DAA4}" type="datetimeFigureOut">
               <a:rPr lang="en-IN" smtClean="0"/>
-              <a:t>27-03-2023</a:t>
+              <a:t>28-03-2023</a:t>
             </a:fld>
             <a:endParaRPr lang="en-IN"/>
           </a:p>
@@ -2577,7 +2579,7 @@
           <a:p>
             <a:fld id="{54BB0E1A-2A42-4456-B338-6C031B28DAA4}" type="datetimeFigureOut">
               <a:rPr lang="en-IN" smtClean="0"/>
-              <a:t>27-03-2023</a:t>
+              <a:t>28-03-2023</a:t>
             </a:fld>
             <a:endParaRPr lang="en-IN"/>
           </a:p>
@@ -3042,8 +3044,8 @@
         </p:nvSpPr>
         <p:spPr>
           <a:xfrm>
-            <a:off x="444761" y="3582759"/>
-            <a:ext cx="9144000" cy="3075215"/>
+            <a:off x="381001" y="3429000"/>
+            <a:ext cx="3747411" cy="3075215"/>
           </a:xfrm>
         </p:spPr>
         <p:txBody>
@@ -3059,55 +3061,55 @@
               </a:spcBef>
             </a:pPr>
             <a:r>
-              <a:rPr lang="en-US" sz="1400" u="sng" dirty="0">
+              <a:rPr lang="en-US" sz="1400" dirty="0">
                 <a:latin typeface="Arial" panose="020B0604020202020204" pitchFamily="34" charset="0"/>
                 <a:cs typeface="Arial" panose="020B0604020202020204" pitchFamily="34" charset="0"/>
               </a:rPr>
               <a:t>Prepared</a:t>
             </a:r>
             <a:r>
-              <a:rPr lang="en-US" sz="1400" u="sng" spc="-40" dirty="0">
+              <a:rPr lang="en-US" sz="1400" spc="-40" dirty="0">
                 <a:latin typeface="Arial" panose="020B0604020202020204" pitchFamily="34" charset="0"/>
                 <a:cs typeface="Arial" panose="020B0604020202020204" pitchFamily="34" charset="0"/>
               </a:rPr>
               <a:t> </a:t>
             </a:r>
             <a:r>
-              <a:rPr lang="en-US" sz="1400" u="sng" dirty="0">
+              <a:rPr lang="en-US" sz="1400" dirty="0">
                 <a:latin typeface="Arial" panose="020B0604020202020204" pitchFamily="34" charset="0"/>
                 <a:cs typeface="Arial" panose="020B0604020202020204" pitchFamily="34" charset="0"/>
               </a:rPr>
               <a:t>By</a:t>
             </a:r>
             <a:r>
-              <a:rPr lang="en-US" sz="1400" u="sng" spc="-40" dirty="0">
+              <a:rPr lang="en-US" sz="1400" spc="-40" dirty="0">
                 <a:latin typeface="Arial" panose="020B0604020202020204" pitchFamily="34" charset="0"/>
                 <a:cs typeface="Arial" panose="020B0604020202020204" pitchFamily="34" charset="0"/>
               </a:rPr>
               <a:t> </a:t>
             </a:r>
             <a:r>
-              <a:rPr lang="en-US" sz="1400" u="sng" dirty="0">
+              <a:rPr lang="en-US" sz="1400" dirty="0">
                 <a:latin typeface="Arial" panose="020B0604020202020204" pitchFamily="34" charset="0"/>
                 <a:cs typeface="Arial" panose="020B0604020202020204" pitchFamily="34" charset="0"/>
               </a:rPr>
               <a:t>Group</a:t>
             </a:r>
             <a:r>
-              <a:rPr lang="en-US" sz="1400" u="sng" spc="-40" dirty="0">
+              <a:rPr lang="en-US" sz="1400" spc="-40" dirty="0">
                 <a:latin typeface="Arial" panose="020B0604020202020204" pitchFamily="34" charset="0"/>
                 <a:cs typeface="Arial" panose="020B0604020202020204" pitchFamily="34" charset="0"/>
               </a:rPr>
               <a:t> </a:t>
             </a:r>
             <a:r>
-              <a:rPr lang="en-US" sz="1400" u="sng" spc="-25" dirty="0">
+              <a:rPr lang="en-US" sz="1400" spc="-25" dirty="0">
                 <a:latin typeface="Arial" panose="020B0604020202020204" pitchFamily="34" charset="0"/>
                 <a:cs typeface="Arial" panose="020B0604020202020204" pitchFamily="34" charset="0"/>
               </a:rPr>
               <a:t>15:</a:t>
             </a:r>
-            <a:endParaRPr lang="en-US" sz="1400" u="sng" dirty="0">
+            <a:endParaRPr lang="en-US" sz="1400" dirty="0">
               <a:latin typeface="Arial" panose="020B0604020202020204" pitchFamily="34" charset="0"/>
               <a:cs typeface="Arial" panose="020B0604020202020204" pitchFamily="34" charset="0"/>
             </a:endParaRPr>
@@ -3148,19 +3150,8 @@
                 <a:latin typeface="Arial" panose="020B0604020202020204" pitchFamily="34" charset="0"/>
                 <a:cs typeface="Arial" panose="020B0604020202020204" pitchFamily="34" charset="0"/>
               </a:rPr>
-              <a:t>Poonam </a:t>
-            </a:r>
-            <a:r>
-              <a:rPr lang="en-US" sz="1400" dirty="0" err="1">
-                <a:latin typeface="Arial" panose="020B0604020202020204" pitchFamily="34" charset="0"/>
-                <a:cs typeface="Arial" panose="020B0604020202020204" pitchFamily="34" charset="0"/>
-              </a:rPr>
-              <a:t>Paraskar</a:t>
-            </a:r>
-            <a:endParaRPr lang="en-US" sz="1400" dirty="0">
-              <a:latin typeface="Arial" panose="020B0604020202020204" pitchFamily="34" charset="0"/>
-              <a:cs typeface="Arial" panose="020B0604020202020204" pitchFamily="34" charset="0"/>
-            </a:endParaRPr>
+              <a:t>Poonam Dashrath Paraskar(1427297)</a:t>
+            </a:r>
           </a:p>
           <a:p>
             <a:pPr marL="282575" indent="-270510" algn="l">
@@ -3323,8 +3314,8 @@
         </p:blipFill>
         <p:spPr>
           <a:xfrm>
-            <a:off x="4758612" y="2532717"/>
-            <a:ext cx="7052387" cy="4125257"/>
+            <a:off x="4797083" y="2532718"/>
+            <a:ext cx="7013916" cy="4102754"/>
           </a:xfrm>
           <a:prstGeom prst="rect">
             <a:avLst/>
@@ -3363,10 +3354,657 @@
       </p:grpSpPr>
       <p:sp>
         <p:nvSpPr>
+          <p:cNvPr id="3" name="Content Placeholder 2">
+            <a:extLst>
+              <a:ext uri="{FF2B5EF4-FFF2-40B4-BE49-F238E27FC236}">
+                <a16:creationId xmlns:a16="http://schemas.microsoft.com/office/drawing/2014/main" id="{4CA0EC46-C32D-E884-E9B3-F68BAE705FEE}"/>
+              </a:ext>
+            </a:extLst>
+          </p:cNvPr>
+          <p:cNvSpPr>
+            <a:spLocks noGrp="1"/>
+          </p:cNvSpPr>
+          <p:nvPr>
+            <p:ph idx="1"/>
+          </p:nvPr>
+        </p:nvSpPr>
+        <p:spPr>
+          <a:xfrm>
+            <a:off x="701755" y="1214120"/>
+            <a:ext cx="10515600" cy="4984173"/>
+          </a:xfrm>
+        </p:spPr>
+        <p:txBody>
+          <a:bodyPr/>
+          <a:lstStyle/>
+          <a:p>
+            <a:pPr marL="0" marR="0" indent="0" algn="just">
+              <a:spcBef>
+                <a:spcPts val="0"/>
+              </a:spcBef>
+              <a:spcAft>
+                <a:spcPts val="0"/>
+              </a:spcAft>
+              <a:buNone/>
+            </a:pPr>
+            <a:endParaRPr lang="en-US" sz="1800" dirty="0">
+              <a:latin typeface="Times New Roman" panose="02020603050405020304" pitchFamily="18" charset="0"/>
+              <a:ea typeface="SimSun" panose="02010600030101010101" pitchFamily="2" charset="-122"/>
+            </a:endParaRPr>
+          </a:p>
+          <a:p>
+            <a:pPr marL="0" indent="0" algn="just">
+              <a:spcBef>
+                <a:spcPts val="0"/>
+              </a:spcBef>
+              <a:buNone/>
+            </a:pPr>
+            <a:r>
+              <a:rPr lang="en-US" sz="1800" dirty="0">
+                <a:effectLst/>
+                <a:latin typeface="Times New Roman" panose="02020603050405020304" pitchFamily="18" charset="0"/>
+                <a:ea typeface="SimSun" panose="02010600030101010101" pitchFamily="2" charset="-122"/>
+              </a:rPr>
+              <a:t>3. </a:t>
+            </a:r>
+            <a:r>
+              <a:rPr lang="en-US" sz="1800" spc="-5" dirty="0">
+                <a:effectLst/>
+                <a:latin typeface="Times New Roman" panose="02020603050405020304" pitchFamily="18" charset="0"/>
+                <a:ea typeface="SimSun" panose="02010600030101010101" pitchFamily="2" charset="-122"/>
+              </a:rPr>
+              <a:t>Result of Accuracy Calculation Phase</a:t>
+            </a:r>
+          </a:p>
+          <a:p>
+            <a:pPr marL="0" indent="0" algn="just">
+              <a:spcBef>
+                <a:spcPts val="0"/>
+              </a:spcBef>
+              <a:buNone/>
+            </a:pPr>
+            <a:endParaRPr lang="en-US" sz="1800" dirty="0">
+              <a:effectLst/>
+              <a:latin typeface="Times New Roman" panose="02020603050405020304" pitchFamily="18" charset="0"/>
+              <a:ea typeface="SimSun" panose="02010600030101010101" pitchFamily="2" charset="-122"/>
+            </a:endParaRPr>
+          </a:p>
+        </p:txBody>
+      </p:sp>
+      <p:sp>
+        <p:nvSpPr>
+          <p:cNvPr id="4" name="Title 1">
+            <a:extLst>
+              <a:ext uri="{FF2B5EF4-FFF2-40B4-BE49-F238E27FC236}">
+                <a16:creationId xmlns:a16="http://schemas.microsoft.com/office/drawing/2014/main" id="{D8E04A14-4850-858B-EBB9-E5F331EC04E7}"/>
+              </a:ext>
+            </a:extLst>
+          </p:cNvPr>
+          <p:cNvSpPr txBox="1">
+            <a:spLocks/>
+          </p:cNvSpPr>
+          <p:nvPr/>
+        </p:nvSpPr>
+        <p:spPr>
+          <a:xfrm>
+            <a:off x="4881488" y="226624"/>
+            <a:ext cx="5571907" cy="809074"/>
+          </a:xfrm>
+          <a:prstGeom prst="rect">
+            <a:avLst/>
+          </a:prstGeom>
+        </p:spPr>
+        <p:txBody>
+          <a:bodyPr vert="horz" lIns="91440" tIns="45720" rIns="91440" bIns="45720" rtlCol="0" anchor="ctr">
+            <a:normAutofit fontScale="97500"/>
+          </a:bodyPr>
+          <a:lstStyle>
+            <a:lvl1pPr algn="l" defTabSz="914400" rtl="0" eaLnBrk="1" latinLnBrk="0" hangingPunct="1">
+              <a:lnSpc>
+                <a:spcPct val="90000"/>
+              </a:lnSpc>
+              <a:spcBef>
+                <a:spcPct val="0"/>
+              </a:spcBef>
+              <a:buNone/>
+              <a:defRPr sz="4400" kern="1200">
+                <a:solidFill>
+                  <a:schemeClr val="tx1"/>
+                </a:solidFill>
+                <a:latin typeface="+mj-lt"/>
+                <a:ea typeface="+mj-ea"/>
+                <a:cs typeface="+mj-cs"/>
+              </a:defRPr>
+            </a:lvl1pPr>
+          </a:lstStyle>
+          <a:p>
+            <a:r>
+              <a:rPr lang="en-IN" dirty="0"/>
+              <a:t>Results</a:t>
+            </a:r>
+          </a:p>
+        </p:txBody>
+      </p:sp>
+      <p:sp>
+        <p:nvSpPr>
+          <p:cNvPr id="6" name="TextBox 5">
+            <a:extLst>
+              <a:ext uri="{FF2B5EF4-FFF2-40B4-BE49-F238E27FC236}">
+                <a16:creationId xmlns:a16="http://schemas.microsoft.com/office/drawing/2014/main" id="{BBB9F4C5-D6A8-2C09-161C-322CFE8354BA}"/>
+              </a:ext>
+            </a:extLst>
+          </p:cNvPr>
+          <p:cNvSpPr txBox="1"/>
+          <p:nvPr/>
+        </p:nvSpPr>
+        <p:spPr>
+          <a:xfrm>
+            <a:off x="6113790" y="2293032"/>
+            <a:ext cx="4768948" cy="2982355"/>
+          </a:xfrm>
+          <a:prstGeom prst="rect">
+            <a:avLst/>
+          </a:prstGeom>
+          <a:noFill/>
+        </p:spPr>
+        <p:txBody>
+          <a:bodyPr wrap="square" rtlCol="0">
+            <a:spAutoFit/>
+          </a:bodyPr>
+          <a:lstStyle/>
+          <a:p>
+            <a:pPr marL="285750" marR="0" indent="-285750" algn="just">
+              <a:lnSpc>
+                <a:spcPct val="95000"/>
+              </a:lnSpc>
+              <a:spcBef>
+                <a:spcPts val="0"/>
+              </a:spcBef>
+              <a:spcAft>
+                <a:spcPts val="600"/>
+              </a:spcAft>
+              <a:buFont typeface="Courier New" panose="02070309020205020404" pitchFamily="49" charset="0"/>
+              <a:buChar char="o"/>
+              <a:tabLst>
+                <a:tab pos="182880" algn="l"/>
+              </a:tabLst>
+            </a:pPr>
+            <a:r>
+              <a:rPr lang="en-US" sz="1800" spc="-5" dirty="0">
+                <a:effectLst/>
+                <a:latin typeface="Times New Roman" panose="02020603050405020304" pitchFamily="18" charset="0"/>
+                <a:ea typeface="SimSun" panose="02010600030101010101" pitchFamily="2" charset="-122"/>
+              </a:rPr>
+              <a:t>Accuracy is calculated by dividing matches with total number of predictions multiply by 100. </a:t>
+            </a:r>
+          </a:p>
+          <a:p>
+            <a:pPr marL="285750" marR="0" indent="-285750" algn="just">
+              <a:lnSpc>
+                <a:spcPct val="95000"/>
+              </a:lnSpc>
+              <a:spcBef>
+                <a:spcPts val="0"/>
+              </a:spcBef>
+              <a:spcAft>
+                <a:spcPts val="600"/>
+              </a:spcAft>
+              <a:buFont typeface="Courier New" panose="02070309020205020404" pitchFamily="49" charset="0"/>
+              <a:buChar char="o"/>
+              <a:tabLst>
+                <a:tab pos="182880" algn="l"/>
+              </a:tabLst>
+            </a:pPr>
+            <a:r>
+              <a:rPr lang="en-US" sz="1800" spc="-5" dirty="0">
+                <a:effectLst/>
+                <a:latin typeface="Times New Roman" panose="02020603050405020304" pitchFamily="18" charset="0"/>
+                <a:ea typeface="SimSun" panose="02010600030101010101" pitchFamily="2" charset="-122"/>
+              </a:rPr>
+              <a:t>Accuracy = count of matches / total number of predictions * 100</a:t>
+            </a:r>
+          </a:p>
+          <a:p>
+            <a:pPr marL="285750" marR="0" indent="-285750" algn="just">
+              <a:lnSpc>
+                <a:spcPct val="95000"/>
+              </a:lnSpc>
+              <a:spcBef>
+                <a:spcPts val="0"/>
+              </a:spcBef>
+              <a:spcAft>
+                <a:spcPts val="600"/>
+              </a:spcAft>
+              <a:buFont typeface="Courier New" panose="02070309020205020404" pitchFamily="49" charset="0"/>
+              <a:buChar char="o"/>
+              <a:tabLst>
+                <a:tab pos="182880" algn="l"/>
+              </a:tabLst>
+            </a:pPr>
+            <a:r>
+              <a:rPr lang="en-US" spc="-5" dirty="0">
+                <a:latin typeface="Times New Roman" panose="02020603050405020304" pitchFamily="18" charset="0"/>
+                <a:ea typeface="SimSun" panose="02010600030101010101" pitchFamily="2" charset="-122"/>
+              </a:rPr>
+              <a:t>Count of match is a counter for each detected match this gets incremented. Figure 1.4 shows result of accuracy calculation</a:t>
+            </a:r>
+            <a:endParaRPr lang="en-US" sz="1800" spc="-5" dirty="0">
+              <a:effectLst/>
+              <a:latin typeface="Times New Roman" panose="02020603050405020304" pitchFamily="18" charset="0"/>
+              <a:ea typeface="SimSun" panose="02010600030101010101" pitchFamily="2" charset="-122"/>
+            </a:endParaRPr>
+          </a:p>
+          <a:p>
+            <a:pPr marL="342900" indent="-342900" algn="just">
+              <a:spcBef>
+                <a:spcPts val="0"/>
+              </a:spcBef>
+              <a:buAutoNum type="arabicPeriod"/>
+            </a:pPr>
+            <a:endParaRPr lang="en-US" sz="1800" dirty="0">
+              <a:effectLst/>
+              <a:latin typeface="Times New Roman" panose="02020603050405020304" pitchFamily="18" charset="0"/>
+              <a:ea typeface="SimSun" panose="02010600030101010101" pitchFamily="2" charset="-122"/>
+            </a:endParaRPr>
+          </a:p>
+          <a:p>
+            <a:endParaRPr lang="en-US" dirty="0"/>
+          </a:p>
+        </p:txBody>
+      </p:sp>
+      <p:sp>
+        <p:nvSpPr>
+          <p:cNvPr id="7" name="TextBox 6">
+            <a:extLst>
+              <a:ext uri="{FF2B5EF4-FFF2-40B4-BE49-F238E27FC236}">
+                <a16:creationId xmlns:a16="http://schemas.microsoft.com/office/drawing/2014/main" id="{236C4D20-46BF-EE94-D809-98C78BCBCF84}"/>
+              </a:ext>
+            </a:extLst>
+          </p:cNvPr>
+          <p:cNvSpPr txBox="1"/>
+          <p:nvPr/>
+        </p:nvSpPr>
+        <p:spPr>
+          <a:xfrm>
+            <a:off x="1309262" y="4645075"/>
+            <a:ext cx="3207434" cy="369332"/>
+          </a:xfrm>
+          <a:prstGeom prst="rect">
+            <a:avLst/>
+          </a:prstGeom>
+          <a:noFill/>
+        </p:spPr>
+        <p:txBody>
+          <a:bodyPr wrap="square" rtlCol="0">
+            <a:spAutoFit/>
+          </a:bodyPr>
+          <a:lstStyle/>
+          <a:p>
+            <a:r>
+              <a:rPr lang="en-US" dirty="0"/>
+              <a:t>figure 1.4. Accuracy Calculation </a:t>
+            </a:r>
+          </a:p>
+        </p:txBody>
+      </p:sp>
+      <p:pic>
+        <p:nvPicPr>
+          <p:cNvPr id="10" name="Picture 9" descr="Graphical user interface, text&#10;&#10;Description automatically generated with medium confidence">
+            <a:extLst>
+              <a:ext uri="{FF2B5EF4-FFF2-40B4-BE49-F238E27FC236}">
+                <a16:creationId xmlns:a16="http://schemas.microsoft.com/office/drawing/2014/main" id="{7EA5B3FF-9CFC-3DA6-6C26-477D2D8D335F}"/>
+              </a:ext>
+            </a:extLst>
+          </p:cNvPr>
+          <p:cNvPicPr>
+            <a:picLocks noChangeAspect="1"/>
+          </p:cNvPicPr>
+          <p:nvPr/>
+        </p:nvPicPr>
+        <p:blipFill>
+          <a:blip r:embed="rId2">
+            <a:extLst>
+              <a:ext uri="{28A0092B-C50C-407E-A947-70E740481C1C}">
+                <a14:useLocalDpi xmlns:a14="http://schemas.microsoft.com/office/drawing/2010/main" val="0"/>
+              </a:ext>
+            </a:extLst>
+          </a:blip>
+          <a:stretch>
+            <a:fillRect/>
+          </a:stretch>
+        </p:blipFill>
+        <p:spPr>
+          <a:xfrm>
+            <a:off x="594963" y="2447779"/>
+            <a:ext cx="5483248" cy="2166425"/>
+          </a:xfrm>
+          <a:prstGeom prst="rect">
+            <a:avLst/>
+          </a:prstGeom>
+        </p:spPr>
+      </p:pic>
+    </p:spTree>
+    <p:extLst>
+      <p:ext uri="{BB962C8B-B14F-4D97-AF65-F5344CB8AC3E}">
+        <p14:creationId xmlns:p14="http://schemas.microsoft.com/office/powerpoint/2010/main" val="275947310"/>
+      </p:ext>
+    </p:extLst>
+  </p:cSld>
+  <p:clrMapOvr>
+    <a:masterClrMapping/>
+  </p:clrMapOvr>
+</p:sld>
+</file>
+
+<file path=ppt/slides/slide11.xml><?xml version="1.0" encoding="utf-8"?>
+<p:sld xmlns:a="http://schemas.openxmlformats.org/drawingml/2006/main" xmlns:r="http://schemas.openxmlformats.org/officeDocument/2006/relationships" xmlns:p="http://schemas.openxmlformats.org/presentationml/2006/main">
+  <p:cSld>
+    <p:spTree>
+      <p:nvGrpSpPr>
+        <p:cNvPr id="1" name=""/>
+        <p:cNvGrpSpPr/>
+        <p:nvPr/>
+      </p:nvGrpSpPr>
+      <p:grpSpPr>
+        <a:xfrm>
+          <a:off x="0" y="0"/>
+          <a:ext cx="0" cy="0"/>
+          <a:chOff x="0" y="0"/>
+          <a:chExt cx="0" cy="0"/>
+        </a:xfrm>
+      </p:grpSpPr>
+      <p:sp>
+        <p:nvSpPr>
+          <p:cNvPr id="3" name="Content Placeholder 2">
+            <a:extLst>
+              <a:ext uri="{FF2B5EF4-FFF2-40B4-BE49-F238E27FC236}">
+                <a16:creationId xmlns:a16="http://schemas.microsoft.com/office/drawing/2014/main" id="{4CA0EC46-C32D-E884-E9B3-F68BAE705FEE}"/>
+              </a:ext>
+            </a:extLst>
+          </p:cNvPr>
+          <p:cNvSpPr>
+            <a:spLocks noGrp="1"/>
+          </p:cNvSpPr>
+          <p:nvPr>
+            <p:ph idx="1"/>
+          </p:nvPr>
+        </p:nvSpPr>
+        <p:spPr>
+          <a:xfrm>
+            <a:off x="701755" y="1214120"/>
+            <a:ext cx="10515600" cy="4984173"/>
+          </a:xfrm>
+        </p:spPr>
+        <p:txBody>
+          <a:bodyPr/>
+          <a:lstStyle/>
+          <a:p>
+            <a:pPr marL="0" indent="0" algn="just">
+              <a:spcBef>
+                <a:spcPts val="0"/>
+              </a:spcBef>
+              <a:buNone/>
+            </a:pPr>
+            <a:r>
+              <a:rPr lang="en-US" sz="1800" dirty="0">
+                <a:latin typeface="Times New Roman" panose="02020603050405020304" pitchFamily="18" charset="0"/>
+                <a:ea typeface="SimSun" panose="02010600030101010101" pitchFamily="2" charset="-122"/>
+              </a:rPr>
+              <a:t>4. </a:t>
+            </a:r>
+            <a:r>
+              <a:rPr lang="en-US" sz="1800" dirty="0">
+                <a:effectLst/>
+                <a:latin typeface="Times New Roman" panose="02020603050405020304" pitchFamily="18" charset="0"/>
+                <a:ea typeface="SimSun" panose="02010600030101010101" pitchFamily="2" charset="-122"/>
+              </a:rPr>
+              <a:t>Performance testing and comparison with legacy code: </a:t>
+            </a:r>
+          </a:p>
+          <a:p>
+            <a:pPr marL="0" indent="0" algn="just">
+              <a:spcBef>
+                <a:spcPts val="0"/>
+              </a:spcBef>
+              <a:buNone/>
+            </a:pPr>
+            <a:endParaRPr lang="en-US" sz="1800" dirty="0">
+              <a:latin typeface="Times New Roman" panose="02020603050405020304" pitchFamily="18" charset="0"/>
+              <a:ea typeface="SimSun" panose="02010600030101010101" pitchFamily="2" charset="-122"/>
+            </a:endParaRPr>
+          </a:p>
+          <a:p>
+            <a:pPr marL="0" indent="0" algn="just">
+              <a:spcBef>
+                <a:spcPts val="0"/>
+              </a:spcBef>
+              <a:buNone/>
+            </a:pPr>
+            <a:r>
+              <a:rPr lang="en-US" sz="1800" dirty="0">
+                <a:effectLst/>
+                <a:latin typeface="Times New Roman" panose="02020603050405020304" pitchFamily="18" charset="0"/>
+                <a:ea typeface="SimSun" panose="02010600030101010101" pitchFamily="2" charset="-122"/>
+              </a:rPr>
+              <a:t>In this phase of testing, we tested the code for 10 iterations with different range of training data and test data and compare the performance of newly implemented the code and legacy code.</a:t>
+            </a:r>
+          </a:p>
+          <a:p>
+            <a:pPr marL="0" indent="0" algn="just">
+              <a:spcBef>
+                <a:spcPts val="0"/>
+              </a:spcBef>
+              <a:buNone/>
+            </a:pPr>
+            <a:endParaRPr lang="en-US" sz="1800" dirty="0">
+              <a:latin typeface="Times New Roman" panose="02020603050405020304" pitchFamily="18" charset="0"/>
+              <a:ea typeface="SimSun" panose="02010600030101010101" pitchFamily="2" charset="-122"/>
+            </a:endParaRPr>
+          </a:p>
+          <a:p>
+            <a:pPr marL="0" indent="0" algn="just">
+              <a:spcBef>
+                <a:spcPts val="0"/>
+              </a:spcBef>
+              <a:buNone/>
+            </a:pPr>
+            <a:r>
+              <a:rPr lang="en-US" sz="1800" dirty="0">
+                <a:latin typeface="Times New Roman" panose="02020603050405020304" pitchFamily="18" charset="0"/>
+                <a:ea typeface="SimSun" panose="02010600030101010101" pitchFamily="2" charset="-122"/>
+              </a:rPr>
+              <a:t>The result of performance testing can be found </a:t>
+            </a:r>
+            <a:r>
+              <a:rPr lang="en-US" sz="1800" dirty="0">
+                <a:latin typeface="Times New Roman" panose="02020603050405020304" pitchFamily="18" charset="0"/>
+                <a:ea typeface="SimSun" panose="02010600030101010101" pitchFamily="2" charset="-122"/>
+                <a:hlinkClick r:id="rId2"/>
+              </a:rPr>
+              <a:t>here</a:t>
+            </a:r>
+            <a:r>
+              <a:rPr lang="en-US" sz="1800" dirty="0">
+                <a:latin typeface="Times New Roman" panose="02020603050405020304" pitchFamily="18" charset="0"/>
+                <a:ea typeface="SimSun" panose="02010600030101010101" pitchFamily="2" charset="-122"/>
+              </a:rPr>
+              <a:t>.</a:t>
+            </a:r>
+          </a:p>
+          <a:p>
+            <a:pPr marL="0" indent="0" algn="just">
+              <a:spcBef>
+                <a:spcPts val="0"/>
+              </a:spcBef>
+              <a:buNone/>
+            </a:pPr>
+            <a:r>
+              <a:rPr lang="en-US" sz="1800" dirty="0">
+                <a:latin typeface="Times New Roman" panose="02020603050405020304" pitchFamily="18" charset="0"/>
+                <a:ea typeface="SimSun" panose="02010600030101010101" pitchFamily="2" charset="-122"/>
+              </a:rPr>
+              <a:t>One of the result is attached below:</a:t>
+            </a:r>
+          </a:p>
+          <a:p>
+            <a:pPr marL="0" indent="0" algn="just">
+              <a:spcBef>
+                <a:spcPts val="0"/>
+              </a:spcBef>
+              <a:buNone/>
+            </a:pPr>
+            <a:endParaRPr lang="en-US" sz="1800" dirty="0">
+              <a:latin typeface="Times New Roman" panose="02020603050405020304" pitchFamily="18" charset="0"/>
+              <a:ea typeface="SimSun" panose="02010600030101010101" pitchFamily="2" charset="-122"/>
+            </a:endParaRPr>
+          </a:p>
+          <a:p>
+            <a:pPr marL="0" indent="0" algn="just">
+              <a:spcBef>
+                <a:spcPts val="0"/>
+              </a:spcBef>
+              <a:buNone/>
+            </a:pPr>
+            <a:endParaRPr lang="en-US" sz="1800" dirty="0">
+              <a:latin typeface="Times New Roman" panose="02020603050405020304" pitchFamily="18" charset="0"/>
+              <a:ea typeface="SimSun" panose="02010600030101010101" pitchFamily="2" charset="-122"/>
+            </a:endParaRPr>
+          </a:p>
+          <a:p>
+            <a:pPr marL="0" indent="0" algn="just">
+              <a:spcBef>
+                <a:spcPts val="0"/>
+              </a:spcBef>
+              <a:buNone/>
+            </a:pPr>
+            <a:endParaRPr lang="en-US" sz="1800" dirty="0">
+              <a:effectLst/>
+              <a:latin typeface="Times New Roman" panose="02020603050405020304" pitchFamily="18" charset="0"/>
+              <a:ea typeface="SimSun" panose="02010600030101010101" pitchFamily="2" charset="-122"/>
+            </a:endParaRPr>
+          </a:p>
+        </p:txBody>
+      </p:sp>
+      <p:sp>
+        <p:nvSpPr>
+          <p:cNvPr id="4" name="Title 1">
+            <a:extLst>
+              <a:ext uri="{FF2B5EF4-FFF2-40B4-BE49-F238E27FC236}">
+                <a16:creationId xmlns:a16="http://schemas.microsoft.com/office/drawing/2014/main" id="{D8E04A14-4850-858B-EBB9-E5F331EC04E7}"/>
+              </a:ext>
+            </a:extLst>
+          </p:cNvPr>
+          <p:cNvSpPr txBox="1">
+            <a:spLocks/>
+          </p:cNvSpPr>
+          <p:nvPr/>
+        </p:nvSpPr>
+        <p:spPr>
+          <a:xfrm>
+            <a:off x="4881488" y="226624"/>
+            <a:ext cx="5571907" cy="809074"/>
+          </a:xfrm>
+          <a:prstGeom prst="rect">
+            <a:avLst/>
+          </a:prstGeom>
+        </p:spPr>
+        <p:txBody>
+          <a:bodyPr vert="horz" lIns="91440" tIns="45720" rIns="91440" bIns="45720" rtlCol="0" anchor="ctr">
+            <a:normAutofit fontScale="97500"/>
+          </a:bodyPr>
+          <a:lstStyle>
+            <a:lvl1pPr algn="l" defTabSz="914400" rtl="0" eaLnBrk="1" latinLnBrk="0" hangingPunct="1">
+              <a:lnSpc>
+                <a:spcPct val="90000"/>
+              </a:lnSpc>
+              <a:spcBef>
+                <a:spcPct val="0"/>
+              </a:spcBef>
+              <a:buNone/>
+              <a:defRPr sz="4400" kern="1200">
+                <a:solidFill>
+                  <a:schemeClr val="tx1"/>
+                </a:solidFill>
+                <a:latin typeface="+mj-lt"/>
+                <a:ea typeface="+mj-ea"/>
+                <a:cs typeface="+mj-cs"/>
+              </a:defRPr>
+            </a:lvl1pPr>
+          </a:lstStyle>
+          <a:p>
+            <a:r>
+              <a:rPr lang="en-IN" dirty="0"/>
+              <a:t>Results</a:t>
+            </a:r>
+          </a:p>
+        </p:txBody>
+      </p:sp>
+      <p:pic>
+        <p:nvPicPr>
+          <p:cNvPr id="10" name="Picture 9">
+            <a:extLst>
+              <a:ext uri="{FF2B5EF4-FFF2-40B4-BE49-F238E27FC236}">
+                <a16:creationId xmlns:a16="http://schemas.microsoft.com/office/drawing/2014/main" id="{7CDF08CA-8178-BC0E-A281-796644D931D6}"/>
+              </a:ext>
+            </a:extLst>
+          </p:cNvPr>
+          <p:cNvPicPr>
+            <a:picLocks noChangeAspect="1"/>
+          </p:cNvPicPr>
+          <p:nvPr/>
+        </p:nvPicPr>
+        <p:blipFill>
+          <a:blip r:embed="rId3"/>
+          <a:stretch>
+            <a:fillRect/>
+          </a:stretch>
+        </p:blipFill>
+        <p:spPr>
+          <a:xfrm>
+            <a:off x="1565488" y="3245131"/>
+            <a:ext cx="7163800" cy="2832112"/>
+          </a:xfrm>
+          <a:prstGeom prst="rect">
+            <a:avLst/>
+          </a:prstGeom>
+        </p:spPr>
+      </p:pic>
+    </p:spTree>
+    <p:extLst>
+      <p:ext uri="{BB962C8B-B14F-4D97-AF65-F5344CB8AC3E}">
+        <p14:creationId xmlns:p14="http://schemas.microsoft.com/office/powerpoint/2010/main" val="2929845784"/>
+      </p:ext>
+    </p:extLst>
+  </p:cSld>
+  <p:clrMapOvr>
+    <a:masterClrMapping/>
+  </p:clrMapOvr>
+</p:sld>
+</file>
+
+<file path=ppt/slides/slide12.xml><?xml version="1.0" encoding="utf-8"?>
+<p:sld xmlns:a="http://schemas.openxmlformats.org/drawingml/2006/main" xmlns:r="http://schemas.openxmlformats.org/officeDocument/2006/relationships" xmlns:p="http://schemas.openxmlformats.org/presentationml/2006/main">
+  <p:cSld>
+    <p:spTree>
+      <p:nvGrpSpPr>
+        <p:cNvPr id="1" name=""/>
+        <p:cNvGrpSpPr/>
+        <p:nvPr/>
+      </p:nvGrpSpPr>
+      <p:grpSpPr>
+        <a:xfrm>
+          <a:off x="0" y="0"/>
+          <a:ext cx="0" cy="0"/>
+          <a:chOff x="0" y="0"/>
+          <a:chExt cx="0" cy="0"/>
+        </a:xfrm>
+      </p:grpSpPr>
+      <p:sp>
+        <p:nvSpPr>
           <p:cNvPr id="2" name="Title 1">
             <a:extLst>
               <a:ext uri="{FF2B5EF4-FFF2-40B4-BE49-F238E27FC236}">
-                <a16:creationId xmlns:a16="http://schemas.microsoft.com/office/drawing/2014/main" id="{4AB60701-9E36-FC64-6A81-FE34471EF1EB}"/>
+                <a16:creationId xmlns:a16="http://schemas.microsoft.com/office/drawing/2014/main" id="{07EBA03B-811E-6119-87C3-EDE23DECA6F7}"/>
               </a:ext>
             </a:extLst>
           </p:cNvPr>
@@ -3374,35 +4012,28 @@
             <a:spLocks noGrp="1"/>
           </p:cNvSpPr>
           <p:nvPr>
-            <p:ph type="ctrTitle"/>
-          </p:nvPr>
-        </p:nvSpPr>
-        <p:spPr>
-          <a:xfrm>
-            <a:off x="1524000" y="1122363"/>
-            <a:ext cx="9144000" cy="902380"/>
-          </a:xfrm>
-        </p:spPr>
-        <p:txBody>
-          <a:bodyPr>
-            <a:normAutofit fontScale="90000"/>
-          </a:bodyPr>
-          <a:lstStyle/>
-          <a:p>
+            <p:ph type="title"/>
+          </p:nvPr>
+        </p:nvSpPr>
+        <p:spPr/>
+        <p:txBody>
+          <a:bodyPr/>
+          <a:lstStyle/>
+          <a:p>
+            <a:pPr algn="ctr"/>
             <a:r>
               <a:rPr lang="en-US" dirty="0"/>
               <a:t>Conclusion</a:t>
             </a:r>
-            <a:endParaRPr lang="en-IN" dirty="0"/>
-          </a:p>
-        </p:txBody>
-      </p:sp>
-      <p:sp>
-        <p:nvSpPr>
-          <p:cNvPr id="3" name="Subtitle 2">
+          </a:p>
+        </p:txBody>
+      </p:sp>
+      <p:sp>
+        <p:nvSpPr>
+          <p:cNvPr id="3" name="Content Placeholder 2">
             <a:extLst>
               <a:ext uri="{FF2B5EF4-FFF2-40B4-BE49-F238E27FC236}">
-                <a16:creationId xmlns:a16="http://schemas.microsoft.com/office/drawing/2014/main" id="{C4555556-4ECE-7F03-6607-3EF1FAA22960}"/>
+                <a16:creationId xmlns:a16="http://schemas.microsoft.com/office/drawing/2014/main" id="{9994E6B1-E67C-9537-49D7-F621DB2BB98E}"/>
               </a:ext>
             </a:extLst>
           </p:cNvPr>
@@ -3410,27 +4041,170 @@
             <a:spLocks noGrp="1"/>
           </p:cNvSpPr>
           <p:nvPr>
-            <p:ph type="subTitle" idx="1"/>
-          </p:nvPr>
-        </p:nvSpPr>
-        <p:spPr>
-          <a:xfrm>
-            <a:off x="1524000" y="2593910"/>
-            <a:ext cx="9144000" cy="2663890"/>
-          </a:xfrm>
-        </p:spPr>
+            <p:ph idx="1"/>
+          </p:nvPr>
+        </p:nvSpPr>
+        <p:spPr/>
         <p:txBody>
           <a:bodyPr/>
           <a:lstStyle/>
           <a:p>
-            <a:endParaRPr lang="en-IN" dirty="0"/>
+            <a:pPr marR="0" algn="just">
+              <a:lnSpc>
+                <a:spcPct val="95000"/>
+              </a:lnSpc>
+              <a:spcBef>
+                <a:spcPts val="0"/>
+              </a:spcBef>
+              <a:spcAft>
+                <a:spcPts val="600"/>
+              </a:spcAft>
+              <a:buFont typeface="Courier New" panose="02070309020205020404" pitchFamily="49" charset="0"/>
+              <a:buChar char="o"/>
+              <a:tabLst>
+                <a:tab pos="182880" algn="l"/>
+              </a:tabLst>
+            </a:pPr>
+            <a:r>
+              <a:rPr lang="en-US" sz="2000" spc="-5" dirty="0">
+                <a:effectLst/>
+                <a:latin typeface="Times New Roman" panose="02020603050405020304" pitchFamily="18" charset="0"/>
+                <a:ea typeface="SimSun" panose="02010600030101010101" pitchFamily="2" charset="-122"/>
+              </a:rPr>
+              <a:t>Team has developed new method that read learning sequences from a file by itself and learn them.</a:t>
+            </a:r>
+          </a:p>
+          <a:p>
+            <a:pPr marL="0" marR="0" indent="0" algn="just">
+              <a:lnSpc>
+                <a:spcPct val="95000"/>
+              </a:lnSpc>
+              <a:spcBef>
+                <a:spcPts val="0"/>
+              </a:spcBef>
+              <a:spcAft>
+                <a:spcPts val="600"/>
+              </a:spcAft>
+              <a:buNone/>
+              <a:tabLst>
+                <a:tab pos="182880" algn="l"/>
+              </a:tabLst>
+            </a:pPr>
+            <a:r>
+              <a:rPr lang="en-US" sz="2000" spc="-5" dirty="0">
+                <a:effectLst/>
+                <a:latin typeface="Times New Roman" panose="02020603050405020304" pitchFamily="18" charset="0"/>
+                <a:ea typeface="SimSun" panose="02010600030101010101" pitchFamily="2" charset="-122"/>
+              </a:rPr>
+              <a:t> </a:t>
+            </a:r>
+          </a:p>
+          <a:p>
+            <a:pPr marR="0" algn="just">
+              <a:lnSpc>
+                <a:spcPct val="95000"/>
+              </a:lnSpc>
+              <a:spcBef>
+                <a:spcPts val="0"/>
+              </a:spcBef>
+              <a:spcAft>
+                <a:spcPts val="600"/>
+              </a:spcAft>
+              <a:buFont typeface="Courier New" panose="02070309020205020404" pitchFamily="49" charset="0"/>
+              <a:buChar char="o"/>
+              <a:tabLst>
+                <a:tab pos="182880" algn="l"/>
+              </a:tabLst>
+            </a:pPr>
+            <a:r>
+              <a:rPr lang="en-US" sz="2000" spc="-5" dirty="0">
+                <a:effectLst/>
+                <a:latin typeface="Times New Roman" panose="02020603050405020304" pitchFamily="18" charset="0"/>
+                <a:ea typeface="SimSun" panose="02010600030101010101" pitchFamily="2" charset="-122"/>
+              </a:rPr>
+              <a:t> Different methods are created to predict the trained sequences by comparing the generated similarity matrix with each of the SDRs of the learned sequence from the training phase, and the accuracy percentage of the predicted sequences was calculated and stored in a file. </a:t>
+            </a:r>
+          </a:p>
+          <a:p>
+            <a:pPr marL="0" marR="0" indent="0" algn="just">
+              <a:lnSpc>
+                <a:spcPct val="95000"/>
+              </a:lnSpc>
+              <a:spcBef>
+                <a:spcPts val="0"/>
+              </a:spcBef>
+              <a:spcAft>
+                <a:spcPts val="600"/>
+              </a:spcAft>
+              <a:buNone/>
+              <a:tabLst>
+                <a:tab pos="182880" algn="l"/>
+              </a:tabLst>
+            </a:pPr>
+            <a:endParaRPr lang="en-US" sz="2000" spc="-5" dirty="0">
+              <a:effectLst/>
+              <a:latin typeface="Times New Roman" panose="02020603050405020304" pitchFamily="18" charset="0"/>
+              <a:ea typeface="SimSun" panose="02010600030101010101" pitchFamily="2" charset="-122"/>
+            </a:endParaRPr>
+          </a:p>
+          <a:p>
+            <a:pPr marR="0" algn="just">
+              <a:lnSpc>
+                <a:spcPct val="95000"/>
+              </a:lnSpc>
+              <a:spcBef>
+                <a:spcPts val="0"/>
+              </a:spcBef>
+              <a:spcAft>
+                <a:spcPts val="600"/>
+              </a:spcAft>
+              <a:buFont typeface="Courier New" panose="02070309020205020404" pitchFamily="49" charset="0"/>
+              <a:buChar char="o"/>
+              <a:tabLst>
+                <a:tab pos="182880" algn="l"/>
+              </a:tabLst>
+            </a:pPr>
+            <a:r>
+              <a:rPr lang="en-US" sz="2000" spc="-5" dirty="0">
+                <a:effectLst/>
+                <a:latin typeface="Times New Roman" panose="02020603050405020304" pitchFamily="18" charset="0"/>
+                <a:ea typeface="SimSun" panose="02010600030101010101" pitchFamily="2" charset="-122"/>
+              </a:rPr>
+              <a:t>The accuracy of the predictions was found to increase with the number of cycles, indicating that the learning process improved over time.</a:t>
+            </a:r>
+          </a:p>
+          <a:p>
+            <a:pPr marR="0" algn="just">
+              <a:lnSpc>
+                <a:spcPct val="95000"/>
+              </a:lnSpc>
+              <a:spcBef>
+                <a:spcPts val="0"/>
+              </a:spcBef>
+              <a:spcAft>
+                <a:spcPts val="600"/>
+              </a:spcAft>
+              <a:buFont typeface="Courier New" panose="02070309020205020404" pitchFamily="49" charset="0"/>
+              <a:buChar char="o"/>
+              <a:tabLst>
+                <a:tab pos="182880" algn="l"/>
+              </a:tabLst>
+            </a:pPr>
+            <a:endParaRPr lang="en-US" sz="2000" spc="-5" dirty="0">
+              <a:effectLst/>
+              <a:latin typeface="Times New Roman" panose="02020603050405020304" pitchFamily="18" charset="0"/>
+              <a:ea typeface="SimSun" panose="02010600030101010101" pitchFamily="2" charset="-122"/>
+            </a:endParaRPr>
+          </a:p>
+          <a:p>
+            <a:endParaRPr lang="en-US" dirty="0"/>
           </a:p>
         </p:txBody>
       </p:sp>
     </p:spTree>
     <p:extLst>
       <p:ext uri="{BB962C8B-B14F-4D97-AF65-F5344CB8AC3E}">
-        <p14:creationId xmlns:p14="http://schemas.microsoft.com/office/powerpoint/2010/main" val="1114572948"/>
+        <p14:creationId xmlns:p14="http://schemas.microsoft.com/office/powerpoint/2010/main" val="1761826811"/>
       </p:ext>
     </p:extLst>
   </p:cSld>
@@ -3475,8 +4249,8 @@
         </p:nvSpPr>
         <p:spPr>
           <a:xfrm>
-            <a:off x="1524000" y="1122363"/>
-            <a:ext cx="9144000" cy="883719"/>
+            <a:off x="1617306" y="285005"/>
+            <a:ext cx="9144000" cy="818404"/>
           </a:xfrm>
         </p:spPr>
         <p:txBody>
@@ -3486,13 +4260,120 @@
           <a:lstStyle/>
           <a:p>
             <a:r>
-              <a:rPr lang="en-US" dirty="0"/>
-              <a:t>	</a:t>
-            </a:r>
-            <a:r>
               <a:rPr lang="en-IN" dirty="0"/>
               <a:t>Index</a:t>
             </a:r>
+          </a:p>
+        </p:txBody>
+      </p:sp>
+      <p:sp>
+        <p:nvSpPr>
+          <p:cNvPr id="4" name="Subtitle 3">
+            <a:extLst>
+              <a:ext uri="{FF2B5EF4-FFF2-40B4-BE49-F238E27FC236}">
+                <a16:creationId xmlns:a16="http://schemas.microsoft.com/office/drawing/2014/main" id="{10F56BD9-E9E4-01EE-6408-7DBF6540BE9D}"/>
+              </a:ext>
+            </a:extLst>
+          </p:cNvPr>
+          <p:cNvSpPr>
+            <a:spLocks noGrp="1"/>
+          </p:cNvSpPr>
+          <p:nvPr>
+            <p:ph type="subTitle" idx="1"/>
+          </p:nvPr>
+        </p:nvSpPr>
+        <p:spPr>
+          <a:xfrm>
+            <a:off x="1524000" y="1518557"/>
+            <a:ext cx="9144000" cy="3820886"/>
+          </a:xfrm>
+        </p:spPr>
+        <p:txBody>
+          <a:bodyPr/>
+          <a:lstStyle/>
+          <a:p>
+            <a:pPr marL="514350" indent="-514350" algn="l">
+              <a:buAutoNum type="romanLcPeriod"/>
+            </a:pPr>
+            <a:r>
+              <a:rPr lang="en-IN" dirty="0"/>
+              <a:t>Introduction</a:t>
+            </a:r>
+          </a:p>
+          <a:p>
+            <a:pPr marL="514350" indent="-514350" algn="l">
+              <a:buAutoNum type="romanLcPeriod"/>
+            </a:pPr>
+            <a:r>
+              <a:rPr lang="en-IN" dirty="0"/>
+              <a:t>Methodology</a:t>
+            </a:r>
+          </a:p>
+          <a:p>
+            <a:pPr marL="514350" indent="-514350" algn="l">
+              <a:buAutoNum type="romanLcPeriod"/>
+            </a:pPr>
+            <a:r>
+              <a:rPr lang="en-US" sz="2400" dirty="0"/>
+              <a:t>Flow chart of Implementation</a:t>
+            </a:r>
+            <a:endParaRPr lang="en-IN" dirty="0"/>
+          </a:p>
+          <a:p>
+            <a:pPr marL="514350" indent="-514350" algn="l">
+              <a:buFont typeface="Arial" panose="020B0604020202020204" pitchFamily="34" charset="0"/>
+              <a:buAutoNum type="romanLcPeriod"/>
+            </a:pPr>
+            <a:r>
+              <a:rPr lang="en-IN" dirty="0"/>
+              <a:t>Results </a:t>
+            </a:r>
+          </a:p>
+          <a:p>
+            <a:pPr marL="514350" indent="-514350" algn="l">
+              <a:buFont typeface="Arial" panose="020B0604020202020204" pitchFamily="34" charset="0"/>
+              <a:buAutoNum type="romanLcPeriod"/>
+            </a:pPr>
+            <a:r>
+              <a:rPr lang="en-IN" dirty="0"/>
+              <a:t>Conclusion</a:t>
+            </a:r>
+          </a:p>
+          <a:p>
+            <a:pPr marL="514350" indent="-514350" algn="l">
+              <a:buAutoNum type="romanLcPeriod"/>
+            </a:pPr>
+            <a:endParaRPr lang="en-IN" dirty="0">
+              <a:latin typeface="Calibri" panose="020F0502020204030204" pitchFamily="34" charset="0"/>
+              <a:cs typeface="Times New Roman" panose="02020603050405020304" pitchFamily="18" charset="0"/>
+            </a:endParaRPr>
+          </a:p>
+          <a:p>
+            <a:pPr marL="514350" indent="-514350" algn="l">
+              <a:buAutoNum type="romanLcPeriod"/>
+            </a:pPr>
+            <a:endParaRPr lang="en-IN" dirty="0">
+              <a:latin typeface="Calibri" panose="020F0502020204030204" pitchFamily="34" charset="0"/>
+              <a:ea typeface="Calibri" panose="020F0502020204030204" pitchFamily="34" charset="0"/>
+              <a:cs typeface="Times New Roman" panose="02020603050405020304" pitchFamily="18" charset="0"/>
+            </a:endParaRPr>
+          </a:p>
+          <a:p>
+            <a:pPr marL="514350" indent="-514350" algn="l">
+              <a:buAutoNum type="romanLcPeriod"/>
+            </a:pPr>
+            <a:endParaRPr lang="en-IN" sz="2400" dirty="0">
+              <a:effectLst/>
+              <a:latin typeface="Calibri" panose="020F0502020204030204" pitchFamily="34" charset="0"/>
+              <a:ea typeface="Calibri" panose="020F0502020204030204" pitchFamily="34" charset="0"/>
+              <a:cs typeface="Times New Roman" panose="02020603050405020304" pitchFamily="18" charset="0"/>
+            </a:endParaRPr>
+          </a:p>
+          <a:p>
+            <a:pPr marL="514350" indent="-514350" algn="l">
+              <a:buAutoNum type="romanLcPeriod"/>
+            </a:pPr>
+            <a:endParaRPr lang="en-IN" dirty="0"/>
           </a:p>
         </p:txBody>
       </p:sp>
@@ -3578,7 +4459,7 @@
         </p:nvSpPr>
         <p:spPr>
           <a:xfrm>
-            <a:off x="681135" y="1726163"/>
+            <a:off x="695203" y="2007517"/>
             <a:ext cx="10599575" cy="4301413"/>
           </a:xfrm>
         </p:spPr>
@@ -3588,25 +4469,25 @@
           </a:bodyPr>
           <a:lstStyle/>
           <a:p>
-            <a:pPr algn="l"/>
+            <a:pPr marL="342900" indent="-342900" algn="l">
+              <a:buFont typeface="Arial" panose="020B0604020202020204" pitchFamily="34" charset="0"/>
+              <a:buChar char="•"/>
+            </a:pPr>
             <a:r>
               <a:rPr lang="en-US" sz="2000" b="0" i="0" dirty="0">
-                <a:solidFill>
-                  <a:srgbClr val="374151"/>
-                </a:solidFill>
                 <a:effectLst/>
                 <a:latin typeface="Söhne"/>
               </a:rPr>
-              <a:t>Multisequence learning is a machine learning approach in which a model learns temporal patterns of sequences one by one during the course of the experiment and provides the matching sequences as the predicted output. It is a form of sequential learning in which the model learns from multiple sequences over time, instead of just one sequence.</a:t>
-            </a:r>
-          </a:p>
-          <a:p>
-            <a:pPr algn="l"/>
+              <a:t>Multisequence learning is a machine learning approach in which a model learns temporal patterns of sequences one by one during the experiment and provides the matching sequences as the predicted output. </a:t>
+            </a:r>
+          </a:p>
+          <a:p>
+            <a:pPr marL="342900" indent="-342900" algn="l">
+              <a:buFont typeface="Arial" panose="020B0604020202020204" pitchFamily="34" charset="0"/>
+              <a:buChar char="•"/>
+            </a:pPr>
             <a:r>
               <a:rPr lang="en-US" sz="2000" b="0" i="0" dirty="0">
-                <a:solidFill>
-                  <a:srgbClr val="374151"/>
-                </a:solidFill>
                 <a:effectLst/>
                 <a:latin typeface="Söhne"/>
               </a:rPr>
@@ -3614,9 +4495,6 @@
             </a:r>
             <a:r>
               <a:rPr lang="en-US" sz="2000" b="0" i="0" dirty="0">
-                <a:solidFill>
-                  <a:srgbClr val="374151"/>
-                </a:solidFill>
                 <a:effectLst/>
                 <a:latin typeface="Times New Roman" panose="02020603050405020304" pitchFamily="18" charset="0"/>
                 <a:cs typeface="Times New Roman" panose="02020603050405020304" pitchFamily="18" charset="0"/>
@@ -3625,29 +4503,24 @@
             </a:r>
             <a:r>
               <a:rPr lang="en-US" sz="2000" b="0" i="0" dirty="0">
-                <a:solidFill>
-                  <a:srgbClr val="374151"/>
-                </a:solidFill>
                 <a:effectLst/>
                 <a:latin typeface="Söhne"/>
               </a:rPr>
-              <a:t> sequences with double data-type are stored in an excel file, which is used as the input sequence file for the model to train itself by storing these values in temporal memory. The model then predicts the next element of the predicted sequence based on the patterns learned from the previous sequences. The sequences are typically represented as Sparse Distributed Representations (SDRs), which are similar to binary vectors.</a:t>
-            </a:r>
-          </a:p>
-          <a:p>
-            <a:pPr algn="l"/>
+              <a:t> sequences with double data-type are stored in an excel file, which is used as the input sequence file for the model to train itself by storing these values in temporal memory. </a:t>
+            </a:r>
+          </a:p>
+          <a:p>
+            <a:pPr marL="342900" indent="-342900" algn="l">
+              <a:buFont typeface="Arial" panose="020B0604020202020204" pitchFamily="34" charset="0"/>
+              <a:buChar char="•"/>
+            </a:pPr>
             <a:r>
               <a:rPr lang="en-US" sz="2000" b="0" i="0" dirty="0">
-                <a:solidFill>
-                  <a:srgbClr val="374151"/>
-                </a:solidFill>
                 <a:effectLst/>
                 <a:latin typeface="Söhne"/>
               </a:rPr>
-              <a:t>The aim of multisequence learning is to demonstrate how to learn sequences using a predictor's own method and save all the sequences as a Dictionary object, which is then considered as the training data. This allows the model to learn from a variety of sequences and generalize its predictions to new sequences it has not seen before.</a:t>
-            </a:r>
-          </a:p>
-          <a:p>
+              <a:t>The model then predicts the next element of the predicted sequence based on the patterns learned from the previous sequences. </a:t>
+            </a:r>
             <a:endParaRPr lang="en-IN" sz="2000" dirty="0"/>
           </a:p>
         </p:txBody>
@@ -3746,212 +4619,170 @@
           </a:bodyPr>
           <a:lstStyle/>
           <a:p>
-            <a:pPr marL="742950" lvl="1" indent="-285750" algn="l" fontAlgn="base">
-              <a:spcBef>
-                <a:spcPts val="600"/>
-              </a:spcBef>
-              <a:spcAft>
-                <a:spcPts val="300"/>
-              </a:spcAft>
-              <a:buSzPts val="1000"/>
-              <a:buFont typeface="Times New Roman" panose="02020603050405020304" pitchFamily="18" charset="0"/>
-              <a:buAutoNum type="alphaUcPeriod"/>
-              <a:tabLst>
-                <a:tab pos="182880" algn="l"/>
-              </a:tabLst>
-            </a:pPr>
-            <a:r>
-              <a:rPr lang="en-US" b="1" i="1" u="none" strike="noStrike" dirty="0" err="1">
-                <a:effectLst/>
-                <a:latin typeface="Times New Roman" panose="02020603050405020304" pitchFamily="18" charset="0"/>
-              </a:rPr>
-              <a:t>GetInputFromTextFile</a:t>
-            </a:r>
-            <a:r>
-              <a:rPr lang="en-US" b="1" i="1" u="none" strike="noStrike" dirty="0">
-                <a:effectLst/>
-                <a:latin typeface="Times New Roman" panose="02020603050405020304" pitchFamily="18" charset="0"/>
-              </a:rPr>
-              <a:t>( ): </a:t>
-            </a:r>
-            <a:endParaRPr lang="en-IN" b="1" i="1" u="none" strike="noStrike" dirty="0">
-              <a:effectLst/>
-              <a:latin typeface="Times New Roman" panose="02020603050405020304" pitchFamily="18" charset="0"/>
-            </a:endParaRPr>
-          </a:p>
-          <a:p>
             <a:pPr algn="l"/>
-            <a:r>
-              <a:rPr lang="en-US" sz="2000" dirty="0">
+            <a:endParaRPr lang="en-IN" sz="2000" dirty="0"/>
+          </a:p>
+          <a:p>
+            <a:pPr algn="l"/>
+            <a:r>
+              <a:rPr lang="en-IN" sz="2000" dirty="0"/>
+              <a:t>The Multisequence Learning experiment executes in two phases:</a:t>
+            </a:r>
+          </a:p>
+          <a:p>
+            <a:pPr marL="457200" indent="-457200" algn="l">
+              <a:buAutoNum type="arabicPeriod"/>
+            </a:pPr>
+            <a:r>
+              <a:rPr lang="en-IN" sz="2000" dirty="0"/>
+              <a:t>Learning/Training Phase:</a:t>
+            </a:r>
+          </a:p>
+          <a:p>
+            <a:pPr marL="457200" indent="-457200" algn="l">
+              <a:buAutoNum type="arabicPeriod"/>
+            </a:pPr>
+            <a:endParaRPr lang="en-IN" sz="2000" dirty="0"/>
+          </a:p>
+        </p:txBody>
+      </p:sp>
+      <p:pic>
+        <p:nvPicPr>
+          <p:cNvPr id="6" name="Picture 5" descr="Diagram&#10;&#10;Description automatically generated">
+            <a:extLst>
+              <a:ext uri="{FF2B5EF4-FFF2-40B4-BE49-F238E27FC236}">
+                <a16:creationId xmlns:a16="http://schemas.microsoft.com/office/drawing/2014/main" id="{9C7F3941-C5A4-105F-5E84-9DC3DDFACD65}"/>
+              </a:ext>
+            </a:extLst>
+          </p:cNvPr>
+          <p:cNvPicPr>
+            <a:picLocks noChangeAspect="1"/>
+          </p:cNvPicPr>
+          <p:nvPr/>
+        </p:nvPicPr>
+        <p:blipFill>
+          <a:blip r:embed="rId2">
+            <a:extLst>
+              <a:ext uri="{28A0092B-C50C-407E-A947-70E740481C1C}">
+                <a14:useLocalDpi xmlns:a14="http://schemas.microsoft.com/office/drawing/2010/main" val="0"/>
+              </a:ext>
+            </a:extLst>
+          </a:blip>
+          <a:stretch>
+            <a:fillRect/>
+          </a:stretch>
+        </p:blipFill>
+        <p:spPr>
+          <a:xfrm>
+            <a:off x="931325" y="2293034"/>
+            <a:ext cx="3584404" cy="3981157"/>
+          </a:xfrm>
+          <a:prstGeom prst="rect">
+            <a:avLst/>
+          </a:prstGeom>
+        </p:spPr>
+      </p:pic>
+      <p:sp>
+        <p:nvSpPr>
+          <p:cNvPr id="9" name="TextBox 8">
+            <a:extLst>
+              <a:ext uri="{FF2B5EF4-FFF2-40B4-BE49-F238E27FC236}">
+                <a16:creationId xmlns:a16="http://schemas.microsoft.com/office/drawing/2014/main" id="{236D09C6-295F-BA81-3E10-2446D5F96EA0}"/>
+              </a:ext>
+            </a:extLst>
+          </p:cNvPr>
+          <p:cNvSpPr txBox="1"/>
+          <p:nvPr/>
+        </p:nvSpPr>
+        <p:spPr>
+          <a:xfrm>
+            <a:off x="5875988" y="2239026"/>
+            <a:ext cx="4332850" cy="3693319"/>
+          </a:xfrm>
+          <a:prstGeom prst="rect">
+            <a:avLst/>
+          </a:prstGeom>
+          <a:noFill/>
+        </p:spPr>
+        <p:txBody>
+          <a:bodyPr wrap="square" rtlCol="0">
+            <a:spAutoFit/>
+          </a:bodyPr>
+          <a:lstStyle/>
+          <a:p>
+            <a:pPr marL="285750" indent="-285750">
+              <a:buFont typeface="Courier New" panose="02070309020205020404" pitchFamily="49" charset="0"/>
+              <a:buChar char="o"/>
+            </a:pPr>
+            <a:r>
+              <a:rPr lang="en-US" sz="1800" dirty="0">
                 <a:effectLst/>
                 <a:latin typeface="Times New Roman" panose="02020603050405020304" pitchFamily="18" charset="0"/>
                 <a:ea typeface="SimSun" panose="02010600030101010101" pitchFamily="2" charset="-122"/>
               </a:rPr>
-              <a:t>      Team has implemented </a:t>
-            </a:r>
-            <a:r>
-              <a:rPr lang="en-US" sz="2000" i="1" dirty="0" err="1">
+              <a:t>In learning phase input data sequences are getting passed to </a:t>
+            </a:r>
+            <a:r>
+              <a:rPr lang="en-US" sz="1800" i="1" dirty="0">
                 <a:effectLst/>
                 <a:latin typeface="Times New Roman" panose="02020603050405020304" pitchFamily="18" charset="0"/>
                 <a:ea typeface="SimSun" panose="02010600030101010101" pitchFamily="2" charset="-122"/>
               </a:rPr>
-              <a:t>GetInputFromTextFile</a:t>
-            </a:r>
-            <a:r>
-              <a:rPr lang="en-US" sz="2000" i="1" dirty="0">
+              <a:t>RunExperiment()</a:t>
+            </a:r>
+            <a:r>
+              <a:rPr lang="en-US" sz="1800" dirty="0">
                 <a:effectLst/>
                 <a:latin typeface="Times New Roman" panose="02020603050405020304" pitchFamily="18" charset="0"/>
                 <a:ea typeface="SimSun" panose="02010600030101010101" pitchFamily="2" charset="-122"/>
               </a:rPr>
-              <a:t>()</a:t>
-            </a:r>
-            <a:r>
-              <a:rPr lang="en-US" sz="2000" dirty="0">
+              <a:t> method. </a:t>
+            </a:r>
+          </a:p>
+          <a:p>
+            <a:pPr marL="285750" indent="-285750">
+              <a:buFont typeface="Courier New" panose="02070309020205020404" pitchFamily="49" charset="0"/>
+              <a:buChar char="o"/>
+            </a:pPr>
+            <a:r>
+              <a:rPr lang="en-US" sz="1800" dirty="0">
                 <a:effectLst/>
                 <a:latin typeface="Times New Roman" panose="02020603050405020304" pitchFamily="18" charset="0"/>
                 <a:ea typeface="SimSun" panose="02010600030101010101" pitchFamily="2" charset="-122"/>
               </a:rPr>
-              <a:t> method to take the inputs from the Text file. We have tried 2 approaches to split the multiple input sequences by using comma ‘,’ to separate each digit of the input sequence and using special character at the end of each sequence for splitting it from other input sequences. In this case we used semi-colon ‘;’ to split. The significant issue we faced by using this approach is we had to add both comma ‘,’ and semi-colon ‘;’ at the end of each input sequence, which is not a feasible solution and by which text file also looks inappropriate.</a:t>
-            </a:r>
-            <a:endParaRPr lang="en-IN" sz="2000" dirty="0">
-              <a:effectLst/>
-              <a:latin typeface="Times New Roman" panose="02020603050405020304" pitchFamily="18" charset="0"/>
-              <a:ea typeface="SimSun" panose="02010600030101010101" pitchFamily="2" charset="-122"/>
-            </a:endParaRPr>
-          </a:p>
-          <a:p>
-            <a:pPr algn="l"/>
-            <a:r>
-              <a:rPr lang="en-US" sz="2000" dirty="0">
+              <a:t>In </a:t>
+            </a:r>
+            <a:r>
+              <a:rPr lang="en-US" sz="1800" i="1" dirty="0">
                 <a:effectLst/>
                 <a:latin typeface="Times New Roman" panose="02020603050405020304" pitchFamily="18" charset="0"/>
                 <a:ea typeface="SimSun" panose="02010600030101010101" pitchFamily="2" charset="-122"/>
               </a:rPr>
-              <a:t>     To resolve issue, we faced in the first approach we used regular expression to split multiple sequences based on detecting the enter ‘/r/n’. Using this approach wherever we added enter for next input, is getting detected by our regular expression logic. For this we had to read all the rows together using </a:t>
-            </a:r>
-            <a:r>
-              <a:rPr lang="en-US" sz="2000" i="1" dirty="0" err="1">
+              <a:t>RunExperiment()</a:t>
+            </a:r>
+            <a:r>
+              <a:rPr lang="en-US" sz="1800" dirty="0">
                 <a:effectLst/>
                 <a:latin typeface="Times New Roman" panose="02020603050405020304" pitchFamily="18" charset="0"/>
                 <a:ea typeface="SimSun" panose="02010600030101010101" pitchFamily="2" charset="-122"/>
               </a:rPr>
-              <a:t>reader.ReadToEnd</a:t>
-            </a:r>
-            <a:r>
-              <a:rPr lang="en-US" sz="2000" i="1" dirty="0">
+              <a:t> method training of input sequences is done using Cortex Layer, Spatial Pooler, Homeostatic Plasticity Controller which checks the stability of spatial pooler.</a:t>
+            </a:r>
+          </a:p>
+          <a:p>
+            <a:pPr marL="285750" indent="-285750">
+              <a:buFont typeface="Courier New" panose="02070309020205020404" pitchFamily="49" charset="0"/>
+              <a:buChar char="o"/>
+            </a:pPr>
+            <a:r>
+              <a:rPr lang="en-US" sz="1800" dirty="0">
                 <a:effectLst/>
                 <a:latin typeface="Times New Roman" panose="02020603050405020304" pitchFamily="18" charset="0"/>
                 <a:ea typeface="SimSun" panose="02010600030101010101" pitchFamily="2" charset="-122"/>
               </a:rPr>
-              <a:t>( )</a:t>
-            </a:r>
-            <a:r>
-              <a:rPr lang="en-US" sz="2000" dirty="0">
-                <a:effectLst/>
-                <a:latin typeface="Times New Roman" panose="02020603050405020304" pitchFamily="18" charset="0"/>
-                <a:ea typeface="SimSun" panose="02010600030101010101" pitchFamily="2" charset="-122"/>
-              </a:rPr>
-              <a:t> method and then split it by detecting the enter keyword. This can cause an issue in real time working environment.</a:t>
-            </a:r>
-            <a:endParaRPr lang="en-IN" sz="2000" dirty="0">
-              <a:effectLst/>
-              <a:latin typeface="Times New Roman" panose="02020603050405020304" pitchFamily="18" charset="0"/>
-              <a:ea typeface="SimSun" panose="02010600030101010101" pitchFamily="2" charset="-122"/>
-            </a:endParaRPr>
-          </a:p>
-          <a:p>
-            <a:pPr marL="742950" lvl="1" indent="-285750" algn="l" fontAlgn="base">
-              <a:spcBef>
-                <a:spcPts val="600"/>
-              </a:spcBef>
-              <a:spcAft>
-                <a:spcPts val="300"/>
-              </a:spcAft>
-              <a:buSzPts val="1000"/>
-              <a:buFont typeface="Times New Roman" panose="02020603050405020304" pitchFamily="18" charset="0"/>
-              <a:buAutoNum type="alphaUcPeriod"/>
-              <a:tabLst>
-                <a:tab pos="182880" algn="l"/>
-              </a:tabLst>
-            </a:pPr>
-            <a:r>
-              <a:rPr lang="en-US" b="1" i="1" u="none" strike="noStrike" dirty="0" err="1">
-                <a:effectLst/>
-                <a:latin typeface="Times New Roman" panose="02020603050405020304" pitchFamily="18" charset="0"/>
-              </a:rPr>
-              <a:t>GetInputFromCsvFile</a:t>
-            </a:r>
-            <a:r>
-              <a:rPr lang="en-US" b="1" i="1" u="none" strike="noStrike" dirty="0">
-                <a:effectLst/>
-                <a:latin typeface="Times New Roman" panose="02020603050405020304" pitchFamily="18" charset="0"/>
-              </a:rPr>
-              <a:t>( ):</a:t>
-            </a:r>
-            <a:endParaRPr lang="en-IN" b="1" i="1" u="none" strike="noStrike" dirty="0">
-              <a:effectLst/>
-              <a:latin typeface="Times New Roman" panose="02020603050405020304" pitchFamily="18" charset="0"/>
-            </a:endParaRPr>
-          </a:p>
-          <a:p>
-            <a:pPr indent="182880" algn="l"/>
-            <a:r>
-              <a:rPr lang="en-US" sz="2000" dirty="0">
-                <a:effectLst/>
-                <a:latin typeface="Times New Roman" panose="02020603050405020304" pitchFamily="18" charset="0"/>
-                <a:ea typeface="SimSun" panose="02010600030101010101" pitchFamily="2" charset="-122"/>
-              </a:rPr>
-              <a:t>Team has implemented </a:t>
-            </a:r>
-            <a:r>
-              <a:rPr lang="en-US" sz="2000" i="1" dirty="0" err="1">
-                <a:effectLst/>
-                <a:latin typeface="Times New Roman" panose="02020603050405020304" pitchFamily="18" charset="0"/>
-                <a:ea typeface="SimSun" panose="02010600030101010101" pitchFamily="2" charset="-122"/>
-              </a:rPr>
-              <a:t>GetInputFromCsvFile</a:t>
-            </a:r>
-            <a:r>
-              <a:rPr lang="en-US" sz="2000" i="1" dirty="0">
-                <a:effectLst/>
-                <a:latin typeface="Times New Roman" panose="02020603050405020304" pitchFamily="18" charset="0"/>
-                <a:ea typeface="SimSun" panose="02010600030101010101" pitchFamily="2" charset="-122"/>
-              </a:rPr>
-              <a:t>( )</a:t>
-            </a:r>
-            <a:r>
-              <a:rPr lang="en-US" sz="2000" dirty="0">
-                <a:effectLst/>
-                <a:latin typeface="Times New Roman" panose="02020603050405020304" pitchFamily="18" charset="0"/>
-                <a:ea typeface="SimSun" panose="02010600030101010101" pitchFamily="2" charset="-122"/>
-              </a:rPr>
-              <a:t> method to take the inputs from the CSV file. CSV stands for "Comma-Separated Values". In a CSV file, each line represents a row of data and each field within a row is separated by a comma. CSV files are simple and widely supported, making them a popular choice for data exchange between different systems and </a:t>
-            </a:r>
-            <a:r>
-              <a:rPr lang="en-US" sz="2000" dirty="0" err="1">
-                <a:effectLst/>
-                <a:latin typeface="Times New Roman" panose="02020603050405020304" pitchFamily="18" charset="0"/>
-                <a:ea typeface="SimSun" panose="02010600030101010101" pitchFamily="2" charset="-122"/>
-              </a:rPr>
-              <a:t>applications.The</a:t>
-            </a:r>
-            <a:r>
-              <a:rPr lang="en-US" sz="2000" dirty="0">
-                <a:effectLst/>
-                <a:latin typeface="Times New Roman" panose="02020603050405020304" pitchFamily="18" charset="0"/>
-                <a:ea typeface="SimSun" panose="02010600030101010101" pitchFamily="2" charset="-122"/>
-              </a:rPr>
-              <a:t> problem with CSV file is we need to add one non double character at end of each row to terminate the row/sequence and take the next sequence. This can cause an issue in real time working environment.</a:t>
-            </a:r>
-            <a:endParaRPr lang="en-IN" sz="2000" dirty="0">
-              <a:effectLst/>
-              <a:latin typeface="Times New Roman" panose="02020603050405020304" pitchFamily="18" charset="0"/>
-              <a:ea typeface="SimSun" panose="02010600030101010101" pitchFamily="2" charset="-122"/>
-            </a:endParaRPr>
-          </a:p>
-          <a:p>
-            <a:pPr algn="l"/>
-            <a:endParaRPr lang="en-IN" sz="2000" dirty="0"/>
+              <a:t>Training of input sequences is required to get the stable state of Spatial pooler. Newborn cycles are generated for each input sequence till the time Spatial pooler reach the stable state. </a:t>
+            </a:r>
+            <a:endParaRPr lang="en-US" dirty="0"/>
           </a:p>
         </p:txBody>
       </p:sp>
@@ -3987,10 +4818,46 @@
       </p:grpSpPr>
       <p:sp>
         <p:nvSpPr>
+          <p:cNvPr id="2" name="Title 1">
+            <a:extLst>
+              <a:ext uri="{FF2B5EF4-FFF2-40B4-BE49-F238E27FC236}">
+                <a16:creationId xmlns:a16="http://schemas.microsoft.com/office/drawing/2014/main" id="{C0185AB2-1AC0-838F-C66A-6ECBA5C94831}"/>
+              </a:ext>
+            </a:extLst>
+          </p:cNvPr>
+          <p:cNvSpPr>
+            <a:spLocks noGrp="1"/>
+          </p:cNvSpPr>
+          <p:nvPr>
+            <p:ph type="ctrTitle"/>
+          </p:nvPr>
+        </p:nvSpPr>
+        <p:spPr>
+          <a:xfrm>
+            <a:off x="1497563" y="158620"/>
+            <a:ext cx="9144000" cy="883719"/>
+          </a:xfrm>
+        </p:spPr>
+        <p:txBody>
+          <a:bodyPr>
+            <a:normAutofit fontScale="90000"/>
+          </a:bodyPr>
+          <a:lstStyle/>
+          <a:p>
+            <a:r>
+              <a:rPr lang="en-US" dirty="0"/>
+              <a:t>Methodology</a:t>
+            </a:r>
+            <a:endParaRPr lang="en-IN" dirty="0"/>
+          </a:p>
+        </p:txBody>
+      </p:sp>
+      <p:sp>
+        <p:nvSpPr>
           <p:cNvPr id="3" name="Subtitle 2">
             <a:extLst>
               <a:ext uri="{FF2B5EF4-FFF2-40B4-BE49-F238E27FC236}">
-                <a16:creationId xmlns:a16="http://schemas.microsoft.com/office/drawing/2014/main" id="{1231D98C-48E5-E8B3-62FF-15CAF381F4C1}"/>
+                <a16:creationId xmlns:a16="http://schemas.microsoft.com/office/drawing/2014/main" id="{F40D817C-2D47-F9EC-B8CA-1150B27E0B4F}"/>
               </a:ext>
             </a:extLst>
           </p:cNvPr>
@@ -4003,8 +4870,8 @@
         </p:nvSpPr>
         <p:spPr>
           <a:xfrm>
-            <a:off x="317241" y="167951"/>
-            <a:ext cx="11541967" cy="6176865"/>
+            <a:off x="326571" y="1042339"/>
+            <a:ext cx="11485984" cy="5657041"/>
           </a:xfrm>
         </p:spPr>
         <p:txBody>
@@ -4013,532 +4880,255 @@
           </a:bodyPr>
           <a:lstStyle/>
           <a:p>
-            <a:pPr lvl="1" algn="l" fontAlgn="base">
+            <a:pPr algn="l"/>
+            <a:endParaRPr lang="en-IN" sz="2000" dirty="0"/>
+          </a:p>
+          <a:p>
+            <a:pPr algn="l"/>
+            <a:r>
+              <a:rPr lang="en-IN" sz="2000" dirty="0"/>
+              <a:t>2. Prediction and Accuracy Calculation phase:</a:t>
+            </a:r>
+          </a:p>
+          <a:p>
+            <a:pPr algn="l"/>
+            <a:endParaRPr lang="en-IN" sz="2000" dirty="0"/>
+          </a:p>
+          <a:p>
+            <a:pPr marL="457200" indent="-457200" algn="l">
+              <a:buAutoNum type="arabicPeriod"/>
+            </a:pPr>
+            <a:endParaRPr lang="en-IN" sz="2000" dirty="0"/>
+          </a:p>
+        </p:txBody>
+      </p:sp>
+      <p:sp>
+        <p:nvSpPr>
+          <p:cNvPr id="9" name="TextBox 8">
+            <a:extLst>
+              <a:ext uri="{FF2B5EF4-FFF2-40B4-BE49-F238E27FC236}">
+                <a16:creationId xmlns:a16="http://schemas.microsoft.com/office/drawing/2014/main" id="{236D09C6-295F-BA81-3E10-2446D5F96EA0}"/>
+              </a:ext>
+            </a:extLst>
+          </p:cNvPr>
+          <p:cNvSpPr txBox="1"/>
+          <p:nvPr/>
+        </p:nvSpPr>
+        <p:spPr>
+          <a:xfrm>
+            <a:off x="6308712" y="1926058"/>
+            <a:ext cx="4565613" cy="3693319"/>
+          </a:xfrm>
+          <a:prstGeom prst="rect">
+            <a:avLst/>
+          </a:prstGeom>
+          <a:noFill/>
+        </p:spPr>
+        <p:txBody>
+          <a:bodyPr wrap="square" rtlCol="0">
+            <a:spAutoFit/>
+          </a:bodyPr>
+          <a:lstStyle/>
+          <a:p>
+            <a:pPr marL="422910" marR="0" indent="-285750" algn="just">
               <a:spcBef>
-                <a:spcPts val="600"/>
+                <a:spcPts val="0"/>
               </a:spcBef>
               <a:spcAft>
-                <a:spcPts val="300"/>
+                <a:spcPts val="0"/>
               </a:spcAft>
-              <a:buSzPts val="1000"/>
-              <a:tabLst>
-                <a:tab pos="182880" algn="l"/>
-              </a:tabLst>
-            </a:pPr>
-            <a:endParaRPr lang="en-US" b="1" i="1" u="none" strike="noStrike" dirty="0">
-              <a:effectLst/>
-              <a:latin typeface="Times New Roman" panose="02020603050405020304" pitchFamily="18" charset="0"/>
-              <a:cs typeface="Times New Roman" panose="02020603050405020304" pitchFamily="18" charset="0"/>
-            </a:endParaRPr>
-          </a:p>
-          <a:p>
-            <a:pPr marL="742950" lvl="1" indent="-285750" algn="l" fontAlgn="base">
-              <a:spcBef>
-                <a:spcPts val="600"/>
-              </a:spcBef>
-              <a:spcAft>
-                <a:spcPts val="300"/>
-              </a:spcAft>
-              <a:buSzPts val="1000"/>
-              <a:buFont typeface="Times New Roman" panose="02020603050405020304" pitchFamily="18" charset="0"/>
-              <a:buAutoNum type="alphaUcPeriod"/>
-              <a:tabLst>
-                <a:tab pos="182880" algn="l"/>
-              </a:tabLst>
-            </a:pPr>
-            <a:r>
-              <a:rPr lang="en-US" b="1" i="1" u="none" strike="noStrike" dirty="0" err="1">
-                <a:effectLst/>
-                <a:latin typeface="Times New Roman" panose="02020603050405020304" pitchFamily="18" charset="0"/>
-                <a:cs typeface="Times New Roman" panose="02020603050405020304" pitchFamily="18" charset="0"/>
-              </a:rPr>
-              <a:t>GetInputFromExcelFile</a:t>
-            </a:r>
-            <a:r>
-              <a:rPr lang="en-US" b="1" i="1" u="none" strike="noStrike" dirty="0">
-                <a:effectLst/>
-                <a:latin typeface="Times New Roman" panose="02020603050405020304" pitchFamily="18" charset="0"/>
-                <a:cs typeface="Times New Roman" panose="02020603050405020304" pitchFamily="18" charset="0"/>
-              </a:rPr>
-              <a:t>( ):</a:t>
-            </a:r>
-            <a:endParaRPr lang="en-IN" b="1" i="1" u="none" strike="noStrike" dirty="0">
-              <a:effectLst/>
-              <a:latin typeface="Times New Roman" panose="02020603050405020304" pitchFamily="18" charset="0"/>
-              <a:cs typeface="Times New Roman" panose="02020603050405020304" pitchFamily="18" charset="0"/>
-            </a:endParaRPr>
-          </a:p>
-          <a:p>
-            <a:pPr indent="182880" algn="l"/>
-            <a:r>
-              <a:rPr lang="en-US" sz="2000" dirty="0">
+              <a:buFont typeface="Courier New" panose="02070309020205020404" pitchFamily="49" charset="0"/>
+              <a:buChar char="o"/>
+            </a:pPr>
+            <a:r>
+              <a:rPr lang="en-US" sz="1800" i="1" dirty="0" err="1">
                 <a:effectLst/>
                 <a:latin typeface="Times New Roman" panose="02020603050405020304" pitchFamily="18" charset="0"/>
                 <a:ea typeface="SimSun" panose="02010600030101010101" pitchFamily="2" charset="-122"/>
-                <a:cs typeface="Times New Roman" panose="02020603050405020304" pitchFamily="18" charset="0"/>
-              </a:rPr>
-              <a:t>In the </a:t>
-            </a:r>
-            <a:r>
-              <a:rPr lang="en-US" sz="2000" i="1" dirty="0" err="1">
+              </a:rPr>
+              <a:t>PredictNextElement</a:t>
+            </a:r>
+            <a:r>
+              <a:rPr lang="en-US" sz="1800" i="1" dirty="0">
                 <a:effectLst/>
                 <a:latin typeface="Times New Roman" panose="02020603050405020304" pitchFamily="18" charset="0"/>
                 <a:ea typeface="SimSun" panose="02010600030101010101" pitchFamily="2" charset="-122"/>
-                <a:cs typeface="Times New Roman" panose="02020603050405020304" pitchFamily="18" charset="0"/>
-              </a:rPr>
-              <a:t>GetInputFromExcelFile</a:t>
-            </a:r>
-            <a:r>
-              <a:rPr lang="en-US" sz="2000" i="1" dirty="0">
+              </a:rPr>
+              <a:t>()</a:t>
+            </a:r>
+            <a:r>
+              <a:rPr lang="en-US" sz="1800" dirty="0">
                 <a:effectLst/>
                 <a:latin typeface="Times New Roman" panose="02020603050405020304" pitchFamily="18" charset="0"/>
                 <a:ea typeface="SimSun" panose="02010600030101010101" pitchFamily="2" charset="-122"/>
-                <a:cs typeface="Times New Roman" panose="02020603050405020304" pitchFamily="18" charset="0"/>
-              </a:rPr>
-              <a:t>( )</a:t>
-            </a:r>
-            <a:r>
-              <a:rPr lang="en-US" sz="2000" dirty="0">
+              </a:rPr>
+              <a:t> method and Predictor class is used for prediction.</a:t>
+            </a:r>
+          </a:p>
+          <a:p>
+            <a:pPr marL="422910" marR="0" indent="-285750" algn="just">
+              <a:spcBef>
+                <a:spcPts val="0"/>
+              </a:spcBef>
+              <a:spcAft>
+                <a:spcPts val="0"/>
+              </a:spcAft>
+              <a:buFont typeface="Courier New" panose="02070309020205020404" pitchFamily="49" charset="0"/>
+              <a:buChar char="o"/>
+            </a:pPr>
+            <a:r>
+              <a:rPr lang="en-US" sz="1800" dirty="0">
                 <a:effectLst/>
                 <a:latin typeface="Times New Roman" panose="02020603050405020304" pitchFamily="18" charset="0"/>
                 <a:ea typeface="SimSun" panose="02010600030101010101" pitchFamily="2" charset="-122"/>
-                <a:cs typeface="Times New Roman" panose="02020603050405020304" pitchFamily="18" charset="0"/>
-              </a:rPr>
-              <a:t> method we are using .xlsx file type to take the input sequences. Which are referred as training data sequences. Here we overcame the issues of the previous methods </a:t>
-            </a:r>
-            <a:r>
-              <a:rPr lang="en-US" sz="2000" i="1" dirty="0" err="1">
+              </a:rPr>
+              <a:t>After the learning process, the algorithm returns the instance of Predictor class. This class provides </a:t>
+            </a:r>
+            <a:r>
+              <a:rPr lang="en-US" sz="1800" i="1" dirty="0">
                 <a:effectLst/>
                 <a:latin typeface="Times New Roman" panose="02020603050405020304" pitchFamily="18" charset="0"/>
                 <a:ea typeface="SimSun" panose="02010600030101010101" pitchFamily="2" charset="-122"/>
-                <a:cs typeface="Times New Roman" panose="02020603050405020304" pitchFamily="18" charset="0"/>
-              </a:rPr>
-              <a:t>GetInputFromCsvFile</a:t>
-            </a:r>
-            <a:r>
-              <a:rPr lang="en-US" sz="2000" i="1" dirty="0">
+              </a:rPr>
+              <a:t>Predict()</a:t>
+            </a:r>
+            <a:r>
+              <a:rPr lang="en-US" sz="1800" dirty="0">
                 <a:effectLst/>
                 <a:latin typeface="Times New Roman" panose="02020603050405020304" pitchFamily="18" charset="0"/>
                 <a:ea typeface="SimSun" panose="02010600030101010101" pitchFamily="2" charset="-122"/>
-                <a:cs typeface="Times New Roman" panose="02020603050405020304" pitchFamily="18" charset="0"/>
-              </a:rPr>
-              <a:t>()</a:t>
-            </a:r>
-            <a:r>
-              <a:rPr lang="en-US" sz="2000" dirty="0">
+              </a:rPr>
+              <a:t> method with a list of input elements.</a:t>
+            </a:r>
+          </a:p>
+          <a:p>
+            <a:pPr marL="422910" marR="0" indent="-285750" algn="just">
+              <a:spcBef>
+                <a:spcPts val="0"/>
+              </a:spcBef>
+              <a:spcAft>
+                <a:spcPts val="0"/>
+              </a:spcAft>
+              <a:buFont typeface="Courier New" panose="02070309020205020404" pitchFamily="49" charset="0"/>
+              <a:buChar char="o"/>
+            </a:pPr>
+            <a:r>
+              <a:rPr lang="en-US" sz="1800" dirty="0">
                 <a:effectLst/>
                 <a:latin typeface="Times New Roman" panose="02020603050405020304" pitchFamily="18" charset="0"/>
                 <a:ea typeface="SimSun" panose="02010600030101010101" pitchFamily="2" charset="-122"/>
-                <a:cs typeface="Times New Roman" panose="02020603050405020304" pitchFamily="18" charset="0"/>
-              </a:rPr>
-              <a:t> and </a:t>
-            </a:r>
-            <a:r>
-              <a:rPr lang="en-US" sz="2000" i="1" dirty="0" err="1">
+              </a:rPr>
+              <a:t>For every presented input element, the predictor tries to predict the next element. </a:t>
+            </a:r>
+          </a:p>
+          <a:p>
+            <a:pPr marL="422910" marR="0" indent="-285750" algn="just">
+              <a:spcBef>
+                <a:spcPts val="0"/>
+              </a:spcBef>
+              <a:spcAft>
+                <a:spcPts val="0"/>
+              </a:spcAft>
+              <a:buFont typeface="Courier New" panose="02070309020205020404" pitchFamily="49" charset="0"/>
+              <a:buChar char="o"/>
+            </a:pPr>
+            <a:r>
+              <a:rPr lang="en-US" dirty="0">
+                <a:latin typeface="Times New Roman" panose="02020603050405020304" pitchFamily="18" charset="0"/>
+                <a:ea typeface="SimSun" panose="02010600030101010101" pitchFamily="2" charset="-122"/>
+              </a:rPr>
+              <a:t>In </a:t>
+            </a:r>
+            <a:r>
+              <a:rPr lang="en-US" sz="1800" i="1" dirty="0" err="1">
                 <a:effectLst/>
                 <a:latin typeface="Times New Roman" panose="02020603050405020304" pitchFamily="18" charset="0"/>
                 <a:ea typeface="SimSun" panose="02010600030101010101" pitchFamily="2" charset="-122"/>
-                <a:cs typeface="Times New Roman" panose="02020603050405020304" pitchFamily="18" charset="0"/>
-              </a:rPr>
-              <a:t>GetInputFromTextFile</a:t>
-            </a:r>
-            <a:r>
-              <a:rPr lang="en-US" sz="2000" i="1" dirty="0">
+              </a:rPr>
+              <a:t>PredictNextElement</a:t>
+            </a:r>
+            <a:r>
+              <a:rPr lang="en-US" sz="1800" i="1" dirty="0">
                 <a:effectLst/>
                 <a:latin typeface="Times New Roman" panose="02020603050405020304" pitchFamily="18" charset="0"/>
                 <a:ea typeface="SimSun" panose="02010600030101010101" pitchFamily="2" charset="-122"/>
-                <a:cs typeface="Times New Roman" panose="02020603050405020304" pitchFamily="18" charset="0"/>
               </a:rPr>
               <a:t>()</a:t>
             </a:r>
             <a:r>
-              <a:rPr lang="en-US" sz="2000" dirty="0">
-                <a:effectLst/>
+              <a:rPr lang="en-US" dirty="0">
                 <a:latin typeface="Times New Roman" panose="02020603050405020304" pitchFamily="18" charset="0"/>
                 <a:ea typeface="SimSun" panose="02010600030101010101" pitchFamily="2" charset="-122"/>
-                <a:cs typeface="Times New Roman" panose="02020603050405020304" pitchFamily="18" charset="0"/>
-              </a:rPr>
-              <a:t> where we need to add any non-double value to terminate the row/sequence and to jump to the next row/sequence and any special in case of text file to jump over the next input sequence. To implement this feature we used the </a:t>
-            </a:r>
-            <a:r>
-              <a:rPr lang="en-US" sz="2000" i="1" dirty="0" err="1">
-                <a:effectLst/>
+              </a:rPr>
+              <a:t> method, team has added implemented below formula to calculate accuracy.</a:t>
+            </a:r>
+          </a:p>
+          <a:p>
+            <a:pPr marL="422910" marR="0" indent="-285750" algn="just">
+              <a:spcBef>
+                <a:spcPts val="0"/>
+              </a:spcBef>
+              <a:spcAft>
+                <a:spcPts val="0"/>
+              </a:spcAft>
+              <a:buFont typeface="Courier New" panose="02070309020205020404" pitchFamily="49" charset="0"/>
+              <a:buChar char="o"/>
+            </a:pPr>
+            <a:r>
+              <a:rPr lang="en-US" dirty="0">
                 <a:latin typeface="Times New Roman" panose="02020603050405020304" pitchFamily="18" charset="0"/>
                 <a:ea typeface="SimSun" panose="02010600030101010101" pitchFamily="2" charset="-122"/>
-                <a:cs typeface="Times New Roman" panose="02020603050405020304" pitchFamily="18" charset="0"/>
-              </a:rPr>
-              <a:t>string.IsNullOrWhiteSpace</a:t>
-            </a:r>
-            <a:r>
-              <a:rPr lang="en-US" sz="2000" i="1" dirty="0">
-                <a:effectLst/>
-                <a:latin typeface="Times New Roman" panose="02020603050405020304" pitchFamily="18" charset="0"/>
-                <a:ea typeface="SimSun" panose="02010600030101010101" pitchFamily="2" charset="-122"/>
-                <a:cs typeface="Times New Roman" panose="02020603050405020304" pitchFamily="18" charset="0"/>
-              </a:rPr>
-              <a:t>( )</a:t>
-            </a:r>
-            <a:r>
-              <a:rPr lang="en-US" sz="2000" dirty="0">
-                <a:effectLst/>
-                <a:latin typeface="Times New Roman" panose="02020603050405020304" pitchFamily="18" charset="0"/>
-                <a:ea typeface="SimSun" panose="02010600030101010101" pitchFamily="2" charset="-122"/>
-                <a:cs typeface="Times New Roman" panose="02020603050405020304" pitchFamily="18" charset="0"/>
-              </a:rPr>
-              <a:t> property. </a:t>
-            </a:r>
-            <a:endParaRPr lang="en-IN" sz="2000" dirty="0">
+              </a:rPr>
+              <a:t>Accuracy = (count of matches/total number of predictions) * 100 %</a:t>
+            </a:r>
+            <a:endParaRPr lang="en-US" dirty="0">
               <a:effectLst/>
               <a:latin typeface="Times New Roman" panose="02020603050405020304" pitchFamily="18" charset="0"/>
               <a:ea typeface="SimSun" panose="02010600030101010101" pitchFamily="2" charset="-122"/>
-              <a:cs typeface="Times New Roman" panose="02020603050405020304" pitchFamily="18" charset="0"/>
             </a:endParaRPr>
           </a:p>
-          <a:p>
-            <a:pPr indent="182880" algn="l"/>
-            <a:r>
-              <a:rPr lang="en-US" sz="2000" dirty="0">
-                <a:effectLst/>
-                <a:latin typeface="Times New Roman" panose="02020603050405020304" pitchFamily="18" charset="0"/>
-                <a:ea typeface="SimSun" panose="02010600030101010101" pitchFamily="2" charset="-122"/>
-                <a:cs typeface="Times New Roman" panose="02020603050405020304" pitchFamily="18" charset="0"/>
-              </a:rPr>
-              <a:t> </a:t>
-            </a:r>
-            <a:endParaRPr lang="en-US" b="1" i="1" dirty="0">
-              <a:latin typeface="Times New Roman" panose="02020603050405020304" pitchFamily="18" charset="0"/>
-              <a:cs typeface="Times New Roman" panose="02020603050405020304" pitchFamily="18" charset="0"/>
-            </a:endParaRPr>
-          </a:p>
-          <a:p>
-            <a:pPr lvl="1" algn="l" fontAlgn="base">
-              <a:spcBef>
-                <a:spcPts val="600"/>
-              </a:spcBef>
-              <a:spcAft>
-                <a:spcPts val="300"/>
-              </a:spcAft>
-              <a:buSzPts val="1000"/>
-              <a:tabLst>
-                <a:tab pos="182880" algn="l"/>
-              </a:tabLst>
-            </a:pPr>
-            <a:r>
-              <a:rPr lang="en-US" b="1" i="1" u="none" strike="noStrike" dirty="0" err="1">
-                <a:effectLst/>
-                <a:latin typeface="Times New Roman" panose="02020603050405020304" pitchFamily="18" charset="0"/>
-                <a:cs typeface="Times New Roman" panose="02020603050405020304" pitchFamily="18" charset="0"/>
-              </a:rPr>
-              <a:t>GetSubSequencesInputFromExcelFile</a:t>
-            </a:r>
-            <a:r>
-              <a:rPr lang="en-US" b="1" i="1" u="none" strike="noStrike" dirty="0">
-                <a:effectLst/>
-                <a:latin typeface="Times New Roman" panose="02020603050405020304" pitchFamily="18" charset="0"/>
-                <a:cs typeface="Times New Roman" panose="02020603050405020304" pitchFamily="18" charset="0"/>
-              </a:rPr>
-              <a:t>( ):</a:t>
-            </a:r>
-            <a:endParaRPr lang="en-IN" b="1" i="1" u="none" strike="noStrike" dirty="0">
-              <a:effectLst/>
-              <a:latin typeface="Times New Roman" panose="02020603050405020304" pitchFamily="18" charset="0"/>
-              <a:cs typeface="Times New Roman" panose="02020603050405020304" pitchFamily="18" charset="0"/>
-            </a:endParaRPr>
-          </a:p>
-          <a:p>
-            <a:pPr indent="182880" algn="l"/>
-            <a:r>
-              <a:rPr lang="en-US" sz="2000" dirty="0">
-                <a:effectLst/>
-                <a:latin typeface="Times New Roman" panose="02020603050405020304" pitchFamily="18" charset="0"/>
-                <a:ea typeface="SimSun" panose="02010600030101010101" pitchFamily="2" charset="-122"/>
-                <a:cs typeface="Times New Roman" panose="02020603050405020304" pitchFamily="18" charset="0"/>
-              </a:rPr>
-              <a:t>We have </a:t>
-            </a:r>
-            <a:r>
-              <a:rPr lang="en-US" sz="2000" dirty="0" err="1">
-                <a:effectLst/>
-                <a:latin typeface="Times New Roman" panose="02020603050405020304" pitchFamily="18" charset="0"/>
-                <a:ea typeface="SimSun" panose="02010600030101010101" pitchFamily="2" charset="-122"/>
-                <a:cs typeface="Times New Roman" panose="02020603050405020304" pitchFamily="18" charset="0"/>
-              </a:rPr>
-              <a:t>implmented</a:t>
-            </a:r>
-            <a:r>
-              <a:rPr lang="en-US" sz="2000" dirty="0">
-                <a:effectLst/>
-                <a:latin typeface="Times New Roman" panose="02020603050405020304" pitchFamily="18" charset="0"/>
-                <a:ea typeface="SimSun" panose="02010600030101010101" pitchFamily="2" charset="-122"/>
-                <a:cs typeface="Times New Roman" panose="02020603050405020304" pitchFamily="18" charset="0"/>
-              </a:rPr>
-              <a:t> the </a:t>
-            </a:r>
-            <a:r>
-              <a:rPr lang="en-US" sz="2000" i="1" dirty="0" err="1">
-                <a:effectLst/>
-                <a:latin typeface="Times New Roman" panose="02020603050405020304" pitchFamily="18" charset="0"/>
-                <a:ea typeface="SimSun" panose="02010600030101010101" pitchFamily="2" charset="-122"/>
-                <a:cs typeface="Times New Roman" panose="02020603050405020304" pitchFamily="18" charset="0"/>
-              </a:rPr>
-              <a:t>GetSubSequencesInputFromExcelFile</a:t>
-            </a:r>
-            <a:r>
-              <a:rPr lang="en-US" sz="2000" i="1" dirty="0">
-                <a:effectLst/>
-                <a:latin typeface="Times New Roman" panose="02020603050405020304" pitchFamily="18" charset="0"/>
-                <a:ea typeface="SimSun" panose="02010600030101010101" pitchFamily="2" charset="-122"/>
-                <a:cs typeface="Times New Roman" panose="02020603050405020304" pitchFamily="18" charset="0"/>
-              </a:rPr>
-              <a:t>()</a:t>
-            </a:r>
-            <a:r>
-              <a:rPr lang="en-US" sz="2000" dirty="0">
-                <a:effectLst/>
-                <a:latin typeface="Times New Roman" panose="02020603050405020304" pitchFamily="18" charset="0"/>
-                <a:ea typeface="SimSun" panose="02010600030101010101" pitchFamily="2" charset="-122"/>
-                <a:cs typeface="Times New Roman" panose="02020603050405020304" pitchFamily="18" charset="0"/>
-              </a:rPr>
-              <a:t> method to take the subsequence test input from the .xlsx file. We are passing the </a:t>
-            </a:r>
-            <a:r>
-              <a:rPr lang="en-US" sz="2000" dirty="0" err="1">
-                <a:effectLst/>
-                <a:latin typeface="Times New Roman" panose="02020603050405020304" pitchFamily="18" charset="0"/>
-                <a:ea typeface="SimSun" panose="02010600030101010101" pitchFamily="2" charset="-122"/>
-                <a:cs typeface="Times New Roman" panose="02020603050405020304" pitchFamily="18" charset="0"/>
-              </a:rPr>
-              <a:t>TestSubSequences</a:t>
-            </a:r>
-            <a:r>
-              <a:rPr lang="en-US" sz="2000" dirty="0">
-                <a:effectLst/>
-                <a:latin typeface="Times New Roman" panose="02020603050405020304" pitchFamily="18" charset="0"/>
-                <a:ea typeface="SimSun" panose="02010600030101010101" pitchFamily="2" charset="-122"/>
-                <a:cs typeface="Times New Roman" panose="02020603050405020304" pitchFamily="18" charset="0"/>
-              </a:rPr>
-              <a:t> to the </a:t>
-            </a:r>
-            <a:r>
-              <a:rPr lang="en-US" sz="2000" dirty="0" err="1">
-                <a:effectLst/>
-                <a:latin typeface="Times New Roman" panose="02020603050405020304" pitchFamily="18" charset="0"/>
-                <a:ea typeface="SimSun" panose="02010600030101010101" pitchFamily="2" charset="-122"/>
-                <a:cs typeface="Times New Roman" panose="02020603050405020304" pitchFamily="18" charset="0"/>
-              </a:rPr>
-              <a:t>SubSequences</a:t>
-            </a:r>
-            <a:r>
-              <a:rPr lang="en-US" sz="2000" dirty="0">
-                <a:effectLst/>
-                <a:latin typeface="Times New Roman" panose="02020603050405020304" pitchFamily="18" charset="0"/>
-                <a:ea typeface="SimSun" panose="02010600030101010101" pitchFamily="2" charset="-122"/>
-                <a:cs typeface="Times New Roman" panose="02020603050405020304" pitchFamily="18" charset="0"/>
-              </a:rPr>
-              <a:t> list of type double. After reading all the </a:t>
-            </a:r>
-            <a:r>
-              <a:rPr lang="en-US" sz="2000" dirty="0" err="1">
-                <a:effectLst/>
-                <a:latin typeface="Times New Roman" panose="02020603050405020304" pitchFamily="18" charset="0"/>
-                <a:ea typeface="SimSun" panose="02010600030101010101" pitchFamily="2" charset="-122"/>
-                <a:cs typeface="Times New Roman" panose="02020603050405020304" pitchFamily="18" charset="0"/>
-              </a:rPr>
-              <a:t>TestSubSequences</a:t>
-            </a:r>
-            <a:r>
-              <a:rPr lang="en-US" sz="2000" dirty="0">
-                <a:effectLst/>
-                <a:latin typeface="Times New Roman" panose="02020603050405020304" pitchFamily="18" charset="0"/>
-                <a:ea typeface="SimSun" panose="02010600030101010101" pitchFamily="2" charset="-122"/>
-                <a:cs typeface="Times New Roman" panose="02020603050405020304" pitchFamily="18" charset="0"/>
-              </a:rPr>
-              <a:t> we are returning </a:t>
-            </a:r>
-            <a:r>
-              <a:rPr lang="en-US" sz="2000" dirty="0" err="1">
-                <a:effectLst/>
-                <a:latin typeface="Times New Roman" panose="02020603050405020304" pitchFamily="18" charset="0"/>
-                <a:ea typeface="SimSun" panose="02010600030101010101" pitchFamily="2" charset="-122"/>
-                <a:cs typeface="Times New Roman" panose="02020603050405020304" pitchFamily="18" charset="0"/>
-              </a:rPr>
-              <a:t>SubSequences</a:t>
-            </a:r>
-            <a:r>
-              <a:rPr lang="en-US" sz="2000" dirty="0">
-                <a:effectLst/>
-                <a:latin typeface="Times New Roman" panose="02020603050405020304" pitchFamily="18" charset="0"/>
-                <a:ea typeface="SimSun" panose="02010600030101010101" pitchFamily="2" charset="-122"/>
-                <a:cs typeface="Times New Roman" panose="02020603050405020304" pitchFamily="18" charset="0"/>
-              </a:rPr>
-              <a:t>.</a:t>
-            </a:r>
-            <a:endParaRPr lang="en-IN" sz="2000" dirty="0">
-              <a:effectLst/>
-              <a:latin typeface="Times New Roman" panose="02020603050405020304" pitchFamily="18" charset="0"/>
-              <a:ea typeface="SimSun" panose="02010600030101010101" pitchFamily="2" charset="-122"/>
-              <a:cs typeface="Times New Roman" panose="02020603050405020304" pitchFamily="18" charset="0"/>
-            </a:endParaRPr>
-          </a:p>
-          <a:p>
-            <a:pPr algn="l"/>
-            <a:r>
-              <a:rPr lang="en-US" sz="2000" dirty="0">
-                <a:effectLst/>
-                <a:latin typeface="Times New Roman" panose="02020603050405020304" pitchFamily="18" charset="0"/>
-                <a:ea typeface="SimSun" panose="02010600030101010101" pitchFamily="2" charset="-122"/>
-                <a:cs typeface="Times New Roman" panose="02020603050405020304" pitchFamily="18" charset="0"/>
-              </a:rPr>
-              <a:t> </a:t>
-            </a:r>
-            <a:endParaRPr lang="en-IN" sz="2000" dirty="0">
-              <a:effectLst/>
-              <a:latin typeface="Times New Roman" panose="02020603050405020304" pitchFamily="18" charset="0"/>
-              <a:ea typeface="SimSun" panose="02010600030101010101" pitchFamily="2" charset="-122"/>
-              <a:cs typeface="Times New Roman" panose="02020603050405020304" pitchFamily="18" charset="0"/>
-            </a:endParaRPr>
-          </a:p>
-          <a:p>
-            <a:pPr marL="742950" lvl="1" indent="-285750" algn="l" fontAlgn="base">
-              <a:spcBef>
-                <a:spcPts val="600"/>
-              </a:spcBef>
-              <a:spcAft>
-                <a:spcPts val="300"/>
-              </a:spcAft>
-              <a:buSzPts val="1000"/>
-              <a:buFont typeface="Times New Roman" panose="02020603050405020304" pitchFamily="18" charset="0"/>
-              <a:buAutoNum type="alphaUcPeriod"/>
-              <a:tabLst>
-                <a:tab pos="182880" algn="l"/>
-              </a:tabLst>
-            </a:pPr>
-            <a:r>
-              <a:rPr lang="en-US" b="1" i="1" u="none" strike="noStrike" dirty="0">
-                <a:effectLst/>
-                <a:latin typeface="Times New Roman" panose="02020603050405020304" pitchFamily="18" charset="0"/>
-                <a:cs typeface="Times New Roman" panose="02020603050405020304" pitchFamily="18" charset="0"/>
-              </a:rPr>
-              <a:t>Accuracy Logs:</a:t>
-            </a:r>
-            <a:endParaRPr lang="en-IN" b="1" i="1" u="none" strike="noStrike" dirty="0">
-              <a:effectLst/>
-              <a:latin typeface="Times New Roman" panose="02020603050405020304" pitchFamily="18" charset="0"/>
-              <a:cs typeface="Times New Roman" panose="02020603050405020304" pitchFamily="18" charset="0"/>
-            </a:endParaRPr>
-          </a:p>
-          <a:p>
-            <a:pPr algn="l"/>
-            <a:r>
-              <a:rPr lang="en-US" sz="2000" dirty="0">
-                <a:effectLst/>
-                <a:latin typeface="Times New Roman" panose="02020603050405020304" pitchFamily="18" charset="0"/>
-                <a:ea typeface="SimSun" panose="02010600030101010101" pitchFamily="2" charset="-122"/>
-                <a:cs typeface="Times New Roman" panose="02020603050405020304" pitchFamily="18" charset="0"/>
-              </a:rPr>
-              <a:t>We have used </a:t>
-            </a:r>
-            <a:r>
-              <a:rPr lang="en-US" sz="2000" i="1" dirty="0" err="1">
-                <a:effectLst/>
-                <a:latin typeface="Times New Roman" panose="02020603050405020304" pitchFamily="18" charset="0"/>
-                <a:ea typeface="SimSun" panose="02010600030101010101" pitchFamily="2" charset="-122"/>
-                <a:cs typeface="Times New Roman" panose="02020603050405020304" pitchFamily="18" charset="0"/>
-              </a:rPr>
-              <a:t>StreamWriter</a:t>
-            </a:r>
-            <a:r>
-              <a:rPr lang="en-US" sz="2000" dirty="0">
-                <a:effectLst/>
-                <a:latin typeface="Times New Roman" panose="02020603050405020304" pitchFamily="18" charset="0"/>
-                <a:ea typeface="SimSun" panose="02010600030101010101" pitchFamily="2" charset="-122"/>
-                <a:cs typeface="Times New Roman" panose="02020603050405020304" pitchFamily="18" charset="0"/>
-              </a:rPr>
-              <a:t>( ) class to create the file. If the file exists, It can be overwritten or appended to. If the file does not exist, this constructor creates a new file. The true flag appends to the file instead of overwriting it. Here we are generating logs for </a:t>
-            </a:r>
-            <a:r>
-              <a:rPr lang="en-US" sz="2000" i="1" dirty="0" err="1">
-                <a:effectLst/>
-                <a:latin typeface="Times New Roman" panose="02020603050405020304" pitchFamily="18" charset="0"/>
-                <a:ea typeface="SimSun" panose="02010600030101010101" pitchFamily="2" charset="-122"/>
-                <a:cs typeface="Times New Roman" panose="02020603050405020304" pitchFamily="18" charset="0"/>
-              </a:rPr>
-              <a:t>sequenceKeyPair.Key</a:t>
-            </a:r>
-            <a:r>
-              <a:rPr lang="en-US" sz="2000" dirty="0">
-                <a:effectLst/>
-                <a:latin typeface="Times New Roman" panose="02020603050405020304" pitchFamily="18" charset="0"/>
-                <a:ea typeface="SimSun" panose="02010600030101010101" pitchFamily="2" charset="-122"/>
-                <a:cs typeface="Times New Roman" panose="02020603050405020304" pitchFamily="18" charset="0"/>
-              </a:rPr>
-              <a:t> and </a:t>
-            </a:r>
-            <a:r>
-              <a:rPr lang="en-US" sz="2000" i="1" dirty="0">
-                <a:effectLst/>
-                <a:latin typeface="Times New Roman" panose="02020603050405020304" pitchFamily="18" charset="0"/>
-                <a:ea typeface="SimSun" panose="02010600030101010101" pitchFamily="2" charset="-122"/>
-                <a:cs typeface="Times New Roman" panose="02020603050405020304" pitchFamily="18" charset="0"/>
-              </a:rPr>
-              <a:t>accuracy</a:t>
-            </a:r>
-            <a:r>
-              <a:rPr lang="en-US" sz="2000" dirty="0">
-                <a:effectLst/>
-                <a:latin typeface="Times New Roman" panose="02020603050405020304" pitchFamily="18" charset="0"/>
-                <a:ea typeface="SimSun" panose="02010600030101010101" pitchFamily="2" charset="-122"/>
-                <a:cs typeface="Times New Roman" panose="02020603050405020304" pitchFamily="18" charset="0"/>
-              </a:rPr>
-              <a:t>. </a:t>
-            </a:r>
-            <a:r>
-              <a:rPr lang="en-US" sz="2000" i="1" dirty="0">
-                <a:effectLst/>
-                <a:latin typeface="Times New Roman" panose="02020603050405020304" pitchFamily="18" charset="0"/>
-                <a:ea typeface="SimSun" panose="02010600030101010101" pitchFamily="2" charset="-122"/>
-                <a:cs typeface="Times New Roman" panose="02020603050405020304" pitchFamily="18" charset="0"/>
-              </a:rPr>
-              <a:t>Ex. Sequence: 1 is having accuracy 30%</a:t>
-            </a:r>
-            <a:endParaRPr lang="en-IN" sz="2000" dirty="0">
-              <a:effectLst/>
-              <a:latin typeface="Times New Roman" panose="02020603050405020304" pitchFamily="18" charset="0"/>
-              <a:ea typeface="SimSun" panose="02010600030101010101" pitchFamily="2" charset="-122"/>
-              <a:cs typeface="Times New Roman" panose="02020603050405020304" pitchFamily="18" charset="0"/>
-            </a:endParaRPr>
-          </a:p>
-          <a:p>
-            <a:pPr algn="l"/>
-            <a:r>
-              <a:rPr lang="en-US" sz="2000" i="1" dirty="0">
-                <a:effectLst/>
-                <a:latin typeface="Times New Roman" panose="02020603050405020304" pitchFamily="18" charset="0"/>
-                <a:ea typeface="SimSun" panose="02010600030101010101" pitchFamily="2" charset="-122"/>
-                <a:cs typeface="Times New Roman" panose="02020603050405020304" pitchFamily="18" charset="0"/>
-              </a:rPr>
-              <a:t> </a:t>
-            </a:r>
-            <a:endParaRPr lang="en-IN" sz="2000" dirty="0">
-              <a:effectLst/>
-              <a:latin typeface="Times New Roman" panose="02020603050405020304" pitchFamily="18" charset="0"/>
-              <a:ea typeface="SimSun" panose="02010600030101010101" pitchFamily="2" charset="-122"/>
-              <a:cs typeface="Times New Roman" panose="02020603050405020304" pitchFamily="18" charset="0"/>
-            </a:endParaRPr>
-          </a:p>
-          <a:p>
-            <a:pPr algn="l"/>
-            <a:endParaRPr lang="en-IN" sz="2000" dirty="0">
-              <a:latin typeface="Times New Roman" panose="02020603050405020304" pitchFamily="18" charset="0"/>
-              <a:cs typeface="Times New Roman" panose="02020603050405020304" pitchFamily="18" charset="0"/>
-            </a:endParaRPr>
-          </a:p>
-        </p:txBody>
-      </p:sp>
+        </p:txBody>
+      </p:sp>
+      <p:pic>
+        <p:nvPicPr>
+          <p:cNvPr id="5" name="Picture 4" descr="Diagram&#10;&#10;Description automatically generated">
+            <a:extLst>
+              <a:ext uri="{FF2B5EF4-FFF2-40B4-BE49-F238E27FC236}">
+                <a16:creationId xmlns:a16="http://schemas.microsoft.com/office/drawing/2014/main" id="{C1C1B4F0-A367-5CE8-423B-CDF0C4939906}"/>
+              </a:ext>
+            </a:extLst>
+          </p:cNvPr>
+          <p:cNvPicPr>
+            <a:picLocks noChangeAspect="1"/>
+          </p:cNvPicPr>
+          <p:nvPr/>
+        </p:nvPicPr>
+        <p:blipFill>
+          <a:blip r:embed="rId2">
+            <a:extLst>
+              <a:ext uri="{28A0092B-C50C-407E-A947-70E740481C1C}">
+                <a14:useLocalDpi xmlns:a14="http://schemas.microsoft.com/office/drawing/2010/main" val="0"/>
+              </a:ext>
+            </a:extLst>
+          </a:blip>
+          <a:stretch>
+            <a:fillRect/>
+          </a:stretch>
+        </p:blipFill>
+        <p:spPr>
+          <a:xfrm>
+            <a:off x="717452" y="1915328"/>
+            <a:ext cx="4684541" cy="4386998"/>
+          </a:xfrm>
+          <a:prstGeom prst="rect">
+            <a:avLst/>
+          </a:prstGeom>
+        </p:spPr>
+      </p:pic>
     </p:spTree>
     <p:extLst>
       <p:ext uri="{BB962C8B-B14F-4D97-AF65-F5344CB8AC3E}">
-        <p14:creationId xmlns:p14="http://schemas.microsoft.com/office/powerpoint/2010/main" val="1361283305"/>
+        <p14:creationId xmlns:p14="http://schemas.microsoft.com/office/powerpoint/2010/main" val="248676150"/>
       </p:ext>
     </p:extLst>
   </p:cSld>
@@ -4570,7 +5160,7 @@
           <p:cNvPr id="2" name="Title 1">
             <a:extLst>
               <a:ext uri="{FF2B5EF4-FFF2-40B4-BE49-F238E27FC236}">
-                <a16:creationId xmlns:a16="http://schemas.microsoft.com/office/drawing/2014/main" id="{93CDC275-56DB-27C6-C85A-06B3C980E705}"/>
+                <a16:creationId xmlns:a16="http://schemas.microsoft.com/office/drawing/2014/main" id="{C0185AB2-1AC0-838F-C66A-6ECBA5C94831}"/>
               </a:ext>
             </a:extLst>
           </p:cNvPr>
@@ -4578,40 +5168,35 @@
             <a:spLocks noGrp="1"/>
           </p:cNvSpPr>
           <p:nvPr>
-            <p:ph type="title"/>
+            <p:ph type="ctrTitle"/>
           </p:nvPr>
         </p:nvSpPr>
         <p:spPr>
           <a:xfrm>
-            <a:off x="838200" y="365126"/>
-            <a:ext cx="10515600" cy="773210"/>
+            <a:off x="1497563" y="158620"/>
+            <a:ext cx="9144000" cy="883719"/>
           </a:xfrm>
         </p:spPr>
         <p:txBody>
           <a:bodyPr>
-            <a:normAutofit/>
+            <a:normAutofit fontScale="90000"/>
           </a:bodyPr>
           <a:lstStyle/>
           <a:p>
             <a:r>
-              <a:rPr lang="en-IN" sz="1800" b="1" u="sng" dirty="0">
-                <a:effectLst/>
-                <a:latin typeface="Calibri" panose="020F0502020204030204" pitchFamily="34" charset="0"/>
-                <a:ea typeface="Calibri" panose="020F0502020204030204" pitchFamily="34" charset="0"/>
-                <a:cs typeface="Times New Roman" panose="02020603050405020304" pitchFamily="18" charset="0"/>
-              </a:rPr>
-              <a:t>Hierarchical Temporal Memory</a:t>
-            </a:r>
-            <a:endParaRPr lang="en-IN" u="sng" dirty="0"/>
-          </a:p>
-        </p:txBody>
-      </p:sp>
-      <p:sp>
-        <p:nvSpPr>
-          <p:cNvPr id="3" name="Content Placeholder 2">
+              <a:rPr lang="en-US" dirty="0"/>
+              <a:t>Methodology</a:t>
+            </a:r>
+            <a:endParaRPr lang="en-IN" dirty="0"/>
+          </a:p>
+        </p:txBody>
+      </p:sp>
+      <p:sp>
+        <p:nvSpPr>
+          <p:cNvPr id="3" name="Subtitle 2">
             <a:extLst>
               <a:ext uri="{FF2B5EF4-FFF2-40B4-BE49-F238E27FC236}">
-                <a16:creationId xmlns:a16="http://schemas.microsoft.com/office/drawing/2014/main" id="{9A3F1674-4EFD-6853-EC88-45F59B311249}"/>
+                <a16:creationId xmlns:a16="http://schemas.microsoft.com/office/drawing/2014/main" id="{F40D817C-2D47-F9EC-B8CA-1150B27E0B4F}"/>
               </a:ext>
             </a:extLst>
           </p:cNvPr>
@@ -4619,59 +5204,187 @@
             <a:spLocks noGrp="1"/>
           </p:cNvSpPr>
           <p:nvPr>
-            <p:ph idx="1"/>
-          </p:nvPr>
-        </p:nvSpPr>
-        <p:spPr/>
-        <p:txBody>
-          <a:bodyPr/>
-          <a:lstStyle/>
-          <a:p>
-            <a:r>
-              <a:rPr lang="en-IN" sz="1800" dirty="0">
+            <p:ph type="subTitle" idx="1"/>
+          </p:nvPr>
+        </p:nvSpPr>
+        <p:spPr>
+          <a:xfrm>
+            <a:off x="326571" y="1042339"/>
+            <a:ext cx="11485984" cy="5657041"/>
+          </a:xfrm>
+        </p:spPr>
+        <p:txBody>
+          <a:bodyPr>
+            <a:noAutofit/>
+          </a:bodyPr>
+          <a:lstStyle/>
+          <a:p>
+            <a:pPr algn="l"/>
+            <a:endParaRPr lang="en-IN" sz="2000" dirty="0"/>
+          </a:p>
+          <a:p>
+            <a:pPr algn="l"/>
+            <a:r>
+              <a:rPr lang="en-IN" sz="2000" dirty="0"/>
+              <a:t>Team has implemented below methods and changes in existing application:</a:t>
+            </a:r>
+          </a:p>
+          <a:p>
+            <a:pPr algn="l"/>
+            <a:endParaRPr lang="en-IN" sz="2000" dirty="0"/>
+          </a:p>
+          <a:p>
+            <a:pPr marL="342900" indent="-342900" algn="l">
+              <a:buAutoNum type="arabicPeriod"/>
+            </a:pPr>
+            <a:r>
+              <a:rPr lang="en-US" sz="1800" dirty="0">
                 <a:effectLst/>
-                <a:latin typeface="Calibri" panose="020F0502020204030204" pitchFamily="34" charset="0"/>
-                <a:ea typeface="Calibri" panose="020F0502020204030204" pitchFamily="34" charset="0"/>
-                <a:cs typeface="Calibri" panose="020F0502020204030204" pitchFamily="34" charset="0"/>
-              </a:rPr>
-              <a:t>In this project we are using - Scalar Encoder </a:t>
-            </a:r>
-            <a:endParaRPr lang="en-IN" sz="1800" dirty="0">
+                <a:latin typeface="Times New Roman" panose="02020603050405020304" pitchFamily="18" charset="0"/>
+                <a:ea typeface="SimSun" panose="02010600030101010101" pitchFamily="2" charset="-122"/>
+              </a:rPr>
+              <a:t>  GetInputFromTextFile( )</a:t>
+            </a:r>
+          </a:p>
+          <a:p>
+            <a:pPr marL="457200" indent="-457200" algn="l">
+              <a:buAutoNum type="arabicPeriod"/>
+            </a:pPr>
+            <a:r>
+              <a:rPr lang="en-US" sz="1800" dirty="0">
+                <a:effectLst/>
+                <a:latin typeface="Times New Roman" panose="02020603050405020304" pitchFamily="18" charset="0"/>
+                <a:ea typeface="SimSun" panose="02010600030101010101" pitchFamily="2" charset="-122"/>
+              </a:rPr>
+              <a:t>GetInputFromCsvFile( )</a:t>
+            </a:r>
+            <a:endParaRPr lang="en-US" sz="1800" dirty="0">
+              <a:latin typeface="Times New Roman" panose="02020603050405020304" pitchFamily="18" charset="0"/>
+              <a:ea typeface="SimSun" panose="02010600030101010101" pitchFamily="2" charset="-122"/>
+            </a:endParaRPr>
+          </a:p>
+          <a:p>
+            <a:pPr marL="457200" indent="-457200" algn="l">
+              <a:buAutoNum type="arabicPeriod"/>
+            </a:pPr>
+            <a:r>
+              <a:rPr lang="en-US" sz="1800" dirty="0">
+                <a:effectLst/>
+                <a:latin typeface="Times New Roman" panose="02020603050405020304" pitchFamily="18" charset="0"/>
+                <a:ea typeface="SimSun" panose="02010600030101010101" pitchFamily="2" charset="-122"/>
+              </a:rPr>
+              <a:t>GetInputFromExcelFile()</a:t>
+            </a:r>
+          </a:p>
+          <a:p>
+            <a:pPr marL="457200" indent="-457200" algn="l">
+              <a:buAutoNum type="arabicPeriod"/>
+            </a:pPr>
+            <a:r>
+              <a:rPr lang="en-US" sz="1800" dirty="0">
+                <a:effectLst/>
+                <a:latin typeface="Times New Roman" panose="02020603050405020304" pitchFamily="18" charset="0"/>
+                <a:ea typeface="SimSun" panose="02010600030101010101" pitchFamily="2" charset="-122"/>
+              </a:rPr>
+              <a:t>GetSubSequencesInputFromExcelFile( )</a:t>
+            </a:r>
+          </a:p>
+          <a:p>
+            <a:pPr marL="457200" indent="-457200" algn="l">
+              <a:buAutoNum type="arabicPeriod"/>
+            </a:pPr>
+            <a:r>
+              <a:rPr lang="en-US" sz="1800" dirty="0">
+                <a:latin typeface="Times New Roman" panose="02020603050405020304" pitchFamily="18" charset="0"/>
+                <a:ea typeface="SimSun" panose="02010600030101010101" pitchFamily="2" charset="-122"/>
+              </a:rPr>
+              <a:t>Accuracy Calculation and writing final accuracy in CSV file.</a:t>
+            </a:r>
+          </a:p>
+          <a:p>
+            <a:pPr marL="457200" indent="-457200" algn="l">
+              <a:buAutoNum type="arabicPeriod"/>
+            </a:pPr>
+            <a:r>
+              <a:rPr lang="en-US" sz="1800" dirty="0">
+                <a:effectLst/>
+                <a:latin typeface="Times New Roman" panose="02020603050405020304" pitchFamily="18" charset="0"/>
+                <a:ea typeface="SimSun" panose="02010600030101010101" pitchFamily="2" charset="-122"/>
+              </a:rPr>
+              <a:t>Encoder Settings updated for min-max valu</a:t>
+            </a:r>
+            <a:r>
+              <a:rPr lang="en-US" sz="1800" dirty="0">
+                <a:latin typeface="Times New Roman" panose="02020603050405020304" pitchFamily="18" charset="0"/>
+                <a:ea typeface="SimSun" panose="02010600030101010101" pitchFamily="2" charset="-122"/>
+              </a:rPr>
+              <a:t>e in the range of 0-99</a:t>
+            </a:r>
+          </a:p>
+          <a:p>
+            <a:pPr marL="457200" indent="-457200" algn="l">
+              <a:buAutoNum type="arabicPeriod"/>
+            </a:pPr>
+            <a:r>
+              <a:rPr lang="en-US" sz="1800" dirty="0">
+                <a:latin typeface="Times New Roman" panose="02020603050405020304" pitchFamily="18" charset="0"/>
+                <a:ea typeface="SimSun" panose="02010600030101010101" pitchFamily="2" charset="-122"/>
+              </a:rPr>
+              <a:t>Utilization of relative file path – In which </a:t>
+            </a:r>
+            <a:r>
+              <a:rPr lang="en-US" sz="1800" i="1" dirty="0">
+                <a:effectLst/>
+                <a:latin typeface="Times New Roman" panose="02020603050405020304" pitchFamily="18" charset="0"/>
+                <a:ea typeface="SimSun" panose="02010600030101010101" pitchFamily="2" charset="-122"/>
+              </a:rPr>
+              <a:t>Environment.CurrentDirectory</a:t>
+            </a:r>
+            <a:r>
+              <a:rPr lang="en-US" sz="1800" dirty="0">
+                <a:effectLst/>
+                <a:latin typeface="Times New Roman" panose="02020603050405020304" pitchFamily="18" charset="0"/>
+                <a:ea typeface="SimSun" panose="02010600030101010101" pitchFamily="2" charset="-122"/>
+              </a:rPr>
+              <a:t> property of  C#, is used for providing input files to methods mentioned above.</a:t>
+            </a:r>
+            <a:endParaRPr lang="en-US" sz="1800" dirty="0">
+              <a:latin typeface="Times New Roman" panose="02020603050405020304" pitchFamily="18" charset="0"/>
+              <a:ea typeface="SimSun" panose="02010600030101010101" pitchFamily="2" charset="-122"/>
+            </a:endParaRPr>
+          </a:p>
+          <a:p>
+            <a:pPr marL="457200" indent="-457200" algn="l">
+              <a:buAutoNum type="arabicPeriod"/>
+            </a:pPr>
+            <a:endParaRPr lang="en-US" sz="1800" dirty="0">
               <a:effectLst/>
-              <a:latin typeface="Calibri" panose="020F0502020204030204" pitchFamily="34" charset="0"/>
-              <a:ea typeface="Calibri" panose="020F0502020204030204" pitchFamily="34" charset="0"/>
-              <a:cs typeface="Times New Roman" panose="02020603050405020304" pitchFamily="18" charset="0"/>
+              <a:latin typeface="Times New Roman" panose="02020603050405020304" pitchFamily="18" charset="0"/>
+              <a:ea typeface="SimSun" panose="02010600030101010101" pitchFamily="2" charset="-122"/>
             </a:endParaRPr>
           </a:p>
           <a:p>
-            <a:pPr marL="0" indent="0">
-              <a:buNone/>
-            </a:pPr>
-            <a:r>
-              <a:rPr lang="en-IN" sz="1800" dirty="0">
-                <a:effectLst/>
-                <a:latin typeface="Calibri" panose="020F0502020204030204" pitchFamily="34" charset="0"/>
-                <a:ea typeface="Calibri" panose="020F0502020204030204" pitchFamily="34" charset="0"/>
-                <a:cs typeface="Calibri" panose="020F0502020204030204" pitchFamily="34" charset="0"/>
-              </a:rPr>
-              <a:t>1. The main purpose for scalar encoder is to encode numeric or floating-point value into an array of bits, where the output has 0’s with an adjacent block of 1’s. The location of the block of 1’s varies continuously depending on the input value.</a:t>
-            </a:r>
-            <a:endParaRPr lang="en-IN" sz="1800" dirty="0">
-              <a:effectLst/>
-              <a:latin typeface="Calibri" panose="020F0502020204030204" pitchFamily="34" charset="0"/>
-              <a:ea typeface="Calibri" panose="020F0502020204030204" pitchFamily="34" charset="0"/>
-              <a:cs typeface="Times New Roman" panose="02020603050405020304" pitchFamily="18" charset="0"/>
-            </a:endParaRPr>
-          </a:p>
-          <a:p>
-            <a:endParaRPr lang="en-IN" dirty="0"/>
+            <a:pPr marL="457200" indent="-457200" algn="l">
+              <a:buAutoNum type="arabicPeriod"/>
+            </a:pPr>
+            <a:endParaRPr lang="en-IN" sz="2000" dirty="0"/>
+          </a:p>
+          <a:p>
+            <a:pPr algn="l"/>
+            <a:endParaRPr lang="en-IN" sz="2000" dirty="0"/>
+          </a:p>
+          <a:p>
+            <a:pPr marL="457200" indent="-457200" algn="l">
+              <a:buAutoNum type="arabicPeriod"/>
+            </a:pPr>
+            <a:endParaRPr lang="en-IN" sz="2000" dirty="0"/>
           </a:p>
         </p:txBody>
       </p:sp>
     </p:spTree>
     <p:extLst>
       <p:ext uri="{BB962C8B-B14F-4D97-AF65-F5344CB8AC3E}">
-        <p14:creationId xmlns:p14="http://schemas.microsoft.com/office/powerpoint/2010/main" val="495733682"/>
+        <p14:creationId xmlns:p14="http://schemas.microsoft.com/office/powerpoint/2010/main" val="1402307490"/>
       </p:ext>
     </p:extLst>
   </p:cSld>
@@ -4703,7 +5416,7 @@
           <p:cNvPr id="2" name="Title 1">
             <a:extLst>
               <a:ext uri="{FF2B5EF4-FFF2-40B4-BE49-F238E27FC236}">
-                <a16:creationId xmlns:a16="http://schemas.microsoft.com/office/drawing/2014/main" id="{ACEDBF6E-D7C0-19E1-DF47-8FB9E8571EA7}"/>
+                <a16:creationId xmlns:a16="http://schemas.microsoft.com/office/drawing/2014/main" id="{2AE9834B-F062-74A9-3385-46DB82C31428}"/>
               </a:ext>
             </a:extLst>
           </p:cNvPr>
@@ -4711,420 +5424,62 @@
             <a:spLocks noGrp="1"/>
           </p:cNvSpPr>
           <p:nvPr>
-            <p:ph type="ctrTitle"/>
-          </p:nvPr>
-        </p:nvSpPr>
-        <p:spPr>
-          <a:xfrm>
-            <a:off x="233265" y="382556"/>
-            <a:ext cx="11728579" cy="5514391"/>
-          </a:xfrm>
-        </p:spPr>
+            <p:ph type="title"/>
+          </p:nvPr>
+        </p:nvSpPr>
+        <p:spPr/>
         <p:txBody>
           <a:bodyPr>
             <a:normAutofit/>
           </a:bodyPr>
           <a:lstStyle/>
           <a:p>
-            <a:pPr algn="l">
-              <a:lnSpc>
-                <a:spcPct val="107000"/>
-              </a:lnSpc>
-              <a:spcAft>
-                <a:spcPts val="800"/>
-              </a:spcAft>
-            </a:pPr>
-            <a:r>
-              <a:rPr lang="en-IN" sz="1800" dirty="0">
-                <a:effectLst/>
-                <a:latin typeface="Calibri" panose="020F0502020204030204" pitchFamily="34" charset="0"/>
-                <a:ea typeface="Calibri" panose="020F0502020204030204" pitchFamily="34" charset="0"/>
-                <a:cs typeface="Times New Roman" panose="02020603050405020304" pitchFamily="18" charset="0"/>
-              </a:rPr>
-              <a:t>HTM consists of 2 different components: Spatial Pooler and Temporal Memory. </a:t>
-            </a:r>
-            <a:br>
-              <a:rPr lang="en-IN" sz="1800" dirty="0">
-                <a:effectLst/>
-                <a:latin typeface="Calibri" panose="020F0502020204030204" pitchFamily="34" charset="0"/>
-                <a:ea typeface="Calibri" panose="020F0502020204030204" pitchFamily="34" charset="0"/>
-                <a:cs typeface="Times New Roman" panose="02020603050405020304" pitchFamily="18" charset="0"/>
-              </a:rPr>
-            </a:br>
-            <a:r>
-              <a:rPr lang="en-IN" sz="1800" dirty="0">
-                <a:effectLst/>
-                <a:latin typeface="Calibri" panose="020F0502020204030204" pitchFamily="34" charset="0"/>
-                <a:ea typeface="Calibri" panose="020F0502020204030204" pitchFamily="34" charset="0"/>
-                <a:cs typeface="Times New Roman" panose="02020603050405020304" pitchFamily="18" charset="0"/>
-              </a:rPr>
-              <a:t> </a:t>
-            </a:r>
-            <a:br>
-              <a:rPr lang="en-IN" sz="1800" dirty="0">
-                <a:effectLst/>
-                <a:latin typeface="Calibri" panose="020F0502020204030204" pitchFamily="34" charset="0"/>
-                <a:ea typeface="Calibri" panose="020F0502020204030204" pitchFamily="34" charset="0"/>
-                <a:cs typeface="Times New Roman" panose="02020603050405020304" pitchFamily="18" charset="0"/>
-              </a:rPr>
-            </a:br>
-            <a:r>
-              <a:rPr lang="en-IN" sz="1800" dirty="0">
-                <a:effectLst/>
-                <a:latin typeface="Calibri" panose="020F0502020204030204" pitchFamily="34" charset="0"/>
-                <a:ea typeface="Calibri" panose="020F0502020204030204" pitchFamily="34" charset="0"/>
-                <a:cs typeface="Times New Roman" panose="02020603050405020304" pitchFamily="18" charset="0"/>
-              </a:rPr>
-              <a:t>1. Spatial Pooler -</a:t>
-            </a:r>
-            <a:br>
-              <a:rPr lang="en-IN" sz="1800" dirty="0">
-                <a:effectLst/>
-                <a:latin typeface="Calibri" panose="020F0502020204030204" pitchFamily="34" charset="0"/>
-                <a:ea typeface="Calibri" panose="020F0502020204030204" pitchFamily="34" charset="0"/>
-                <a:cs typeface="Times New Roman" panose="02020603050405020304" pitchFamily="18" charset="0"/>
-              </a:rPr>
-            </a:br>
-            <a:r>
-              <a:rPr lang="en-IN" sz="1800" dirty="0">
-                <a:effectLst/>
-                <a:latin typeface="Calibri" panose="020F0502020204030204" pitchFamily="34" charset="0"/>
-                <a:ea typeface="Calibri" panose="020F0502020204030204" pitchFamily="34" charset="0"/>
-                <a:cs typeface="Times New Roman" panose="02020603050405020304" pitchFamily="18" charset="0"/>
-              </a:rPr>
-              <a:t>Encoder produces output to be fed into Spatial Pooler algorithm. Type of Spatial Pooler (SP) that is used in this example is the multithreaded version that utilize multicore of the machine to run the spatial pooler algorithm.</a:t>
-            </a:r>
-            <a:br>
-              <a:rPr lang="en-IN" sz="1800" dirty="0">
-                <a:effectLst/>
-                <a:latin typeface="Calibri" panose="020F0502020204030204" pitchFamily="34" charset="0"/>
-                <a:ea typeface="Calibri" panose="020F0502020204030204" pitchFamily="34" charset="0"/>
-                <a:cs typeface="Times New Roman" panose="02020603050405020304" pitchFamily="18" charset="0"/>
-              </a:rPr>
-            </a:br>
-            <a:r>
-              <a:rPr lang="en-IN" sz="1800" dirty="0">
-                <a:effectLst/>
-                <a:latin typeface="Calibri" panose="020F0502020204030204" pitchFamily="34" charset="0"/>
-                <a:ea typeface="Calibri" panose="020F0502020204030204" pitchFamily="34" charset="0"/>
-                <a:cs typeface="Times New Roman" panose="02020603050405020304" pitchFamily="18" charset="0"/>
-              </a:rPr>
-              <a:t> </a:t>
-            </a:r>
-            <a:br>
-              <a:rPr lang="en-IN" sz="1800" dirty="0">
-                <a:effectLst/>
-                <a:latin typeface="Calibri" panose="020F0502020204030204" pitchFamily="34" charset="0"/>
-                <a:ea typeface="Calibri" panose="020F0502020204030204" pitchFamily="34" charset="0"/>
-                <a:cs typeface="Times New Roman" panose="02020603050405020304" pitchFamily="18" charset="0"/>
-              </a:rPr>
-            </a:br>
-            <a:r>
-              <a:rPr lang="en-IN" sz="1800" dirty="0" err="1">
-                <a:effectLst/>
-                <a:latin typeface="Calibri" panose="020F0502020204030204" pitchFamily="34" charset="0"/>
-                <a:ea typeface="Calibri" panose="020F0502020204030204" pitchFamily="34" charset="0"/>
-                <a:cs typeface="Times New Roman" panose="02020603050405020304" pitchFamily="18" charset="0"/>
-              </a:rPr>
-              <a:t>SpatialPoolerMT</a:t>
-            </a:r>
-            <a:r>
-              <a:rPr lang="en-IN" sz="1800" dirty="0">
-                <a:effectLst/>
-                <a:latin typeface="Calibri" panose="020F0502020204030204" pitchFamily="34" charset="0"/>
-                <a:ea typeface="Calibri" panose="020F0502020204030204" pitchFamily="34" charset="0"/>
-                <a:cs typeface="Times New Roman" panose="02020603050405020304" pitchFamily="18" charset="0"/>
-              </a:rPr>
-              <a:t> </a:t>
-            </a:r>
-            <a:r>
-              <a:rPr lang="en-IN" sz="1800" dirty="0" err="1">
-                <a:effectLst/>
-                <a:latin typeface="Calibri" panose="020F0502020204030204" pitchFamily="34" charset="0"/>
-                <a:ea typeface="Calibri" panose="020F0502020204030204" pitchFamily="34" charset="0"/>
-                <a:cs typeface="Times New Roman" panose="02020603050405020304" pitchFamily="18" charset="0"/>
-              </a:rPr>
-              <a:t>spatialPooler</a:t>
-            </a:r>
-            <a:r>
-              <a:rPr lang="en-IN" sz="1800" dirty="0">
-                <a:effectLst/>
-                <a:latin typeface="Calibri" panose="020F0502020204030204" pitchFamily="34" charset="0"/>
-                <a:ea typeface="Calibri" panose="020F0502020204030204" pitchFamily="34" charset="0"/>
-                <a:cs typeface="Times New Roman" panose="02020603050405020304" pitchFamily="18" charset="0"/>
-              </a:rPr>
-              <a:t> = new </a:t>
-            </a:r>
-            <a:r>
-              <a:rPr lang="en-IN" sz="1800" dirty="0" err="1">
-                <a:effectLst/>
-                <a:latin typeface="Calibri" panose="020F0502020204030204" pitchFamily="34" charset="0"/>
-                <a:ea typeface="Calibri" panose="020F0502020204030204" pitchFamily="34" charset="0"/>
-                <a:cs typeface="Times New Roman" panose="02020603050405020304" pitchFamily="18" charset="0"/>
-              </a:rPr>
-              <a:t>SpatialPoolerMT</a:t>
-            </a:r>
-            <a:r>
-              <a:rPr lang="en-IN" sz="1800" dirty="0">
-                <a:effectLst/>
-                <a:latin typeface="Calibri" panose="020F0502020204030204" pitchFamily="34" charset="0"/>
-                <a:ea typeface="Calibri" panose="020F0502020204030204" pitchFamily="34" charset="0"/>
-                <a:cs typeface="Times New Roman" panose="02020603050405020304" pitchFamily="18" charset="0"/>
-              </a:rPr>
-              <a:t>(</a:t>
-            </a:r>
-            <a:r>
-              <a:rPr lang="en-IN" sz="1800" dirty="0" err="1">
-                <a:effectLst/>
-                <a:latin typeface="Calibri" panose="020F0502020204030204" pitchFamily="34" charset="0"/>
-                <a:ea typeface="Calibri" panose="020F0502020204030204" pitchFamily="34" charset="0"/>
-                <a:cs typeface="Times New Roman" panose="02020603050405020304" pitchFamily="18" charset="0"/>
-              </a:rPr>
-              <a:t>hpa</a:t>
-            </a:r>
-            <a:r>
-              <a:rPr lang="en-IN" sz="1800" dirty="0">
-                <a:effectLst/>
-                <a:latin typeface="Calibri" panose="020F0502020204030204" pitchFamily="34" charset="0"/>
-                <a:ea typeface="Calibri" panose="020F0502020204030204" pitchFamily="34" charset="0"/>
-                <a:cs typeface="Times New Roman" panose="02020603050405020304" pitchFamily="18" charset="0"/>
-              </a:rPr>
-              <a:t>);</a:t>
-            </a:r>
-            <a:br>
-              <a:rPr lang="en-IN" sz="1800" dirty="0">
-                <a:effectLst/>
-                <a:latin typeface="Calibri" panose="020F0502020204030204" pitchFamily="34" charset="0"/>
-                <a:ea typeface="Calibri" panose="020F0502020204030204" pitchFamily="34" charset="0"/>
-                <a:cs typeface="Times New Roman" panose="02020603050405020304" pitchFamily="18" charset="0"/>
-              </a:rPr>
-            </a:br>
-            <a:r>
-              <a:rPr lang="en-IN" sz="1800" dirty="0" err="1">
-                <a:effectLst/>
-                <a:latin typeface="Calibri" panose="020F0502020204030204" pitchFamily="34" charset="0"/>
-                <a:ea typeface="Calibri" panose="020F0502020204030204" pitchFamily="34" charset="0"/>
-                <a:cs typeface="Times New Roman" panose="02020603050405020304" pitchFamily="18" charset="0"/>
-              </a:rPr>
-              <a:t>patialPooler.Init</a:t>
-            </a:r>
-            <a:r>
-              <a:rPr lang="en-IN" sz="1800" dirty="0">
-                <a:effectLst/>
-                <a:latin typeface="Calibri" panose="020F0502020204030204" pitchFamily="34" charset="0"/>
-                <a:ea typeface="Calibri" panose="020F0502020204030204" pitchFamily="34" charset="0"/>
-                <a:cs typeface="Times New Roman" panose="02020603050405020304" pitchFamily="18" charset="0"/>
-              </a:rPr>
-              <a:t>(memory, </a:t>
-            </a:r>
-            <a:r>
-              <a:rPr lang="en-IN" sz="1800" dirty="0" err="1">
-                <a:effectLst/>
-                <a:latin typeface="Calibri" panose="020F0502020204030204" pitchFamily="34" charset="0"/>
-                <a:ea typeface="Calibri" panose="020F0502020204030204" pitchFamily="34" charset="0"/>
-                <a:cs typeface="Times New Roman" panose="02020603050405020304" pitchFamily="18" charset="0"/>
-              </a:rPr>
-              <a:t>UnitTestHelpers.GetMemory</a:t>
-            </a:r>
-            <a:r>
-              <a:rPr lang="en-IN" sz="1800" dirty="0">
-                <a:effectLst/>
-                <a:latin typeface="Calibri" panose="020F0502020204030204" pitchFamily="34" charset="0"/>
-                <a:ea typeface="Calibri" panose="020F0502020204030204" pitchFamily="34" charset="0"/>
-                <a:cs typeface="Times New Roman" panose="02020603050405020304" pitchFamily="18" charset="0"/>
-              </a:rPr>
-              <a:t>());</a:t>
-            </a:r>
-            <a:br>
-              <a:rPr lang="en-IN" sz="1800" dirty="0">
-                <a:effectLst/>
-                <a:latin typeface="Calibri" panose="020F0502020204030204" pitchFamily="34" charset="0"/>
-                <a:ea typeface="Calibri" panose="020F0502020204030204" pitchFamily="34" charset="0"/>
-                <a:cs typeface="Times New Roman" panose="02020603050405020304" pitchFamily="18" charset="0"/>
-              </a:rPr>
-            </a:br>
-            <a:r>
-              <a:rPr lang="en-IN" sz="1800" dirty="0">
-                <a:effectLst/>
-                <a:latin typeface="Calibri" panose="020F0502020204030204" pitchFamily="34" charset="0"/>
-                <a:ea typeface="Calibri" panose="020F0502020204030204" pitchFamily="34" charset="0"/>
-                <a:cs typeface="Times New Roman" panose="02020603050405020304" pitchFamily="18" charset="0"/>
-              </a:rPr>
-              <a:t> </a:t>
-            </a:r>
-            <a:br>
-              <a:rPr lang="en-IN" sz="1800" dirty="0">
-                <a:effectLst/>
-                <a:latin typeface="Calibri" panose="020F0502020204030204" pitchFamily="34" charset="0"/>
-                <a:ea typeface="Calibri" panose="020F0502020204030204" pitchFamily="34" charset="0"/>
-                <a:cs typeface="Times New Roman" panose="02020603050405020304" pitchFamily="18" charset="0"/>
-              </a:rPr>
-            </a:br>
-            <a:r>
-              <a:rPr lang="en-IN" sz="1800" dirty="0">
-                <a:effectLst/>
-                <a:latin typeface="Calibri" panose="020F0502020204030204" pitchFamily="34" charset="0"/>
-                <a:ea typeface="Calibri" panose="020F0502020204030204" pitchFamily="34" charset="0"/>
-                <a:cs typeface="Times New Roman" panose="02020603050405020304" pitchFamily="18" charset="0"/>
-              </a:rPr>
-              <a:t>2. Temporal Memory -</a:t>
-            </a:r>
-            <a:br>
-              <a:rPr lang="en-IN" sz="1800" dirty="0">
-                <a:effectLst/>
-                <a:latin typeface="Calibri" panose="020F0502020204030204" pitchFamily="34" charset="0"/>
-                <a:ea typeface="Calibri" panose="020F0502020204030204" pitchFamily="34" charset="0"/>
-                <a:cs typeface="Times New Roman" panose="02020603050405020304" pitchFamily="18" charset="0"/>
-              </a:rPr>
-            </a:br>
-            <a:r>
-              <a:rPr lang="en-IN" sz="1800" dirty="0">
-                <a:effectLst/>
-                <a:latin typeface="Calibri" panose="020F0502020204030204" pitchFamily="34" charset="0"/>
-                <a:ea typeface="Calibri" panose="020F0502020204030204" pitchFamily="34" charset="0"/>
-                <a:cs typeface="Times New Roman" panose="02020603050405020304" pitchFamily="18" charset="0"/>
-              </a:rPr>
-              <a:t>The output of Spatial Pooler (SDR) is used as the input of Temporal </a:t>
-            </a:r>
-            <a:r>
-              <a:rPr lang="en-IN" sz="1800" dirty="0" err="1">
-                <a:effectLst/>
-                <a:latin typeface="Calibri" panose="020F0502020204030204" pitchFamily="34" charset="0"/>
-                <a:ea typeface="Calibri" panose="020F0502020204030204" pitchFamily="34" charset="0"/>
-                <a:cs typeface="Times New Roman" panose="02020603050405020304" pitchFamily="18" charset="0"/>
-              </a:rPr>
-              <a:t>Memory.Temporal</a:t>
-            </a:r>
-            <a:r>
-              <a:rPr lang="en-IN" sz="1800" dirty="0">
-                <a:effectLst/>
-                <a:latin typeface="Calibri" panose="020F0502020204030204" pitchFamily="34" charset="0"/>
-                <a:ea typeface="Calibri" panose="020F0502020204030204" pitchFamily="34" charset="0"/>
-                <a:cs typeface="Times New Roman" panose="02020603050405020304" pitchFamily="18" charset="0"/>
-              </a:rPr>
-              <a:t> memory algorithm will then learn the temporal pattern from spatial pattern.</a:t>
-            </a:r>
-            <a:br>
-              <a:rPr lang="en-IN" sz="1800" dirty="0">
-                <a:effectLst/>
-                <a:latin typeface="Calibri" panose="020F0502020204030204" pitchFamily="34" charset="0"/>
-                <a:ea typeface="Calibri" panose="020F0502020204030204" pitchFamily="34" charset="0"/>
-                <a:cs typeface="Times New Roman" panose="02020603050405020304" pitchFamily="18" charset="0"/>
-              </a:rPr>
-            </a:br>
-            <a:r>
-              <a:rPr lang="en-IN" sz="1800" dirty="0">
-                <a:effectLst/>
-                <a:latin typeface="Calibri" panose="020F0502020204030204" pitchFamily="34" charset="0"/>
-                <a:ea typeface="Calibri" panose="020F0502020204030204" pitchFamily="34" charset="0"/>
-                <a:cs typeface="Times New Roman" panose="02020603050405020304" pitchFamily="18" charset="0"/>
-              </a:rPr>
-              <a:t> </a:t>
-            </a:r>
-            <a:br>
-              <a:rPr lang="en-IN" sz="1800" dirty="0">
-                <a:effectLst/>
-                <a:latin typeface="Calibri" panose="020F0502020204030204" pitchFamily="34" charset="0"/>
-                <a:ea typeface="Calibri" panose="020F0502020204030204" pitchFamily="34" charset="0"/>
-                <a:cs typeface="Times New Roman" panose="02020603050405020304" pitchFamily="18" charset="0"/>
-              </a:rPr>
-            </a:br>
-            <a:r>
-              <a:rPr lang="en-IN" sz="1800" dirty="0" err="1">
-                <a:effectLst/>
-                <a:latin typeface="Calibri" panose="020F0502020204030204" pitchFamily="34" charset="0"/>
-                <a:ea typeface="Calibri" panose="020F0502020204030204" pitchFamily="34" charset="0"/>
-                <a:cs typeface="Times New Roman" panose="02020603050405020304" pitchFamily="18" charset="0"/>
-              </a:rPr>
-              <a:t>TemporalMemory</a:t>
-            </a:r>
-            <a:r>
-              <a:rPr lang="en-IN" sz="1800" dirty="0">
-                <a:effectLst/>
-                <a:latin typeface="Calibri" panose="020F0502020204030204" pitchFamily="34" charset="0"/>
-                <a:ea typeface="Calibri" panose="020F0502020204030204" pitchFamily="34" charset="0"/>
-                <a:cs typeface="Times New Roman" panose="02020603050405020304" pitchFamily="18" charset="0"/>
-              </a:rPr>
-              <a:t> </a:t>
-            </a:r>
-            <a:r>
-              <a:rPr lang="en-IN" sz="1800" dirty="0" err="1">
-                <a:effectLst/>
-                <a:latin typeface="Calibri" panose="020F0502020204030204" pitchFamily="34" charset="0"/>
-                <a:ea typeface="Calibri" panose="020F0502020204030204" pitchFamily="34" charset="0"/>
-                <a:cs typeface="Times New Roman" panose="02020603050405020304" pitchFamily="18" charset="0"/>
-              </a:rPr>
-              <a:t>temporalMemory</a:t>
-            </a:r>
-            <a:r>
-              <a:rPr lang="en-IN" sz="1800" dirty="0">
-                <a:effectLst/>
-                <a:latin typeface="Calibri" panose="020F0502020204030204" pitchFamily="34" charset="0"/>
-                <a:ea typeface="Calibri" panose="020F0502020204030204" pitchFamily="34" charset="0"/>
-                <a:cs typeface="Times New Roman" panose="02020603050405020304" pitchFamily="18" charset="0"/>
-              </a:rPr>
-              <a:t> = new </a:t>
-            </a:r>
-            <a:r>
-              <a:rPr lang="en-IN" sz="1800" dirty="0" err="1">
-                <a:effectLst/>
-                <a:latin typeface="Calibri" panose="020F0502020204030204" pitchFamily="34" charset="0"/>
-                <a:ea typeface="Calibri" panose="020F0502020204030204" pitchFamily="34" charset="0"/>
-                <a:cs typeface="Times New Roman" panose="02020603050405020304" pitchFamily="18" charset="0"/>
-              </a:rPr>
-              <a:t>TemporalMemory</a:t>
-            </a:r>
-            <a:r>
-              <a:rPr lang="en-IN" sz="1800" dirty="0">
-                <a:effectLst/>
-                <a:latin typeface="Calibri" panose="020F0502020204030204" pitchFamily="34" charset="0"/>
-                <a:ea typeface="Calibri" panose="020F0502020204030204" pitchFamily="34" charset="0"/>
-                <a:cs typeface="Times New Roman" panose="02020603050405020304" pitchFamily="18" charset="0"/>
-              </a:rPr>
-              <a:t>();</a:t>
-            </a:r>
-            <a:br>
-              <a:rPr lang="en-IN" sz="1800" dirty="0">
-                <a:effectLst/>
-                <a:latin typeface="Calibri" panose="020F0502020204030204" pitchFamily="34" charset="0"/>
-                <a:ea typeface="Calibri" panose="020F0502020204030204" pitchFamily="34" charset="0"/>
-                <a:cs typeface="Times New Roman" panose="02020603050405020304" pitchFamily="18" charset="0"/>
-              </a:rPr>
-            </a:br>
-            <a:r>
-              <a:rPr lang="en-IN" sz="1800" dirty="0" err="1">
-                <a:effectLst/>
-                <a:latin typeface="Calibri" panose="020F0502020204030204" pitchFamily="34" charset="0"/>
-                <a:ea typeface="Calibri" panose="020F0502020204030204" pitchFamily="34" charset="0"/>
-                <a:cs typeface="Times New Roman" panose="02020603050405020304" pitchFamily="18" charset="0"/>
-              </a:rPr>
-              <a:t>temporalMemory.Init</a:t>
-            </a:r>
-            <a:r>
-              <a:rPr lang="en-IN" sz="1800" dirty="0">
-                <a:effectLst/>
-                <a:latin typeface="Calibri" panose="020F0502020204030204" pitchFamily="34" charset="0"/>
-                <a:ea typeface="Calibri" panose="020F0502020204030204" pitchFamily="34" charset="0"/>
-                <a:cs typeface="Times New Roman" panose="02020603050405020304" pitchFamily="18" charset="0"/>
-              </a:rPr>
-              <a:t>(mem);</a:t>
-            </a:r>
-            <a:br>
-              <a:rPr lang="en-IN" sz="1800" dirty="0">
-                <a:effectLst/>
-                <a:latin typeface="Calibri" panose="020F0502020204030204" pitchFamily="34" charset="0"/>
-                <a:ea typeface="Calibri" panose="020F0502020204030204" pitchFamily="34" charset="0"/>
-                <a:cs typeface="Times New Roman" panose="02020603050405020304" pitchFamily="18" charset="0"/>
-              </a:rPr>
-            </a:br>
-            <a:endParaRPr lang="en-IN" dirty="0"/>
-          </a:p>
-        </p:txBody>
-      </p:sp>
+            <a:r>
+              <a:rPr lang="en-US" sz="3200" dirty="0"/>
+              <a:t>Flow chart of Implementation:</a:t>
+            </a:r>
+          </a:p>
+        </p:txBody>
+      </p:sp>
+      <p:pic>
+        <p:nvPicPr>
+          <p:cNvPr id="5" name="Content Placeholder 4" descr="Diagram&#10;&#10;Description automatically generated">
+            <a:extLst>
+              <a:ext uri="{FF2B5EF4-FFF2-40B4-BE49-F238E27FC236}">
+                <a16:creationId xmlns:a16="http://schemas.microsoft.com/office/drawing/2014/main" id="{FA294D3B-BCEA-10CC-7E8E-E26F8422290C}"/>
+              </a:ext>
+            </a:extLst>
+          </p:cNvPr>
+          <p:cNvPicPr>
+            <a:picLocks noGrp="1" noChangeAspect="1"/>
+          </p:cNvPicPr>
+          <p:nvPr>
+            <p:ph idx="1"/>
+          </p:nvPr>
+        </p:nvPicPr>
+        <p:blipFill>
+          <a:blip r:embed="rId2">
+            <a:extLst>
+              <a:ext uri="{28A0092B-C50C-407E-A947-70E740481C1C}">
+                <a14:useLocalDpi xmlns:a14="http://schemas.microsoft.com/office/drawing/2010/main" val="0"/>
+              </a:ext>
+            </a:extLst>
+          </a:blip>
+          <a:stretch>
+            <a:fillRect/>
+          </a:stretch>
+        </p:blipFill>
+        <p:spPr>
+          <a:xfrm>
+            <a:off x="4698610" y="1507508"/>
+            <a:ext cx="2516910" cy="4891354"/>
+          </a:xfrm>
+        </p:spPr>
+      </p:pic>
     </p:spTree>
     <p:extLst>
       <p:ext uri="{BB962C8B-B14F-4D97-AF65-F5344CB8AC3E}">
-        <p14:creationId xmlns:p14="http://schemas.microsoft.com/office/powerpoint/2010/main" val="1951646649"/>
+        <p14:creationId xmlns:p14="http://schemas.microsoft.com/office/powerpoint/2010/main" val="173842174"/>
       </p:ext>
     </p:extLst>
   </p:cSld>
@@ -5153,10 +5508,10 @@
       </p:grpSpPr>
       <p:sp>
         <p:nvSpPr>
-          <p:cNvPr id="2" name="Title 1">
+          <p:cNvPr id="3" name="Content Placeholder 2">
             <a:extLst>
               <a:ext uri="{FF2B5EF4-FFF2-40B4-BE49-F238E27FC236}">
-                <a16:creationId xmlns:a16="http://schemas.microsoft.com/office/drawing/2014/main" id="{80812DF8-5B3F-78F0-5AB8-7C5D9E9497DD}"/>
+                <a16:creationId xmlns:a16="http://schemas.microsoft.com/office/drawing/2014/main" id="{4CA0EC46-C32D-E884-E9B3-F68BAE705FEE}"/>
               </a:ext>
             </a:extLst>
           </p:cNvPr>
@@ -5164,24 +5519,290 @@
             <a:spLocks noGrp="1"/>
           </p:cNvSpPr>
           <p:nvPr>
-            <p:ph type="ctrTitle"/>
+            <p:ph idx="1"/>
           </p:nvPr>
         </p:nvSpPr>
         <p:spPr>
           <a:xfrm>
-            <a:off x="1524000" y="1122363"/>
-            <a:ext cx="9144000" cy="809074"/>
+            <a:off x="701755" y="1214120"/>
+            <a:ext cx="10515600" cy="4984173"/>
           </a:xfrm>
         </p:spPr>
         <p:txBody>
-          <a:bodyPr>
-            <a:normAutofit fontScale="90000"/>
+          <a:bodyPr/>
+          <a:lstStyle/>
+          <a:p>
+            <a:pPr marL="0" marR="0" indent="0" algn="just">
+              <a:spcBef>
+                <a:spcPts val="0"/>
+              </a:spcBef>
+              <a:spcAft>
+                <a:spcPts val="0"/>
+              </a:spcAft>
+              <a:buNone/>
+            </a:pPr>
+            <a:r>
+              <a:rPr lang="en-US" sz="1800" dirty="0">
+                <a:effectLst/>
+                <a:latin typeface="Times New Roman" panose="02020603050405020304" pitchFamily="18" charset="0"/>
+                <a:ea typeface="SimSun" panose="02010600030101010101" pitchFamily="2" charset="-122"/>
+              </a:rPr>
+              <a:t>We have divided our result into four sections:</a:t>
+            </a:r>
+          </a:p>
+          <a:p>
+            <a:pPr marL="0" marR="0" indent="0" algn="just">
+              <a:spcBef>
+                <a:spcPts val="0"/>
+              </a:spcBef>
+              <a:spcAft>
+                <a:spcPts val="0"/>
+              </a:spcAft>
+              <a:buNone/>
+            </a:pPr>
+            <a:endParaRPr lang="en-US" sz="1800" dirty="0">
+              <a:latin typeface="Times New Roman" panose="02020603050405020304" pitchFamily="18" charset="0"/>
+              <a:ea typeface="SimSun" panose="02010600030101010101" pitchFamily="2" charset="-122"/>
+            </a:endParaRPr>
+          </a:p>
+          <a:p>
+            <a:pPr marL="342900" indent="-342900" algn="just">
+              <a:spcBef>
+                <a:spcPts val="0"/>
+              </a:spcBef>
+              <a:buAutoNum type="arabicPeriod"/>
+            </a:pPr>
+            <a:r>
+              <a:rPr lang="en-US" sz="1800" dirty="0">
+                <a:effectLst/>
+                <a:latin typeface="Times New Roman" panose="02020603050405020304" pitchFamily="18" charset="0"/>
+                <a:ea typeface="SimSun" panose="02010600030101010101" pitchFamily="2" charset="-122"/>
+              </a:rPr>
+              <a:t>Result of training phase</a:t>
+            </a:r>
+            <a:r>
+              <a:rPr lang="en-IN" sz="1800" dirty="0">
+                <a:effectLst/>
+                <a:latin typeface="Times New Roman" panose="02020603050405020304" pitchFamily="18" charset="0"/>
+                <a:ea typeface="SimSun" panose="02010600030101010101" pitchFamily="2" charset="-122"/>
+              </a:rPr>
+              <a:t>:</a:t>
+            </a:r>
+            <a:endParaRPr lang="en-US" sz="1800" dirty="0">
+              <a:effectLst/>
+              <a:latin typeface="Times New Roman" panose="02020603050405020304" pitchFamily="18" charset="0"/>
+              <a:ea typeface="SimSun" panose="02010600030101010101" pitchFamily="2" charset="-122"/>
+            </a:endParaRPr>
+          </a:p>
+        </p:txBody>
+      </p:sp>
+      <p:sp>
+        <p:nvSpPr>
+          <p:cNvPr id="4" name="Title 1">
+            <a:extLst>
+              <a:ext uri="{FF2B5EF4-FFF2-40B4-BE49-F238E27FC236}">
+                <a16:creationId xmlns:a16="http://schemas.microsoft.com/office/drawing/2014/main" id="{D8E04A14-4850-858B-EBB9-E5F331EC04E7}"/>
+              </a:ext>
+            </a:extLst>
+          </p:cNvPr>
+          <p:cNvSpPr txBox="1">
+            <a:spLocks/>
+          </p:cNvSpPr>
+          <p:nvPr/>
+        </p:nvSpPr>
+        <p:spPr>
+          <a:xfrm>
+            <a:off x="4881488" y="226624"/>
+            <a:ext cx="5571907" cy="809074"/>
+          </a:xfrm>
+          <a:prstGeom prst="rect">
+            <a:avLst/>
+          </a:prstGeom>
+        </p:spPr>
+        <p:txBody>
+          <a:bodyPr vert="horz" lIns="91440" tIns="45720" rIns="91440" bIns="45720" rtlCol="0" anchor="ctr">
+            <a:normAutofit fontScale="97500"/>
           </a:bodyPr>
-          <a:lstStyle/>
+          <a:lstStyle>
+            <a:lvl1pPr algn="l" defTabSz="914400" rtl="0" eaLnBrk="1" latinLnBrk="0" hangingPunct="1">
+              <a:lnSpc>
+                <a:spcPct val="90000"/>
+              </a:lnSpc>
+              <a:spcBef>
+                <a:spcPct val="0"/>
+              </a:spcBef>
+              <a:buNone/>
+              <a:defRPr sz="4400" kern="1200">
+                <a:solidFill>
+                  <a:schemeClr val="tx1"/>
+                </a:solidFill>
+                <a:latin typeface="+mj-lt"/>
+                <a:ea typeface="+mj-ea"/>
+                <a:cs typeface="+mj-cs"/>
+              </a:defRPr>
+            </a:lvl1pPr>
+          </a:lstStyle>
           <a:p>
             <a:r>
               <a:rPr lang="en-IN" dirty="0"/>
-              <a:t>Program Flow</a:t>
+              <a:t>Results</a:t>
+            </a:r>
+          </a:p>
+        </p:txBody>
+      </p:sp>
+      <p:pic>
+        <p:nvPicPr>
+          <p:cNvPr id="5" name="Picture 4" descr="Table&#10;&#10;Description automatically generated">
+            <a:extLst>
+              <a:ext uri="{FF2B5EF4-FFF2-40B4-BE49-F238E27FC236}">
+                <a16:creationId xmlns:a16="http://schemas.microsoft.com/office/drawing/2014/main" id="{781A64FD-D40B-12A2-0994-A4D78A645988}"/>
+              </a:ext>
+            </a:extLst>
+          </p:cNvPr>
+          <p:cNvPicPr>
+            <a:picLocks noChangeAspect="1"/>
+          </p:cNvPicPr>
+          <p:nvPr/>
+        </p:nvPicPr>
+        <p:blipFill>
+          <a:blip r:embed="rId2">
+            <a:extLst>
+              <a:ext uri="{28A0092B-C50C-407E-A947-70E740481C1C}">
+                <a14:useLocalDpi xmlns:a14="http://schemas.microsoft.com/office/drawing/2010/main" val="0"/>
+              </a:ext>
+            </a:extLst>
+          </a:blip>
+          <a:stretch>
+            <a:fillRect/>
+          </a:stretch>
+        </p:blipFill>
+        <p:spPr>
+          <a:xfrm>
+            <a:off x="862104" y="2307101"/>
+            <a:ext cx="3524313" cy="3227206"/>
+          </a:xfrm>
+          <a:prstGeom prst="rect">
+            <a:avLst/>
+          </a:prstGeom>
+        </p:spPr>
+      </p:pic>
+      <p:sp>
+        <p:nvSpPr>
+          <p:cNvPr id="6" name="TextBox 5">
+            <a:extLst>
+              <a:ext uri="{FF2B5EF4-FFF2-40B4-BE49-F238E27FC236}">
+                <a16:creationId xmlns:a16="http://schemas.microsoft.com/office/drawing/2014/main" id="{BBB9F4C5-D6A8-2C09-161C-322CFE8354BA}"/>
+              </a:ext>
+            </a:extLst>
+          </p:cNvPr>
+          <p:cNvSpPr txBox="1"/>
+          <p:nvPr/>
+        </p:nvSpPr>
+        <p:spPr>
+          <a:xfrm>
+            <a:off x="5282967" y="2307101"/>
+            <a:ext cx="4768948" cy="3139321"/>
+          </a:xfrm>
+          <a:prstGeom prst="rect">
+            <a:avLst/>
+          </a:prstGeom>
+          <a:noFill/>
+        </p:spPr>
+        <p:txBody>
+          <a:bodyPr wrap="square" rtlCol="0">
+            <a:spAutoFit/>
+          </a:bodyPr>
+          <a:lstStyle/>
+          <a:p>
+            <a:pPr algn="just">
+              <a:spcBef>
+                <a:spcPts val="0"/>
+              </a:spcBef>
+            </a:pPr>
+            <a:r>
+              <a:rPr lang="en-US" sz="1800" spc="-5" dirty="0">
+                <a:effectLst/>
+                <a:latin typeface="Times New Roman" panose="02020603050405020304" pitchFamily="18" charset="0"/>
+                <a:ea typeface="SimSun" panose="02010600030101010101" pitchFamily="2" charset="-122"/>
+              </a:rPr>
+              <a:t>Model is getting trained for each input sequence and newborn cycle gets generated till the spatial pooler reach the stable state. Result of training phase can be seen in below figure 1.1.</a:t>
+            </a:r>
+          </a:p>
+          <a:p>
+            <a:pPr algn="just">
+              <a:spcBef>
+                <a:spcPts val="0"/>
+              </a:spcBef>
+            </a:pPr>
+            <a:endParaRPr lang="en-US" spc="-5" dirty="0">
+              <a:latin typeface="Times New Roman" panose="02020603050405020304" pitchFamily="18" charset="0"/>
+              <a:ea typeface="SimSun" panose="02010600030101010101" pitchFamily="2" charset="-122"/>
+            </a:endParaRPr>
+          </a:p>
+          <a:p>
+            <a:pPr algn="just">
+              <a:spcBef>
+                <a:spcPts val="0"/>
+              </a:spcBef>
+            </a:pPr>
+            <a:r>
+              <a:rPr lang="en-US" sz="1800" spc="-5" dirty="0">
+                <a:effectLst/>
+                <a:latin typeface="Times New Roman" panose="02020603050405020304" pitchFamily="18" charset="0"/>
+                <a:ea typeface="SimSun" panose="02010600030101010101" pitchFamily="2" charset="-122"/>
+              </a:rPr>
+              <a:t>For each input sequence Spatial pooler learns the pattern and with pretrained spatial pooler and HPC, the temporal memory quickly learns cells of patterns.</a:t>
+            </a:r>
+          </a:p>
+          <a:p>
+            <a:pPr marL="342900" indent="-342900" algn="just">
+              <a:spcBef>
+                <a:spcPts val="0"/>
+              </a:spcBef>
+              <a:buAutoNum type="arabicPeriod"/>
+            </a:pPr>
+            <a:endParaRPr lang="en-US" sz="1800" dirty="0">
+              <a:effectLst/>
+              <a:latin typeface="Times New Roman" panose="02020603050405020304" pitchFamily="18" charset="0"/>
+              <a:ea typeface="SimSun" panose="02010600030101010101" pitchFamily="2" charset="-122"/>
+            </a:endParaRPr>
+          </a:p>
+          <a:p>
+            <a:endParaRPr lang="en-US" dirty="0"/>
+          </a:p>
+        </p:txBody>
+      </p:sp>
+      <p:sp>
+        <p:nvSpPr>
+          <p:cNvPr id="7" name="TextBox 6">
+            <a:extLst>
+              <a:ext uri="{FF2B5EF4-FFF2-40B4-BE49-F238E27FC236}">
+                <a16:creationId xmlns:a16="http://schemas.microsoft.com/office/drawing/2014/main" id="{236C4D20-46BF-EE94-D809-98C78BCBCF84}"/>
+              </a:ext>
+            </a:extLst>
+          </p:cNvPr>
+          <p:cNvSpPr txBox="1"/>
+          <p:nvPr/>
+        </p:nvSpPr>
+        <p:spPr>
+          <a:xfrm>
+            <a:off x="1178983" y="5632548"/>
+            <a:ext cx="3207434" cy="369332"/>
+          </a:xfrm>
+          <a:prstGeom prst="rect">
+            <a:avLst/>
+          </a:prstGeom>
+          <a:noFill/>
+        </p:spPr>
+        <p:txBody>
+          <a:bodyPr wrap="square" rtlCol="0">
+            <a:spAutoFit/>
+          </a:bodyPr>
+          <a:lstStyle/>
+          <a:p>
+            <a:r>
+              <a:rPr lang="en-US" dirty="0"/>
+              <a:t>figure 1.1. Training Phase</a:t>
             </a:r>
           </a:p>
         </p:txBody>
@@ -5189,7 +5810,7 @@
     </p:spTree>
     <p:extLst>
       <p:ext uri="{BB962C8B-B14F-4D97-AF65-F5344CB8AC3E}">
-        <p14:creationId xmlns:p14="http://schemas.microsoft.com/office/powerpoint/2010/main" val="2029429037"/>
+        <p14:creationId xmlns:p14="http://schemas.microsoft.com/office/powerpoint/2010/main" val="2903721002"/>
       </p:ext>
     </p:extLst>
   </p:cSld>
@@ -5218,10 +5839,10 @@
       </p:grpSpPr>
       <p:sp>
         <p:nvSpPr>
-          <p:cNvPr id="2" name="Title 1">
+          <p:cNvPr id="3" name="Content Placeholder 2">
             <a:extLst>
               <a:ext uri="{FF2B5EF4-FFF2-40B4-BE49-F238E27FC236}">
-                <a16:creationId xmlns:a16="http://schemas.microsoft.com/office/drawing/2014/main" id="{2EAB8300-8A6C-D1EE-D8C7-C1ACB6308305}"/>
+                <a16:creationId xmlns:a16="http://schemas.microsoft.com/office/drawing/2014/main" id="{4CA0EC46-C32D-E884-E9B3-F68BAE705FEE}"/>
               </a:ext>
             </a:extLst>
           </p:cNvPr>
@@ -5229,32 +5850,361 @@
             <a:spLocks noGrp="1"/>
           </p:cNvSpPr>
           <p:nvPr>
-            <p:ph type="ctrTitle"/>
+            <p:ph idx="1"/>
           </p:nvPr>
         </p:nvSpPr>
         <p:spPr>
           <a:xfrm>
-            <a:off x="1524000" y="1122363"/>
-            <a:ext cx="9144000" cy="706437"/>
+            <a:off x="701755" y="1052971"/>
+            <a:ext cx="10515600" cy="4984173"/>
           </a:xfrm>
         </p:spPr>
         <p:txBody>
-          <a:bodyPr>
-            <a:normAutofit fontScale="90000"/>
+          <a:bodyPr/>
+          <a:lstStyle/>
+          <a:p>
+            <a:pPr marL="0" indent="0" algn="just">
+              <a:spcBef>
+                <a:spcPts val="0"/>
+              </a:spcBef>
+              <a:buNone/>
+            </a:pPr>
+            <a:r>
+              <a:rPr lang="en-US" sz="1800" dirty="0">
+                <a:effectLst/>
+                <a:latin typeface="Times New Roman" panose="02020603050405020304" pitchFamily="18" charset="0"/>
+                <a:ea typeface="SimSun" panose="02010600030101010101" pitchFamily="2" charset="-122"/>
+              </a:rPr>
+              <a:t>2. Result of prediction phase</a:t>
+            </a:r>
+            <a:r>
+              <a:rPr lang="en-IN" sz="1800" dirty="0">
+                <a:effectLst/>
+                <a:latin typeface="Times New Roman" panose="02020603050405020304" pitchFamily="18" charset="0"/>
+                <a:ea typeface="SimSun" panose="02010600030101010101" pitchFamily="2" charset="-122"/>
+              </a:rPr>
+              <a:t>:</a:t>
+            </a:r>
+            <a:r>
+              <a:rPr lang="en-US" sz="1800" dirty="0">
+                <a:latin typeface="Times New Roman" panose="02020603050405020304" pitchFamily="18" charset="0"/>
+                <a:ea typeface="SimSun" panose="02010600030101010101" pitchFamily="2" charset="-122"/>
+              </a:rPr>
+              <a:t> </a:t>
+            </a:r>
+          </a:p>
+          <a:p>
+            <a:pPr marL="0" indent="0" algn="just">
+              <a:spcBef>
+                <a:spcPts val="0"/>
+              </a:spcBef>
+              <a:buNone/>
+            </a:pPr>
+            <a:endParaRPr lang="en-US" sz="1800" dirty="0">
+              <a:latin typeface="Times New Roman" panose="02020603050405020304" pitchFamily="18" charset="0"/>
+              <a:ea typeface="SimSun" panose="02010600030101010101" pitchFamily="2" charset="-122"/>
+            </a:endParaRPr>
+          </a:p>
+          <a:p>
+            <a:pPr marL="0" indent="0" algn="just">
+              <a:spcBef>
+                <a:spcPts val="0"/>
+              </a:spcBef>
+              <a:buNone/>
+            </a:pPr>
+            <a:r>
+              <a:rPr lang="en-US" sz="1800" dirty="0">
+                <a:latin typeface="Times New Roman" panose="02020603050405020304" pitchFamily="18" charset="0"/>
+                <a:ea typeface="SimSun" panose="02010600030101010101" pitchFamily="2" charset="-122"/>
+              </a:rPr>
+              <a:t>Prediction phase is carried out once training phase is completed. Prediction phase   executes in three steps match detection, mismatch detection and next element prediction</a:t>
+            </a:r>
+            <a:r>
+              <a:rPr lang="en-US" sz="1800" dirty="0">
+                <a:effectLst/>
+                <a:latin typeface="Times New Roman" panose="02020603050405020304" pitchFamily="18" charset="0"/>
+                <a:ea typeface="SimSun" panose="02010600030101010101" pitchFamily="2" charset="-122"/>
+              </a:rPr>
+              <a:t>. </a:t>
+            </a:r>
+          </a:p>
+          <a:p>
+            <a:pPr marL="342900" indent="-342900" algn="just">
+              <a:spcBef>
+                <a:spcPts val="0"/>
+              </a:spcBef>
+              <a:buAutoNum type="arabicPeriod"/>
+            </a:pPr>
+            <a:endParaRPr lang="en-US" sz="1800" dirty="0">
+              <a:latin typeface="Times New Roman" panose="02020603050405020304" pitchFamily="18" charset="0"/>
+              <a:ea typeface="SimSun" panose="02010600030101010101" pitchFamily="2" charset="-122"/>
+            </a:endParaRPr>
+          </a:p>
+          <a:p>
+            <a:pPr marL="342900" indent="-342900" algn="just">
+              <a:spcBef>
+                <a:spcPts val="0"/>
+              </a:spcBef>
+              <a:buAutoNum type="arabicPeriod"/>
+            </a:pPr>
+            <a:endParaRPr lang="en-IN" sz="1800" dirty="0">
+              <a:effectLst/>
+              <a:latin typeface="Times New Roman" panose="02020603050405020304" pitchFamily="18" charset="0"/>
+              <a:ea typeface="SimSun" panose="02010600030101010101" pitchFamily="2" charset="-122"/>
+            </a:endParaRPr>
+          </a:p>
+        </p:txBody>
+      </p:sp>
+      <p:sp>
+        <p:nvSpPr>
+          <p:cNvPr id="4" name="Title 1">
+            <a:extLst>
+              <a:ext uri="{FF2B5EF4-FFF2-40B4-BE49-F238E27FC236}">
+                <a16:creationId xmlns:a16="http://schemas.microsoft.com/office/drawing/2014/main" id="{D8E04A14-4850-858B-EBB9-E5F331EC04E7}"/>
+              </a:ext>
+            </a:extLst>
+          </p:cNvPr>
+          <p:cNvSpPr txBox="1">
+            <a:spLocks/>
+          </p:cNvSpPr>
+          <p:nvPr/>
+        </p:nvSpPr>
+        <p:spPr>
+          <a:xfrm>
+            <a:off x="4881488" y="226624"/>
+            <a:ext cx="5571907" cy="809074"/>
+          </a:xfrm>
+          <a:prstGeom prst="rect">
+            <a:avLst/>
+          </a:prstGeom>
+        </p:spPr>
+        <p:txBody>
+          <a:bodyPr vert="horz" lIns="91440" tIns="45720" rIns="91440" bIns="45720" rtlCol="0" anchor="ctr">
+            <a:normAutofit fontScale="97500"/>
           </a:bodyPr>
-          <a:lstStyle/>
+          <a:lstStyle>
+            <a:lvl1pPr algn="l" defTabSz="914400" rtl="0" eaLnBrk="1" latinLnBrk="0" hangingPunct="1">
+              <a:lnSpc>
+                <a:spcPct val="90000"/>
+              </a:lnSpc>
+              <a:spcBef>
+                <a:spcPct val="0"/>
+              </a:spcBef>
+              <a:buNone/>
+              <a:defRPr sz="4400" kern="1200">
+                <a:solidFill>
+                  <a:schemeClr val="tx1"/>
+                </a:solidFill>
+                <a:latin typeface="+mj-lt"/>
+                <a:ea typeface="+mj-ea"/>
+                <a:cs typeface="+mj-cs"/>
+              </a:defRPr>
+            </a:lvl1pPr>
+          </a:lstStyle>
           <a:p>
             <a:r>
               <a:rPr lang="en-IN" dirty="0"/>
-              <a:t>Output Screenshot</a:t>
-            </a:r>
+              <a:t>Results</a:t>
+            </a:r>
+          </a:p>
+        </p:txBody>
+      </p:sp>
+      <p:pic>
+        <p:nvPicPr>
+          <p:cNvPr id="8" name="Picture 7">
+            <a:extLst>
+              <a:ext uri="{FF2B5EF4-FFF2-40B4-BE49-F238E27FC236}">
+                <a16:creationId xmlns:a16="http://schemas.microsoft.com/office/drawing/2014/main" id="{6BAA49EF-36A6-34D0-D741-C86675CF5538}"/>
+              </a:ext>
+            </a:extLst>
+          </p:cNvPr>
+          <p:cNvPicPr>
+            <a:picLocks noChangeAspect="1"/>
+          </p:cNvPicPr>
+          <p:nvPr/>
+        </p:nvPicPr>
+        <p:blipFill>
+          <a:blip r:embed="rId2">
+            <a:extLst>
+              <a:ext uri="{28A0092B-C50C-407E-A947-70E740481C1C}">
+                <a14:useLocalDpi xmlns:a14="http://schemas.microsoft.com/office/drawing/2010/main" val="0"/>
+              </a:ext>
+            </a:extLst>
+          </a:blip>
+          <a:stretch>
+            <a:fillRect/>
+          </a:stretch>
+        </p:blipFill>
+        <p:spPr>
+          <a:xfrm>
+            <a:off x="974645" y="2509084"/>
+            <a:ext cx="9738905" cy="1219370"/>
+          </a:xfrm>
+          <a:prstGeom prst="rect">
+            <a:avLst/>
+          </a:prstGeom>
+        </p:spPr>
+      </p:pic>
+      <p:pic>
+        <p:nvPicPr>
+          <p:cNvPr id="10" name="Picture 9">
+            <a:extLst>
+              <a:ext uri="{FF2B5EF4-FFF2-40B4-BE49-F238E27FC236}">
+                <a16:creationId xmlns:a16="http://schemas.microsoft.com/office/drawing/2014/main" id="{FA07B733-FCD0-3AAD-A099-D45D64EE8DB0}"/>
+              </a:ext>
+            </a:extLst>
+          </p:cNvPr>
+          <p:cNvPicPr>
+            <a:picLocks noChangeAspect="1"/>
+          </p:cNvPicPr>
+          <p:nvPr/>
+        </p:nvPicPr>
+        <p:blipFill>
+          <a:blip r:embed="rId3">
+            <a:extLst>
+              <a:ext uri="{28A0092B-C50C-407E-A947-70E740481C1C}">
+                <a14:useLocalDpi xmlns:a14="http://schemas.microsoft.com/office/drawing/2010/main" val="0"/>
+              </a:ext>
+            </a:extLst>
+          </a:blip>
+          <a:stretch>
+            <a:fillRect/>
+          </a:stretch>
+        </p:blipFill>
+        <p:spPr>
+          <a:xfrm>
+            <a:off x="844063" y="4503435"/>
+            <a:ext cx="10002128" cy="1069593"/>
+          </a:xfrm>
+          <a:prstGeom prst="rect">
+            <a:avLst/>
+          </a:prstGeom>
+        </p:spPr>
+      </p:pic>
+      <p:sp>
+        <p:nvSpPr>
+          <p:cNvPr id="11" name="TextBox 10">
+            <a:extLst>
+              <a:ext uri="{FF2B5EF4-FFF2-40B4-BE49-F238E27FC236}">
+                <a16:creationId xmlns:a16="http://schemas.microsoft.com/office/drawing/2014/main" id="{40645B27-D243-EC46-FB29-A9E55A3D3A25}"/>
+              </a:ext>
+            </a:extLst>
+          </p:cNvPr>
+          <p:cNvSpPr txBox="1"/>
+          <p:nvPr/>
+        </p:nvSpPr>
+        <p:spPr>
+          <a:xfrm>
+            <a:off x="3193366" y="3838680"/>
+            <a:ext cx="4121834" cy="369332"/>
+          </a:xfrm>
+          <a:prstGeom prst="rect">
+            <a:avLst/>
+          </a:prstGeom>
+          <a:noFill/>
+        </p:spPr>
+        <p:txBody>
+          <a:bodyPr wrap="square" rtlCol="0">
+            <a:spAutoFit/>
+          </a:bodyPr>
+          <a:lstStyle/>
+          <a:p>
+            <a:r>
+              <a:rPr lang="en-US" dirty="0"/>
+              <a:t>Figure 1.2. Match Detection</a:t>
+            </a:r>
+          </a:p>
+        </p:txBody>
+      </p:sp>
+      <p:sp>
+        <p:nvSpPr>
+          <p:cNvPr id="12" name="TextBox 11">
+            <a:extLst>
+              <a:ext uri="{FF2B5EF4-FFF2-40B4-BE49-F238E27FC236}">
+                <a16:creationId xmlns:a16="http://schemas.microsoft.com/office/drawing/2014/main" id="{2C3DF818-87EF-FB73-2DE1-35640A3EAB69}"/>
+              </a:ext>
+            </a:extLst>
+          </p:cNvPr>
+          <p:cNvSpPr txBox="1"/>
+          <p:nvPr/>
+        </p:nvSpPr>
+        <p:spPr>
+          <a:xfrm>
+            <a:off x="3193366" y="5581665"/>
+            <a:ext cx="4121834" cy="369332"/>
+          </a:xfrm>
+          <a:prstGeom prst="rect">
+            <a:avLst/>
+          </a:prstGeom>
+          <a:noFill/>
+        </p:spPr>
+        <p:txBody>
+          <a:bodyPr wrap="square" rtlCol="0">
+            <a:spAutoFit/>
+          </a:bodyPr>
+          <a:lstStyle/>
+          <a:p>
+            <a:r>
+              <a:rPr lang="en-US" dirty="0"/>
+              <a:t>Figure 1.3. Mismatch Detection</a:t>
+            </a:r>
+          </a:p>
+        </p:txBody>
+      </p:sp>
+      <p:sp>
+        <p:nvSpPr>
+          <p:cNvPr id="13" name="Rectangle 12">
+            <a:extLst>
+              <a:ext uri="{FF2B5EF4-FFF2-40B4-BE49-F238E27FC236}">
+                <a16:creationId xmlns:a16="http://schemas.microsoft.com/office/drawing/2014/main" id="{72F20F73-F75C-5EB1-F4A1-FF9C9C58D09D}"/>
+              </a:ext>
+            </a:extLst>
+          </p:cNvPr>
+          <p:cNvSpPr/>
+          <p:nvPr/>
+        </p:nvSpPr>
+        <p:spPr>
+          <a:xfrm>
+            <a:off x="844062" y="2382346"/>
+            <a:ext cx="10002129" cy="1401221"/>
+          </a:xfrm>
+          <a:prstGeom prst="rect">
+            <a:avLst/>
+          </a:prstGeom>
+          <a:noFill/>
+          <a:ln>
+            <a:solidFill>
+              <a:schemeClr val="tx1"/>
+            </a:solidFill>
+          </a:ln>
+        </p:spPr>
+        <p:style>
+          <a:lnRef idx="2">
+            <a:schemeClr val="accent6"/>
+          </a:lnRef>
+          <a:fillRef idx="1">
+            <a:schemeClr val="lt1"/>
+          </a:fillRef>
+          <a:effectRef idx="0">
+            <a:schemeClr val="accent6"/>
+          </a:effectRef>
+          <a:fontRef idx="minor">
+            <a:schemeClr val="dk1"/>
+          </a:fontRef>
+        </p:style>
+        <p:txBody>
+          <a:bodyPr rtlCol="0" anchor="ctr"/>
+          <a:lstStyle/>
+          <a:p>
+            <a:pPr algn="ctr"/>
+            <a:endParaRPr lang="en-US"/>
           </a:p>
         </p:txBody>
       </p:sp>
     </p:spTree>
     <p:extLst>
       <p:ext uri="{BB962C8B-B14F-4D97-AF65-F5344CB8AC3E}">
-        <p14:creationId xmlns:p14="http://schemas.microsoft.com/office/powerpoint/2010/main" val="3304583892"/>
+        <p14:creationId xmlns:p14="http://schemas.microsoft.com/office/powerpoint/2010/main" val="18566823"/>
       </p:ext>
     </p:extLst>
   </p:cSld>

</xml_diff>

<commit_message>
Final changes in ppt file
</commit_message>
<xml_diff>
--- a/source/MySEProject/Documentation/ML2223_15 Approve Prediction of Multisequence Learning.pptx
+++ b/source/MySEProject/Documentation/ML2223_15 Approve Prediction of Multisequence Learning.pptx
@@ -254,7 +254,7 @@
           <a:p>
             <a:fld id="{54BB0E1A-2A42-4456-B338-6C031B28DAA4}" type="datetimeFigureOut">
               <a:rPr lang="en-IN" smtClean="0"/>
-              <a:t>28-03-2023</a:t>
+              <a:t>29-03-2023</a:t>
             </a:fld>
             <a:endParaRPr lang="en-IN"/>
           </a:p>
@@ -424,7 +424,7 @@
           <a:p>
             <a:fld id="{54BB0E1A-2A42-4456-B338-6C031B28DAA4}" type="datetimeFigureOut">
               <a:rPr lang="en-IN" smtClean="0"/>
-              <a:t>28-03-2023</a:t>
+              <a:t>29-03-2023</a:t>
             </a:fld>
             <a:endParaRPr lang="en-IN"/>
           </a:p>
@@ -604,7 +604,7 @@
           <a:p>
             <a:fld id="{54BB0E1A-2A42-4456-B338-6C031B28DAA4}" type="datetimeFigureOut">
               <a:rPr lang="en-IN" smtClean="0"/>
-              <a:t>28-03-2023</a:t>
+              <a:t>29-03-2023</a:t>
             </a:fld>
             <a:endParaRPr lang="en-IN"/>
           </a:p>
@@ -774,7 +774,7 @@
           <a:p>
             <a:fld id="{54BB0E1A-2A42-4456-B338-6C031B28DAA4}" type="datetimeFigureOut">
               <a:rPr lang="en-IN" smtClean="0"/>
-              <a:t>28-03-2023</a:t>
+              <a:t>29-03-2023</a:t>
             </a:fld>
             <a:endParaRPr lang="en-IN"/>
           </a:p>
@@ -1020,7 +1020,7 @@
           <a:p>
             <a:fld id="{54BB0E1A-2A42-4456-B338-6C031B28DAA4}" type="datetimeFigureOut">
               <a:rPr lang="en-IN" smtClean="0"/>
-              <a:t>28-03-2023</a:t>
+              <a:t>29-03-2023</a:t>
             </a:fld>
             <a:endParaRPr lang="en-IN"/>
           </a:p>
@@ -1252,7 +1252,7 @@
           <a:p>
             <a:fld id="{54BB0E1A-2A42-4456-B338-6C031B28DAA4}" type="datetimeFigureOut">
               <a:rPr lang="en-IN" smtClean="0"/>
-              <a:t>28-03-2023</a:t>
+              <a:t>29-03-2023</a:t>
             </a:fld>
             <a:endParaRPr lang="en-IN"/>
           </a:p>
@@ -1619,7 +1619,7 @@
           <a:p>
             <a:fld id="{54BB0E1A-2A42-4456-B338-6C031B28DAA4}" type="datetimeFigureOut">
               <a:rPr lang="en-IN" smtClean="0"/>
-              <a:t>28-03-2023</a:t>
+              <a:t>29-03-2023</a:t>
             </a:fld>
             <a:endParaRPr lang="en-IN"/>
           </a:p>
@@ -1737,7 +1737,7 @@
           <a:p>
             <a:fld id="{54BB0E1A-2A42-4456-B338-6C031B28DAA4}" type="datetimeFigureOut">
               <a:rPr lang="en-IN" smtClean="0"/>
-              <a:t>28-03-2023</a:t>
+              <a:t>29-03-2023</a:t>
             </a:fld>
             <a:endParaRPr lang="en-IN"/>
           </a:p>
@@ -1832,7 +1832,7 @@
           <a:p>
             <a:fld id="{54BB0E1A-2A42-4456-B338-6C031B28DAA4}" type="datetimeFigureOut">
               <a:rPr lang="en-IN" smtClean="0"/>
-              <a:t>28-03-2023</a:t>
+              <a:t>29-03-2023</a:t>
             </a:fld>
             <a:endParaRPr lang="en-IN"/>
           </a:p>
@@ -2109,7 +2109,7 @@
           <a:p>
             <a:fld id="{54BB0E1A-2A42-4456-B338-6C031B28DAA4}" type="datetimeFigureOut">
               <a:rPr lang="en-IN" smtClean="0"/>
-              <a:t>28-03-2023</a:t>
+              <a:t>29-03-2023</a:t>
             </a:fld>
             <a:endParaRPr lang="en-IN"/>
           </a:p>
@@ -2366,7 +2366,7 @@
           <a:p>
             <a:fld id="{54BB0E1A-2A42-4456-B338-6C031B28DAA4}" type="datetimeFigureOut">
               <a:rPr lang="en-IN" smtClean="0"/>
-              <a:t>28-03-2023</a:t>
+              <a:t>29-03-2023</a:t>
             </a:fld>
             <a:endParaRPr lang="en-IN"/>
           </a:p>
@@ -2579,7 +2579,7 @@
           <a:p>
             <a:fld id="{54BB0E1A-2A42-4456-B338-6C031B28DAA4}" type="datetimeFigureOut">
               <a:rPr lang="en-IN" smtClean="0"/>
-              <a:t>28-03-2023</a:t>
+              <a:t>29-03-2023</a:t>
             </a:fld>
             <a:endParaRPr lang="en-IN"/>
           </a:p>
@@ -4197,6 +4197,59 @@
             </a:endParaRPr>
           </a:p>
           <a:p>
+            <a:pPr marR="0" algn="just">
+              <a:lnSpc>
+                <a:spcPct val="95000"/>
+              </a:lnSpc>
+              <a:spcBef>
+                <a:spcPts val="0"/>
+              </a:spcBef>
+              <a:spcAft>
+                <a:spcPts val="600"/>
+              </a:spcAft>
+              <a:buFont typeface="Courier New" panose="02070309020205020404" pitchFamily="49" charset="0"/>
+              <a:buChar char="o"/>
+              <a:tabLst>
+                <a:tab pos="182880" algn="l"/>
+              </a:tabLst>
+            </a:pPr>
+            <a:r>
+              <a:rPr lang="en-US" sz="2000" spc="-5" dirty="0">
+                <a:latin typeface="Times New Roman" panose="02020603050405020304" pitchFamily="18" charset="0"/>
+                <a:ea typeface="SimSun" panose="02010600030101010101" pitchFamily="2" charset="-122"/>
+              </a:rPr>
+              <a:t>Unit test cases can be added as a future scope.</a:t>
+            </a:r>
+            <a:endParaRPr lang="en-US" sz="2000" spc="-5" dirty="0">
+              <a:effectLst/>
+              <a:latin typeface="Times New Roman" panose="02020603050405020304" pitchFamily="18" charset="0"/>
+              <a:ea typeface="SimSun" panose="02010600030101010101" pitchFamily="2" charset="-122"/>
+            </a:endParaRPr>
+          </a:p>
+          <a:p>
+            <a:pPr marR="0" algn="just">
+              <a:lnSpc>
+                <a:spcPct val="95000"/>
+              </a:lnSpc>
+              <a:spcBef>
+                <a:spcPts val="0"/>
+              </a:spcBef>
+              <a:spcAft>
+                <a:spcPts val="600"/>
+              </a:spcAft>
+              <a:buFont typeface="Courier New" panose="02070309020205020404" pitchFamily="49" charset="0"/>
+              <a:buChar char="o"/>
+              <a:tabLst>
+                <a:tab pos="182880" algn="l"/>
+              </a:tabLst>
+            </a:pPr>
+            <a:endParaRPr lang="en-US" sz="2000" spc="-5" dirty="0">
+              <a:effectLst/>
+              <a:latin typeface="Times New Roman" panose="02020603050405020304" pitchFamily="18" charset="0"/>
+              <a:ea typeface="SimSun" panose="02010600030101010101" pitchFamily="2" charset="-122"/>
+            </a:endParaRPr>
+          </a:p>
+          <a:p>
             <a:endParaRPr lang="en-US" dirty="0"/>
           </a:p>
         </p:txBody>

</xml_diff>

<commit_message>
Modified Presentation with High Level flow
</commit_message>
<xml_diff>
--- a/source/MySEProject/Documentation/ML2223_15 Approve Prediction of Multisequence Learning.pptx
+++ b/source/MySEProject/Documentation/ML2223_15 Approve Prediction of Multisequence Learning.pptx
@@ -8,8 +8,8 @@
     <p:sldId id="256" r:id="rId2"/>
     <p:sldId id="261" r:id="rId3"/>
     <p:sldId id="263" r:id="rId4"/>
-    <p:sldId id="264" r:id="rId5"/>
-    <p:sldId id="268" r:id="rId6"/>
+    <p:sldId id="275" r:id="rId5"/>
+    <p:sldId id="264" r:id="rId6"/>
     <p:sldId id="269" r:id="rId7"/>
     <p:sldId id="270" r:id="rId8"/>
     <p:sldId id="267" r:id="rId9"/>
@@ -254,7 +254,7 @@
           <a:p>
             <a:fld id="{54BB0E1A-2A42-4456-B338-6C031B28DAA4}" type="datetimeFigureOut">
               <a:rPr lang="en-IN" smtClean="0"/>
-              <a:t>28-03-2023</a:t>
+              <a:t>29-03-2023</a:t>
             </a:fld>
             <a:endParaRPr lang="en-IN"/>
           </a:p>
@@ -424,7 +424,7 @@
           <a:p>
             <a:fld id="{54BB0E1A-2A42-4456-B338-6C031B28DAA4}" type="datetimeFigureOut">
               <a:rPr lang="en-IN" smtClean="0"/>
-              <a:t>28-03-2023</a:t>
+              <a:t>29-03-2023</a:t>
             </a:fld>
             <a:endParaRPr lang="en-IN"/>
           </a:p>
@@ -604,7 +604,7 @@
           <a:p>
             <a:fld id="{54BB0E1A-2A42-4456-B338-6C031B28DAA4}" type="datetimeFigureOut">
               <a:rPr lang="en-IN" smtClean="0"/>
-              <a:t>28-03-2023</a:t>
+              <a:t>29-03-2023</a:t>
             </a:fld>
             <a:endParaRPr lang="en-IN"/>
           </a:p>
@@ -774,7 +774,7 @@
           <a:p>
             <a:fld id="{54BB0E1A-2A42-4456-B338-6C031B28DAA4}" type="datetimeFigureOut">
               <a:rPr lang="en-IN" smtClean="0"/>
-              <a:t>28-03-2023</a:t>
+              <a:t>29-03-2023</a:t>
             </a:fld>
             <a:endParaRPr lang="en-IN"/>
           </a:p>
@@ -1020,7 +1020,7 @@
           <a:p>
             <a:fld id="{54BB0E1A-2A42-4456-B338-6C031B28DAA4}" type="datetimeFigureOut">
               <a:rPr lang="en-IN" smtClean="0"/>
-              <a:t>28-03-2023</a:t>
+              <a:t>29-03-2023</a:t>
             </a:fld>
             <a:endParaRPr lang="en-IN"/>
           </a:p>
@@ -1252,7 +1252,7 @@
           <a:p>
             <a:fld id="{54BB0E1A-2A42-4456-B338-6C031B28DAA4}" type="datetimeFigureOut">
               <a:rPr lang="en-IN" smtClean="0"/>
-              <a:t>28-03-2023</a:t>
+              <a:t>29-03-2023</a:t>
             </a:fld>
             <a:endParaRPr lang="en-IN"/>
           </a:p>
@@ -1619,7 +1619,7 @@
           <a:p>
             <a:fld id="{54BB0E1A-2A42-4456-B338-6C031B28DAA4}" type="datetimeFigureOut">
               <a:rPr lang="en-IN" smtClean="0"/>
-              <a:t>28-03-2023</a:t>
+              <a:t>29-03-2023</a:t>
             </a:fld>
             <a:endParaRPr lang="en-IN"/>
           </a:p>
@@ -1737,7 +1737,7 @@
           <a:p>
             <a:fld id="{54BB0E1A-2A42-4456-B338-6C031B28DAA4}" type="datetimeFigureOut">
               <a:rPr lang="en-IN" smtClean="0"/>
-              <a:t>28-03-2023</a:t>
+              <a:t>29-03-2023</a:t>
             </a:fld>
             <a:endParaRPr lang="en-IN"/>
           </a:p>
@@ -1832,7 +1832,7 @@
           <a:p>
             <a:fld id="{54BB0E1A-2A42-4456-B338-6C031B28DAA4}" type="datetimeFigureOut">
               <a:rPr lang="en-IN" smtClean="0"/>
-              <a:t>28-03-2023</a:t>
+              <a:t>29-03-2023</a:t>
             </a:fld>
             <a:endParaRPr lang="en-IN"/>
           </a:p>
@@ -2109,7 +2109,7 @@
           <a:p>
             <a:fld id="{54BB0E1A-2A42-4456-B338-6C031B28DAA4}" type="datetimeFigureOut">
               <a:rPr lang="en-IN" smtClean="0"/>
-              <a:t>28-03-2023</a:t>
+              <a:t>29-03-2023</a:t>
             </a:fld>
             <a:endParaRPr lang="en-IN"/>
           </a:p>
@@ -2366,7 +2366,7 @@
           <a:p>
             <a:fld id="{54BB0E1A-2A42-4456-B338-6C031B28DAA4}" type="datetimeFigureOut">
               <a:rPr lang="en-IN" smtClean="0"/>
-              <a:t>28-03-2023</a:t>
+              <a:t>29-03-2023</a:t>
             </a:fld>
             <a:endParaRPr lang="en-IN"/>
           </a:p>
@@ -2579,7 +2579,7 @@
           <a:p>
             <a:fld id="{54BB0E1A-2A42-4456-B338-6C031B28DAA4}" type="datetimeFigureOut">
               <a:rPr lang="en-IN" smtClean="0"/>
-              <a:t>28-03-2023</a:t>
+              <a:t>29-03-2023</a:t>
             </a:fld>
             <a:endParaRPr lang="en-IN"/>
           </a:p>
@@ -3107,7 +3107,7 @@
                 <a:latin typeface="Arial" panose="020B0604020202020204" pitchFamily="34" charset="0"/>
                 <a:cs typeface="Arial" panose="020B0604020202020204" pitchFamily="34" charset="0"/>
               </a:rPr>
-              <a:t>15:</a:t>
+              <a:t>Team MSL:</a:t>
             </a:r>
             <a:endParaRPr lang="en-US" sz="1400" dirty="0">
               <a:latin typeface="Arial" panose="020B0604020202020204" pitchFamily="34" charset="0"/>
@@ -3214,7 +3214,7 @@
                 <a:latin typeface="Arial" panose="020B0604020202020204" pitchFamily="34" charset="0"/>
                 <a:cs typeface="Arial" panose="020B0604020202020204" pitchFamily="34" charset="0"/>
               </a:rPr>
-              <a:t>Pratik Desai</a:t>
+              <a:t>Pratik Desai(1438367)</a:t>
             </a:r>
             <a:endParaRPr lang="en-US" sz="1400" dirty="0">
               <a:latin typeface="Arial" panose="020B0604020202020204" pitchFamily="34" charset="0"/>
@@ -4197,6 +4197,59 @@
             </a:endParaRPr>
           </a:p>
           <a:p>
+            <a:pPr marR="0" algn="just">
+              <a:lnSpc>
+                <a:spcPct val="95000"/>
+              </a:lnSpc>
+              <a:spcBef>
+                <a:spcPts val="0"/>
+              </a:spcBef>
+              <a:spcAft>
+                <a:spcPts val="600"/>
+              </a:spcAft>
+              <a:buFont typeface="Courier New" panose="02070309020205020404" pitchFamily="49" charset="0"/>
+              <a:buChar char="o"/>
+              <a:tabLst>
+                <a:tab pos="182880" algn="l"/>
+              </a:tabLst>
+            </a:pPr>
+            <a:r>
+              <a:rPr lang="en-US" sz="2000" spc="-5" dirty="0">
+                <a:latin typeface="Times New Roman" panose="02020603050405020304" pitchFamily="18" charset="0"/>
+                <a:ea typeface="SimSun" panose="02010600030101010101" pitchFamily="2" charset="-122"/>
+              </a:rPr>
+              <a:t>Unit test cases can be added as a future scope.</a:t>
+            </a:r>
+            <a:endParaRPr lang="en-US" sz="2000" spc="-5" dirty="0">
+              <a:effectLst/>
+              <a:latin typeface="Times New Roman" panose="02020603050405020304" pitchFamily="18" charset="0"/>
+              <a:ea typeface="SimSun" panose="02010600030101010101" pitchFamily="2" charset="-122"/>
+            </a:endParaRPr>
+          </a:p>
+          <a:p>
+            <a:pPr marR="0" algn="just">
+              <a:lnSpc>
+                <a:spcPct val="95000"/>
+              </a:lnSpc>
+              <a:spcBef>
+                <a:spcPts val="0"/>
+              </a:spcBef>
+              <a:spcAft>
+                <a:spcPts val="600"/>
+              </a:spcAft>
+              <a:buFont typeface="Courier New" panose="02070309020205020404" pitchFamily="49" charset="0"/>
+              <a:buChar char="o"/>
+              <a:tabLst>
+                <a:tab pos="182880" algn="l"/>
+              </a:tabLst>
+            </a:pPr>
+            <a:endParaRPr lang="en-US" sz="2000" spc="-5" dirty="0">
+              <a:effectLst/>
+              <a:latin typeface="Times New Roman" panose="02020603050405020304" pitchFamily="18" charset="0"/>
+              <a:ea typeface="SimSun" panose="02010600030101010101" pitchFamily="2" charset="-122"/>
+            </a:endParaRPr>
+          </a:p>
+          <a:p>
             <a:endParaRPr lang="en-US" dirty="0"/>
           </a:p>
         </p:txBody>
@@ -4306,6 +4359,15 @@
             </a:pPr>
             <a:r>
               <a:rPr lang="en-IN" dirty="0"/>
+              <a:t>High Level Flow</a:t>
+            </a:r>
+          </a:p>
+          <a:p>
+            <a:pPr marL="514350" indent="-514350" algn="l">
+              <a:buAutoNum type="romanLcPeriod"/>
+            </a:pPr>
+            <a:r>
+              <a:rPr lang="en-IN" dirty="0"/>
               <a:t>Methodology</a:t>
             </a:r>
           </a:p>
@@ -4560,7 +4622,7 @@
           <p:cNvPr id="2" name="Title 1">
             <a:extLst>
               <a:ext uri="{FF2B5EF4-FFF2-40B4-BE49-F238E27FC236}">
-                <a16:creationId xmlns:a16="http://schemas.microsoft.com/office/drawing/2014/main" id="{C0185AB2-1AC0-838F-C66A-6ECBA5C94831}"/>
+                <a16:creationId xmlns:a16="http://schemas.microsoft.com/office/drawing/2014/main" id="{1C83DB53-FB1C-568B-C2A5-531AFBCAFE48}"/>
               </a:ext>
             </a:extLst>
           </p:cNvPr>
@@ -4568,97 +4630,36 @@
             <a:spLocks noGrp="1"/>
           </p:cNvSpPr>
           <p:nvPr>
-            <p:ph type="ctrTitle"/>
-          </p:nvPr>
-        </p:nvSpPr>
-        <p:spPr>
-          <a:xfrm>
-            <a:off x="1497563" y="158620"/>
-            <a:ext cx="9144000" cy="883719"/>
-          </a:xfrm>
-        </p:spPr>
-        <p:txBody>
-          <a:bodyPr>
-            <a:normAutofit fontScale="90000"/>
-          </a:bodyPr>
-          <a:lstStyle/>
-          <a:p>
-            <a:r>
-              <a:rPr lang="en-US" dirty="0"/>
-              <a:t>Methodology</a:t>
-            </a:r>
-            <a:endParaRPr lang="en-IN" dirty="0"/>
-          </a:p>
-        </p:txBody>
-      </p:sp>
-      <p:sp>
-        <p:nvSpPr>
-          <p:cNvPr id="3" name="Subtitle 2">
+            <p:ph type="title"/>
+          </p:nvPr>
+        </p:nvSpPr>
+        <p:spPr/>
+        <p:txBody>
+          <a:bodyPr/>
+          <a:lstStyle/>
+          <a:p>
+            <a:r>
+              <a:rPr lang="en-IN" dirty="0"/>
+              <a:t>High Level Flow</a:t>
+            </a:r>
+          </a:p>
+        </p:txBody>
+      </p:sp>
+      <p:pic>
+        <p:nvPicPr>
+          <p:cNvPr id="7" name="Content Placeholder 6" descr="Diagram, schematic">
             <a:extLst>
               <a:ext uri="{FF2B5EF4-FFF2-40B4-BE49-F238E27FC236}">
-                <a16:creationId xmlns:a16="http://schemas.microsoft.com/office/drawing/2014/main" id="{F40D817C-2D47-F9EC-B8CA-1150B27E0B4F}"/>
-              </a:ext>
-            </a:extLst>
-          </p:cNvPr>
-          <p:cNvSpPr>
-            <a:spLocks noGrp="1"/>
-          </p:cNvSpPr>
-          <p:nvPr>
-            <p:ph type="subTitle" idx="1"/>
-          </p:nvPr>
-        </p:nvSpPr>
-        <p:spPr>
-          <a:xfrm>
-            <a:off x="326571" y="1042339"/>
-            <a:ext cx="11485984" cy="5657041"/>
-          </a:xfrm>
-        </p:spPr>
-        <p:txBody>
-          <a:bodyPr>
-            <a:noAutofit/>
-          </a:bodyPr>
-          <a:lstStyle/>
-          <a:p>
-            <a:pPr algn="l"/>
-            <a:endParaRPr lang="en-IN" sz="2000" dirty="0"/>
-          </a:p>
-          <a:p>
-            <a:pPr algn="l"/>
-            <a:r>
-              <a:rPr lang="en-IN" sz="2000" dirty="0"/>
-              <a:t>The Multisequence Learning experiment executes in two phases:</a:t>
-            </a:r>
-          </a:p>
-          <a:p>
-            <a:pPr marL="457200" indent="-457200" algn="l">
-              <a:buAutoNum type="arabicPeriod"/>
-            </a:pPr>
-            <a:r>
-              <a:rPr lang="en-IN" sz="2000" dirty="0"/>
-              <a:t>Learning/Training Phase:</a:t>
-            </a:r>
-          </a:p>
-          <a:p>
-            <a:pPr marL="457200" indent="-457200" algn="l">
-              <a:buAutoNum type="arabicPeriod"/>
-            </a:pPr>
-            <a:endParaRPr lang="en-IN" sz="2000" dirty="0"/>
-          </a:p>
-        </p:txBody>
-      </p:sp>
-      <p:pic>
-        <p:nvPicPr>
-          <p:cNvPr id="6" name="Picture 5" descr="Diagram&#10;&#10;Description automatically generated">
-            <a:extLst>
-              <a:ext uri="{FF2B5EF4-FFF2-40B4-BE49-F238E27FC236}">
-                <a16:creationId xmlns:a16="http://schemas.microsoft.com/office/drawing/2014/main" id="{9C7F3941-C5A4-105F-5E84-9DC3DDFACD65}"/>
+                <a16:creationId xmlns:a16="http://schemas.microsoft.com/office/drawing/2014/main" id="{027E8489-A92D-122D-84C5-7FD718BB0C63}"/>
               </a:ext>
             </a:extLst>
           </p:cNvPr>
           <p:cNvPicPr>
-            <a:picLocks noChangeAspect="1"/>
+            <a:picLocks noGrp="1" noChangeAspect="1"/>
           </p:cNvPicPr>
-          <p:nvPr/>
+          <p:nvPr>
+            <p:ph idx="1"/>
+          </p:nvPr>
         </p:nvPicPr>
         <p:blipFill>
           <a:blip r:embed="rId2">
@@ -4674,122 +4675,15 @@
         </p:blipFill>
         <p:spPr>
           <a:xfrm>
-            <a:off x="931325" y="2293034"/>
-            <a:ext cx="3584404" cy="3981157"/>
+            <a:off x="2166424" y="1687441"/>
+            <a:ext cx="7568419" cy="3791743"/>
           </a:xfrm>
-          <a:prstGeom prst="rect">
-            <a:avLst/>
-          </a:prstGeom>
         </p:spPr>
       </p:pic>
-      <p:sp>
-        <p:nvSpPr>
-          <p:cNvPr id="9" name="TextBox 8">
-            <a:extLst>
-              <a:ext uri="{FF2B5EF4-FFF2-40B4-BE49-F238E27FC236}">
-                <a16:creationId xmlns:a16="http://schemas.microsoft.com/office/drawing/2014/main" id="{236D09C6-295F-BA81-3E10-2446D5F96EA0}"/>
-              </a:ext>
-            </a:extLst>
-          </p:cNvPr>
-          <p:cNvSpPr txBox="1"/>
-          <p:nvPr/>
-        </p:nvSpPr>
-        <p:spPr>
-          <a:xfrm>
-            <a:off x="5875988" y="2239026"/>
-            <a:ext cx="4332850" cy="3693319"/>
-          </a:xfrm>
-          <a:prstGeom prst="rect">
-            <a:avLst/>
-          </a:prstGeom>
-          <a:noFill/>
-        </p:spPr>
-        <p:txBody>
-          <a:bodyPr wrap="square" rtlCol="0">
-            <a:spAutoFit/>
-          </a:bodyPr>
-          <a:lstStyle/>
-          <a:p>
-            <a:pPr marL="285750" indent="-285750">
-              <a:buFont typeface="Courier New" panose="02070309020205020404" pitchFamily="49" charset="0"/>
-              <a:buChar char="o"/>
-            </a:pPr>
-            <a:r>
-              <a:rPr lang="en-US" sz="1800" dirty="0">
-                <a:effectLst/>
-                <a:latin typeface="Times New Roman" panose="02020603050405020304" pitchFamily="18" charset="0"/>
-                <a:ea typeface="SimSun" panose="02010600030101010101" pitchFamily="2" charset="-122"/>
-              </a:rPr>
-              <a:t>In learning phase input data sequences are getting passed to </a:t>
-            </a:r>
-            <a:r>
-              <a:rPr lang="en-US" sz="1800" i="1" dirty="0">
-                <a:effectLst/>
-                <a:latin typeface="Times New Roman" panose="02020603050405020304" pitchFamily="18" charset="0"/>
-                <a:ea typeface="SimSun" panose="02010600030101010101" pitchFamily="2" charset="-122"/>
-              </a:rPr>
-              <a:t>RunExperiment()</a:t>
-            </a:r>
-            <a:r>
-              <a:rPr lang="en-US" sz="1800" dirty="0">
-                <a:effectLst/>
-                <a:latin typeface="Times New Roman" panose="02020603050405020304" pitchFamily="18" charset="0"/>
-                <a:ea typeface="SimSun" panose="02010600030101010101" pitchFamily="2" charset="-122"/>
-              </a:rPr>
-              <a:t> method. </a:t>
-            </a:r>
-          </a:p>
-          <a:p>
-            <a:pPr marL="285750" indent="-285750">
-              <a:buFont typeface="Courier New" panose="02070309020205020404" pitchFamily="49" charset="0"/>
-              <a:buChar char="o"/>
-            </a:pPr>
-            <a:r>
-              <a:rPr lang="en-US" sz="1800" dirty="0">
-                <a:effectLst/>
-                <a:latin typeface="Times New Roman" panose="02020603050405020304" pitchFamily="18" charset="0"/>
-                <a:ea typeface="SimSun" panose="02010600030101010101" pitchFamily="2" charset="-122"/>
-              </a:rPr>
-              <a:t>In </a:t>
-            </a:r>
-            <a:r>
-              <a:rPr lang="en-US" sz="1800" i="1" dirty="0">
-                <a:effectLst/>
-                <a:latin typeface="Times New Roman" panose="02020603050405020304" pitchFamily="18" charset="0"/>
-                <a:ea typeface="SimSun" panose="02010600030101010101" pitchFamily="2" charset="-122"/>
-              </a:rPr>
-              <a:t>RunExperiment()</a:t>
-            </a:r>
-            <a:r>
-              <a:rPr lang="en-US" sz="1800" dirty="0">
-                <a:effectLst/>
-                <a:latin typeface="Times New Roman" panose="02020603050405020304" pitchFamily="18" charset="0"/>
-                <a:ea typeface="SimSun" panose="02010600030101010101" pitchFamily="2" charset="-122"/>
-              </a:rPr>
-              <a:t> method training of input sequences is done using Cortex Layer, Spatial Pooler, Homeostatic Plasticity Controller which checks the stability of spatial pooler.</a:t>
-            </a:r>
-          </a:p>
-          <a:p>
-            <a:pPr marL="285750" indent="-285750">
-              <a:buFont typeface="Courier New" panose="02070309020205020404" pitchFamily="49" charset="0"/>
-              <a:buChar char="o"/>
-            </a:pPr>
-            <a:r>
-              <a:rPr lang="en-US" sz="1800" dirty="0">
-                <a:effectLst/>
-                <a:latin typeface="Times New Roman" panose="02020603050405020304" pitchFamily="18" charset="0"/>
-                <a:ea typeface="SimSun" panose="02010600030101010101" pitchFamily="2" charset="-122"/>
-              </a:rPr>
-              <a:t>Training of input sequences is required to get the stable state of Spatial pooler. Newborn cycles are generated for each input sequence till the time Spatial pooler reach the stable state. </a:t>
-            </a:r>
-            <a:endParaRPr lang="en-US" dirty="0"/>
-          </a:p>
-        </p:txBody>
-      </p:sp>
     </p:spTree>
     <p:extLst>
       <p:ext uri="{BB962C8B-B14F-4D97-AF65-F5344CB8AC3E}">
-        <p14:creationId xmlns:p14="http://schemas.microsoft.com/office/powerpoint/2010/main" val="1440808793"/>
+        <p14:creationId xmlns:p14="http://schemas.microsoft.com/office/powerpoint/2010/main" val="1257158774"/>
       </p:ext>
     </p:extLst>
   </p:cSld>
@@ -4840,15 +4734,15 @@
         </p:spPr>
         <p:txBody>
           <a:bodyPr>
-            <a:normAutofit fontScale="90000"/>
+            <a:normAutofit/>
           </a:bodyPr>
           <a:lstStyle/>
           <a:p>
             <a:r>
-              <a:rPr lang="en-US" dirty="0"/>
-              <a:t>Methodology</a:t>
-            </a:r>
-            <a:endParaRPr lang="en-IN" dirty="0"/>
+              <a:rPr lang="en-US" sz="4400" dirty="0"/>
+              <a:t>High Level Flow</a:t>
+            </a:r>
+            <a:endParaRPr lang="en-IN" sz="4400" dirty="0"/>
           </a:p>
         </p:txBody>
       </p:sp>
@@ -4887,248 +4781,154 @@
             <a:pPr algn="l"/>
             <a:r>
               <a:rPr lang="en-IN" sz="2000" dirty="0"/>
-              <a:t>2. Prediction and Accuracy Calculation phase:</a:t>
-            </a:r>
-          </a:p>
-          <a:p>
-            <a:pPr algn="l"/>
-            <a:endParaRPr lang="en-IN" sz="2000" dirty="0"/>
-          </a:p>
-          <a:p>
-            <a:pPr marL="457200" indent="-457200" algn="l">
-              <a:buAutoNum type="arabicPeriod"/>
-            </a:pPr>
-            <a:endParaRPr lang="en-IN" sz="2000" dirty="0"/>
-          </a:p>
-        </p:txBody>
-      </p:sp>
-      <p:sp>
-        <p:nvSpPr>
-          <p:cNvPr id="9" name="TextBox 8">
-            <a:extLst>
-              <a:ext uri="{FF2B5EF4-FFF2-40B4-BE49-F238E27FC236}">
-                <a16:creationId xmlns:a16="http://schemas.microsoft.com/office/drawing/2014/main" id="{236D09C6-295F-BA81-3E10-2446D5F96EA0}"/>
-              </a:ext>
-            </a:extLst>
-          </p:cNvPr>
-          <p:cNvSpPr txBox="1"/>
-          <p:nvPr/>
-        </p:nvSpPr>
-        <p:spPr>
-          <a:xfrm>
-            <a:off x="6308712" y="1926058"/>
-            <a:ext cx="4565613" cy="3693319"/>
-          </a:xfrm>
-          <a:prstGeom prst="rect">
-            <a:avLst/>
-          </a:prstGeom>
-          <a:noFill/>
-        </p:spPr>
-        <p:txBody>
-          <a:bodyPr wrap="square" rtlCol="0">
-            <a:spAutoFit/>
-          </a:bodyPr>
-          <a:lstStyle/>
-          <a:p>
-            <a:pPr marL="422910" marR="0" indent="-285750" algn="just">
+              <a:t>The Multisequence Learning experiment executes in two phases:</a:t>
+            </a:r>
+          </a:p>
+          <a:p>
+            <a:pPr algn="just"/>
+            <a:r>
+              <a:rPr lang="en-IN" sz="2000" dirty="0"/>
+              <a:t>1. Learning/Training Phase : </a:t>
+            </a:r>
+          </a:p>
+          <a:p>
+            <a:pPr marL="342900" indent="-342900" algn="just">
+              <a:buFont typeface="Arial" panose="020B0604020202020204" pitchFamily="34" charset="0"/>
+              <a:buChar char="•"/>
+            </a:pPr>
+            <a:r>
+              <a:rPr lang="en-US" sz="2000" dirty="0"/>
+              <a:t>In learning phase input data sequences are getting passed to </a:t>
+            </a:r>
+            <a:r>
+              <a:rPr lang="en-US" sz="2000" i="1" dirty="0"/>
+              <a:t>RunExperiment</a:t>
+            </a:r>
+            <a:r>
+              <a:rPr lang="en-US" sz="2000" dirty="0"/>
+              <a:t>() method.  </a:t>
+            </a:r>
+          </a:p>
+          <a:p>
+            <a:pPr marL="342900" indent="-342900" algn="just">
+              <a:buFont typeface="Arial" panose="020B0604020202020204" pitchFamily="34" charset="0"/>
+              <a:buChar char="•"/>
+            </a:pPr>
+            <a:r>
+              <a:rPr lang="en-US" sz="2000" dirty="0"/>
+              <a:t>In </a:t>
+            </a:r>
+            <a:r>
+              <a:rPr lang="en-US" sz="2000" i="1" dirty="0"/>
+              <a:t>RunExperiment</a:t>
+            </a:r>
+            <a:r>
+              <a:rPr lang="en-US" sz="2000" dirty="0"/>
+              <a:t>() method training of input sequences is done using Spatial Pooler, Homeostatic Plasticity Controller which checks the stability of spatial pooler.</a:t>
+            </a:r>
+          </a:p>
+          <a:p>
+            <a:pPr marL="342900" indent="-342900" algn="just">
+              <a:buFont typeface="Arial" panose="020B0604020202020204" pitchFamily="34" charset="0"/>
+              <a:buChar char="•"/>
+            </a:pPr>
+            <a:r>
+              <a:rPr lang="en-US" sz="2000" dirty="0"/>
+              <a:t>Training of input sequences is required to get the stable state of Spatial pooler. Once spatial pooler and Temporal memory gets trained training phase is completed.</a:t>
+            </a:r>
+          </a:p>
+          <a:p>
+            <a:pPr algn="just"/>
+            <a:endParaRPr lang="en-US" sz="2000" dirty="0"/>
+          </a:p>
+          <a:p>
+            <a:pPr algn="just"/>
+            <a:r>
+              <a:rPr lang="en-US" sz="2000" dirty="0"/>
+              <a:t>2. Prediction Phase: </a:t>
+            </a:r>
+          </a:p>
+          <a:p>
+            <a:pPr marL="480060" marR="0" indent="-342900" algn="just">
               <a:spcBef>
                 <a:spcPts val="0"/>
               </a:spcBef>
               <a:spcAft>
                 <a:spcPts val="0"/>
               </a:spcAft>
-              <a:buFont typeface="Courier New" panose="02070309020205020404" pitchFamily="49" charset="0"/>
-              <a:buChar char="o"/>
-            </a:pPr>
-            <a:r>
-              <a:rPr lang="en-US" sz="1800" i="1" dirty="0" err="1">
-                <a:effectLst/>
-                <a:latin typeface="Times New Roman" panose="02020603050405020304" pitchFamily="18" charset="0"/>
-                <a:ea typeface="SimSun" panose="02010600030101010101" pitchFamily="2" charset="-122"/>
-              </a:rPr>
-              <a:t>PredictNextElement</a:t>
-            </a:r>
-            <a:r>
-              <a:rPr lang="en-US" sz="1800" i="1" dirty="0">
-                <a:effectLst/>
-                <a:latin typeface="Times New Roman" panose="02020603050405020304" pitchFamily="18" charset="0"/>
-                <a:ea typeface="SimSun" panose="02010600030101010101" pitchFamily="2" charset="-122"/>
-              </a:rPr>
-              <a:t>()</a:t>
-            </a:r>
-            <a:r>
-              <a:rPr lang="en-US" sz="1800" dirty="0">
-                <a:effectLst/>
-                <a:latin typeface="Times New Roman" panose="02020603050405020304" pitchFamily="18" charset="0"/>
-                <a:ea typeface="SimSun" panose="02010600030101010101" pitchFamily="2" charset="-122"/>
-              </a:rPr>
-              <a:t> method and Predictor class is used for prediction.</a:t>
-            </a:r>
-          </a:p>
-          <a:p>
-            <a:pPr marL="422910" marR="0" indent="-285750" algn="just">
+              <a:buFont typeface="Arial" panose="020B0604020202020204" pitchFamily="34" charset="0"/>
+              <a:buChar char="•"/>
+            </a:pPr>
+            <a:r>
+              <a:rPr lang="en-US" sz="2000" dirty="0"/>
+              <a:t>After the learning process, the algorithm returns the instance of Predictor class. This class provides </a:t>
+            </a:r>
+            <a:r>
+              <a:rPr lang="en-US" sz="2000" i="1" dirty="0"/>
+              <a:t>Predict</a:t>
+            </a:r>
+            <a:r>
+              <a:rPr lang="en-US" sz="2000" dirty="0"/>
+              <a:t>() method with a list of input elements.</a:t>
+            </a:r>
+          </a:p>
+          <a:p>
+            <a:pPr marL="480060" marR="0" indent="-342900" algn="just">
               <a:spcBef>
                 <a:spcPts val="0"/>
               </a:spcBef>
               <a:spcAft>
                 <a:spcPts val="0"/>
               </a:spcAft>
-              <a:buFont typeface="Courier New" panose="02070309020205020404" pitchFamily="49" charset="0"/>
-              <a:buChar char="o"/>
-            </a:pPr>
-            <a:r>
-              <a:rPr lang="en-US" sz="1800" dirty="0">
-                <a:effectLst/>
-                <a:latin typeface="Times New Roman" panose="02020603050405020304" pitchFamily="18" charset="0"/>
-                <a:ea typeface="SimSun" panose="02010600030101010101" pitchFamily="2" charset="-122"/>
-              </a:rPr>
-              <a:t>After the learning process, the algorithm returns the instance of Predictor class. This class provides </a:t>
-            </a:r>
-            <a:r>
-              <a:rPr lang="en-US" sz="1800" i="1" dirty="0">
-                <a:effectLst/>
-                <a:latin typeface="Times New Roman" panose="02020603050405020304" pitchFamily="18" charset="0"/>
-                <a:ea typeface="SimSun" panose="02010600030101010101" pitchFamily="2" charset="-122"/>
-              </a:rPr>
-              <a:t>Predict()</a:t>
-            </a:r>
-            <a:r>
-              <a:rPr lang="en-US" sz="1800" dirty="0">
-                <a:effectLst/>
-                <a:latin typeface="Times New Roman" panose="02020603050405020304" pitchFamily="18" charset="0"/>
-                <a:ea typeface="SimSun" panose="02010600030101010101" pitchFamily="2" charset="-122"/>
-              </a:rPr>
-              <a:t> method with a list of input elements.</a:t>
-            </a:r>
-          </a:p>
-          <a:p>
-            <a:pPr marL="422910" marR="0" indent="-285750" algn="just">
+              <a:buFont typeface="Arial" panose="020B0604020202020204" pitchFamily="34" charset="0"/>
+              <a:buChar char="•"/>
+            </a:pPr>
+            <a:r>
+              <a:rPr lang="en-US" sz="2000" dirty="0"/>
+              <a:t>For every presented input element, the predictor tries to predict the next element. </a:t>
+            </a:r>
+          </a:p>
+          <a:p>
+            <a:pPr marL="480060" marR="0" indent="-342900" algn="just">
               <a:spcBef>
                 <a:spcPts val="0"/>
               </a:spcBef>
               <a:spcAft>
                 <a:spcPts val="0"/>
               </a:spcAft>
-              <a:buFont typeface="Courier New" panose="02070309020205020404" pitchFamily="49" charset="0"/>
-              <a:buChar char="o"/>
-            </a:pPr>
-            <a:r>
-              <a:rPr lang="en-US" sz="1800" dirty="0">
-                <a:effectLst/>
-                <a:latin typeface="Times New Roman" panose="02020603050405020304" pitchFamily="18" charset="0"/>
-                <a:ea typeface="SimSun" panose="02010600030101010101" pitchFamily="2" charset="-122"/>
-              </a:rPr>
-              <a:t>For every presented input element, the predictor tries to predict the next element. </a:t>
-            </a:r>
-          </a:p>
-          <a:p>
-            <a:pPr marL="422910" marR="0" indent="-285750" algn="just">
-              <a:spcBef>
-                <a:spcPts val="0"/>
-              </a:spcBef>
-              <a:spcAft>
-                <a:spcPts val="0"/>
-              </a:spcAft>
-              <a:buFont typeface="Courier New" panose="02070309020205020404" pitchFamily="49" charset="0"/>
-              <a:buChar char="o"/>
-            </a:pPr>
-            <a:r>
-              <a:rPr lang="en-US" dirty="0">
-                <a:latin typeface="Times New Roman" panose="02020603050405020304" pitchFamily="18" charset="0"/>
-                <a:ea typeface="SimSun" panose="02010600030101010101" pitchFamily="2" charset="-122"/>
-              </a:rPr>
+              <a:buFont typeface="Arial" panose="020B0604020202020204" pitchFamily="34" charset="0"/>
+              <a:buChar char="•"/>
+            </a:pPr>
+            <a:r>
+              <a:rPr lang="en-US" sz="2000" dirty="0"/>
               <a:t>In </a:t>
             </a:r>
             <a:r>
-              <a:rPr lang="en-US" sz="1800" i="1" dirty="0" err="1">
-                <a:effectLst/>
-                <a:latin typeface="Times New Roman" panose="02020603050405020304" pitchFamily="18" charset="0"/>
-                <a:ea typeface="SimSun" panose="02010600030101010101" pitchFamily="2" charset="-122"/>
-              </a:rPr>
+              <a:rPr lang="en-US" sz="2000" i="1" dirty="0" err="1"/>
               <a:t>PredictNextElement</a:t>
             </a:r>
             <a:r>
-              <a:rPr lang="en-US" sz="1800" i="1" dirty="0">
-                <a:effectLst/>
-                <a:latin typeface="Times New Roman" panose="02020603050405020304" pitchFamily="18" charset="0"/>
-                <a:ea typeface="SimSun" panose="02010600030101010101" pitchFamily="2" charset="-122"/>
-              </a:rPr>
-              <a:t>()</a:t>
-            </a:r>
-            <a:r>
-              <a:rPr lang="en-US" dirty="0">
-                <a:latin typeface="Times New Roman" panose="02020603050405020304" pitchFamily="18" charset="0"/>
-                <a:ea typeface="SimSun" panose="02010600030101010101" pitchFamily="2" charset="-122"/>
-              </a:rPr>
-              <a:t> method, team has added implemented below formula to calculate accuracy.</a:t>
-            </a:r>
-          </a:p>
-          <a:p>
-            <a:pPr marL="422910" marR="0" indent="-285750" algn="just">
-              <a:spcBef>
-                <a:spcPts val="0"/>
-              </a:spcBef>
-              <a:spcAft>
-                <a:spcPts val="0"/>
-              </a:spcAft>
-              <a:buFont typeface="Courier New" panose="02070309020205020404" pitchFamily="49" charset="0"/>
-              <a:buChar char="o"/>
-            </a:pPr>
-            <a:r>
-              <a:rPr lang="en-US" dirty="0">
-                <a:latin typeface="Times New Roman" panose="02020603050405020304" pitchFamily="18" charset="0"/>
-                <a:ea typeface="SimSun" panose="02010600030101010101" pitchFamily="2" charset="-122"/>
-              </a:rPr>
-              <a:t>Accuracy = (count of matches/total number of predictions) * 100 %</a:t>
-            </a:r>
-            <a:endParaRPr lang="en-US" dirty="0">
-              <a:effectLst/>
-              <a:latin typeface="Times New Roman" panose="02020603050405020304" pitchFamily="18" charset="0"/>
-              <a:ea typeface="SimSun" panose="02010600030101010101" pitchFamily="2" charset="-122"/>
-            </a:endParaRPr>
-          </a:p>
-        </p:txBody>
-      </p:sp>
-      <p:pic>
-        <p:nvPicPr>
-          <p:cNvPr id="5" name="Picture 4" descr="Diagram&#10;&#10;Description automatically generated">
-            <a:extLst>
-              <a:ext uri="{FF2B5EF4-FFF2-40B4-BE49-F238E27FC236}">
-                <a16:creationId xmlns:a16="http://schemas.microsoft.com/office/drawing/2014/main" id="{C1C1B4F0-A367-5CE8-423B-CDF0C4939906}"/>
-              </a:ext>
-            </a:extLst>
-          </p:cNvPr>
-          <p:cNvPicPr>
-            <a:picLocks noChangeAspect="1"/>
-          </p:cNvPicPr>
-          <p:nvPr/>
-        </p:nvPicPr>
-        <p:blipFill>
-          <a:blip r:embed="rId2">
-            <a:extLst>
-              <a:ext uri="{28A0092B-C50C-407E-A947-70E740481C1C}">
-                <a14:useLocalDpi xmlns:a14="http://schemas.microsoft.com/office/drawing/2010/main" val="0"/>
-              </a:ext>
-            </a:extLst>
-          </a:blip>
-          <a:stretch>
-            <a:fillRect/>
-          </a:stretch>
-        </p:blipFill>
-        <p:spPr>
-          <a:xfrm>
-            <a:off x="717452" y="1915328"/>
-            <a:ext cx="4684541" cy="4386998"/>
-          </a:xfrm>
-          <a:prstGeom prst="rect">
-            <a:avLst/>
-          </a:prstGeom>
-        </p:spPr>
-      </p:pic>
+              <a:rPr lang="en-US" sz="2000" dirty="0"/>
+              <a:t>() method, team has added implemented accuracy calculation logic.</a:t>
+            </a:r>
+            <a:endParaRPr lang="en-US" dirty="0"/>
+          </a:p>
+          <a:p>
+            <a:pPr algn="just"/>
+            <a:endParaRPr lang="en-US" sz="1600" dirty="0"/>
+          </a:p>
+          <a:p>
+            <a:pPr marL="457200" indent="-457200" algn="l">
+              <a:buAutoNum type="arabicPeriod"/>
+            </a:pPr>
+            <a:endParaRPr lang="en-IN" sz="2000" dirty="0"/>
+          </a:p>
+        </p:txBody>
+      </p:sp>
     </p:spTree>
     <p:extLst>
       <p:ext uri="{BB962C8B-B14F-4D97-AF65-F5344CB8AC3E}">
-        <p14:creationId xmlns:p14="http://schemas.microsoft.com/office/powerpoint/2010/main" val="248676150"/>
+        <p14:creationId xmlns:p14="http://schemas.microsoft.com/office/powerpoint/2010/main" val="1440808793"/>
       </p:ext>
     </p:extLst>
   </p:cSld>

</xml_diff>

<commit_message>
Multiple Sequence Testing Files added
</commit_message>
<xml_diff>
--- a/source/MySEProject/Documentation/ML2223_15 Approve Prediction of Multisequence Learning.pptx
+++ b/source/MySEProject/Documentation/ML2223_15 Approve Prediction of Multisequence Learning.pptx
@@ -4972,7 +4972,7 @@
         </p:nvSpPr>
         <p:spPr>
           <a:xfrm>
-            <a:off x="1497563" y="158620"/>
+            <a:off x="326571" y="417927"/>
             <a:ext cx="9144000" cy="883719"/>
           </a:xfrm>
         </p:spPr>
@@ -4982,6 +4982,7 @@
           </a:bodyPr>
           <a:lstStyle/>
           <a:p>
+            <a:pPr algn="l"/>
             <a:r>
               <a:rPr lang="en-US" dirty="0"/>
               <a:t>Methodology</a:t>
@@ -5008,8 +5009,8 @@
         </p:nvSpPr>
         <p:spPr>
           <a:xfrm>
-            <a:off x="326571" y="1042339"/>
-            <a:ext cx="11485984" cy="5657041"/>
+            <a:off x="326571" y="1301646"/>
+            <a:ext cx="11485984" cy="5397734"/>
           </a:xfrm>
         </p:spPr>
         <p:txBody>
@@ -5067,12 +5068,20 @@
               <a:buAutoNum type="arabicPeriod"/>
             </a:pPr>
             <a:r>
+              <a:rPr lang="en-US" sz="1800" dirty="0" err="1">
+                <a:effectLst/>
+                <a:latin typeface="Times New Roman" panose="02020603050405020304" pitchFamily="18" charset="0"/>
+                <a:ea typeface="SimSun" panose="02010600030101010101" pitchFamily="2" charset="-122"/>
+              </a:rPr>
+              <a:t>GetInputFromExcelFile</a:t>
+            </a:r>
+            <a:r>
               <a:rPr lang="en-US" sz="1800" dirty="0">
                 <a:effectLst/>
                 <a:latin typeface="Times New Roman" panose="02020603050405020304" pitchFamily="18" charset="0"/>
                 <a:ea typeface="SimSun" panose="02010600030101010101" pitchFamily="2" charset="-122"/>
               </a:rPr>
-              <a:t>GetInputFromExcelFile()</a:t>
+              <a:t>( )</a:t>
             </a:r>
           </a:p>
           <a:p>

</xml_diff>

<commit_message>
Report Formatted as per IEEE standard
</commit_message>
<xml_diff>
--- a/source/MySEProject/Documentation/ML2223_15 Approve Prediction of Multisequence Learning.pptx
+++ b/source/MySEProject/Documentation/ML2223_15 Approve Prediction of Multisequence Learning.pptx
@@ -254,7 +254,7 @@
           <a:p>
             <a:fld id="{54BB0E1A-2A42-4456-B338-6C031B28DAA4}" type="datetimeFigureOut">
               <a:rPr lang="en-IN" smtClean="0"/>
-              <a:t>29-03-2023</a:t>
+              <a:t>30-03-2023</a:t>
             </a:fld>
             <a:endParaRPr lang="en-IN"/>
           </a:p>
@@ -424,7 +424,7 @@
           <a:p>
             <a:fld id="{54BB0E1A-2A42-4456-B338-6C031B28DAA4}" type="datetimeFigureOut">
               <a:rPr lang="en-IN" smtClean="0"/>
-              <a:t>29-03-2023</a:t>
+              <a:t>30-03-2023</a:t>
             </a:fld>
             <a:endParaRPr lang="en-IN"/>
           </a:p>
@@ -604,7 +604,7 @@
           <a:p>
             <a:fld id="{54BB0E1A-2A42-4456-B338-6C031B28DAA4}" type="datetimeFigureOut">
               <a:rPr lang="en-IN" smtClean="0"/>
-              <a:t>29-03-2023</a:t>
+              <a:t>30-03-2023</a:t>
             </a:fld>
             <a:endParaRPr lang="en-IN"/>
           </a:p>
@@ -774,7 +774,7 @@
           <a:p>
             <a:fld id="{54BB0E1A-2A42-4456-B338-6C031B28DAA4}" type="datetimeFigureOut">
               <a:rPr lang="en-IN" smtClean="0"/>
-              <a:t>29-03-2023</a:t>
+              <a:t>30-03-2023</a:t>
             </a:fld>
             <a:endParaRPr lang="en-IN"/>
           </a:p>
@@ -1020,7 +1020,7 @@
           <a:p>
             <a:fld id="{54BB0E1A-2A42-4456-B338-6C031B28DAA4}" type="datetimeFigureOut">
               <a:rPr lang="en-IN" smtClean="0"/>
-              <a:t>29-03-2023</a:t>
+              <a:t>30-03-2023</a:t>
             </a:fld>
             <a:endParaRPr lang="en-IN"/>
           </a:p>
@@ -1252,7 +1252,7 @@
           <a:p>
             <a:fld id="{54BB0E1A-2A42-4456-B338-6C031B28DAA4}" type="datetimeFigureOut">
               <a:rPr lang="en-IN" smtClean="0"/>
-              <a:t>29-03-2023</a:t>
+              <a:t>30-03-2023</a:t>
             </a:fld>
             <a:endParaRPr lang="en-IN"/>
           </a:p>
@@ -1619,7 +1619,7 @@
           <a:p>
             <a:fld id="{54BB0E1A-2A42-4456-B338-6C031B28DAA4}" type="datetimeFigureOut">
               <a:rPr lang="en-IN" smtClean="0"/>
-              <a:t>29-03-2023</a:t>
+              <a:t>30-03-2023</a:t>
             </a:fld>
             <a:endParaRPr lang="en-IN"/>
           </a:p>
@@ -1737,7 +1737,7 @@
           <a:p>
             <a:fld id="{54BB0E1A-2A42-4456-B338-6C031B28DAA4}" type="datetimeFigureOut">
               <a:rPr lang="en-IN" smtClean="0"/>
-              <a:t>29-03-2023</a:t>
+              <a:t>30-03-2023</a:t>
             </a:fld>
             <a:endParaRPr lang="en-IN"/>
           </a:p>
@@ -1832,7 +1832,7 @@
           <a:p>
             <a:fld id="{54BB0E1A-2A42-4456-B338-6C031B28DAA4}" type="datetimeFigureOut">
               <a:rPr lang="en-IN" smtClean="0"/>
-              <a:t>29-03-2023</a:t>
+              <a:t>30-03-2023</a:t>
             </a:fld>
             <a:endParaRPr lang="en-IN"/>
           </a:p>
@@ -2109,7 +2109,7 @@
           <a:p>
             <a:fld id="{54BB0E1A-2A42-4456-B338-6C031B28DAA4}" type="datetimeFigureOut">
               <a:rPr lang="en-IN" smtClean="0"/>
-              <a:t>29-03-2023</a:t>
+              <a:t>30-03-2023</a:t>
             </a:fld>
             <a:endParaRPr lang="en-IN"/>
           </a:p>
@@ -2366,7 +2366,7 @@
           <a:p>
             <a:fld id="{54BB0E1A-2A42-4456-B338-6C031B28DAA4}" type="datetimeFigureOut">
               <a:rPr lang="en-IN" smtClean="0"/>
-              <a:t>29-03-2023</a:t>
+              <a:t>30-03-2023</a:t>
             </a:fld>
             <a:endParaRPr lang="en-IN"/>
           </a:p>
@@ -2579,7 +2579,7 @@
           <a:p>
             <a:fld id="{54BB0E1A-2A42-4456-B338-6C031B28DAA4}" type="datetimeFigureOut">
               <a:rPr lang="en-IN" smtClean="0"/>
-              <a:t>29-03-2023</a:t>
+              <a:t>30-03-2023</a:t>
             </a:fld>
             <a:endParaRPr lang="en-IN"/>
           </a:p>
@@ -3013,15 +3013,15 @@
           <a:lstStyle/>
           <a:p>
             <a:r>
-              <a:rPr lang="en-US" sz="2800" b="1" u="sng" dirty="0">
-                <a:latin typeface="Arial" panose="020B0604020202020204" pitchFamily="34" charset="0"/>
-                <a:cs typeface="Arial" panose="020B0604020202020204" pitchFamily="34" charset="0"/>
-              </a:rPr>
-              <a:t>ML2223-15 Approve Prediction of Multisequence Learning</a:t>
-            </a:r>
-            <a:endParaRPr lang="en-IN" sz="2800" b="1" u="sng" dirty="0">
-              <a:latin typeface="Arial" panose="020B0604020202020204" pitchFamily="34" charset="0"/>
-              <a:cs typeface="Arial" panose="020B0604020202020204" pitchFamily="34" charset="0"/>
+              <a:rPr lang="en-US" sz="4000" dirty="0">
+                <a:latin typeface="Times New Roman" panose="02020603050405020304" pitchFamily="18" charset="0"/>
+                <a:cs typeface="Times New Roman" panose="02020603050405020304" pitchFamily="18" charset="0"/>
+              </a:rPr>
+              <a:t>Approve Prediction of Multisequence Learning</a:t>
+            </a:r>
+            <a:endParaRPr lang="en-IN" sz="4000" dirty="0">
+              <a:latin typeface="Times New Roman" panose="02020603050405020304" pitchFamily="18" charset="0"/>
+              <a:cs typeface="Times New Roman" panose="02020603050405020304" pitchFamily="18" charset="0"/>
             </a:endParaRPr>
           </a:p>
         </p:txBody>
@@ -3045,7 +3045,7 @@
         <p:spPr>
           <a:xfrm>
             <a:off x="381001" y="3429000"/>
-            <a:ext cx="3747411" cy="3075215"/>
+            <a:ext cx="4416082" cy="3075215"/>
           </a:xfrm>
         </p:spPr>
         <p:txBody>
@@ -3061,57 +3061,57 @@
               </a:spcBef>
             </a:pPr>
             <a:r>
-              <a:rPr lang="en-US" sz="1400" dirty="0">
-                <a:latin typeface="Arial" panose="020B0604020202020204" pitchFamily="34" charset="0"/>
-                <a:cs typeface="Arial" panose="020B0604020202020204" pitchFamily="34" charset="0"/>
+              <a:rPr lang="en-US" sz="2000" dirty="0">
+                <a:latin typeface="Times New Roman" panose="02020603050405020304" pitchFamily="18" charset="0"/>
+                <a:cs typeface="Times New Roman" panose="02020603050405020304" pitchFamily="18" charset="0"/>
               </a:rPr>
               <a:t>Prepared</a:t>
             </a:r>
             <a:r>
-              <a:rPr lang="en-US" sz="1400" spc="-40" dirty="0">
-                <a:latin typeface="Arial" panose="020B0604020202020204" pitchFamily="34" charset="0"/>
-                <a:cs typeface="Arial" panose="020B0604020202020204" pitchFamily="34" charset="0"/>
+              <a:rPr lang="en-US" sz="2000" spc="-40" dirty="0">
+                <a:latin typeface="Times New Roman" panose="02020603050405020304" pitchFamily="18" charset="0"/>
+                <a:cs typeface="Times New Roman" panose="02020603050405020304" pitchFamily="18" charset="0"/>
               </a:rPr>
               <a:t> </a:t>
             </a:r>
             <a:r>
-              <a:rPr lang="en-US" sz="1400" dirty="0">
-                <a:latin typeface="Arial" panose="020B0604020202020204" pitchFamily="34" charset="0"/>
-                <a:cs typeface="Arial" panose="020B0604020202020204" pitchFamily="34" charset="0"/>
+              <a:rPr lang="en-US" sz="2000" dirty="0">
+                <a:latin typeface="Times New Roman" panose="02020603050405020304" pitchFamily="18" charset="0"/>
+                <a:cs typeface="Times New Roman" panose="02020603050405020304" pitchFamily="18" charset="0"/>
               </a:rPr>
               <a:t>By</a:t>
             </a:r>
             <a:r>
-              <a:rPr lang="en-US" sz="1400" spc="-40" dirty="0">
-                <a:latin typeface="Arial" panose="020B0604020202020204" pitchFamily="34" charset="0"/>
-                <a:cs typeface="Arial" panose="020B0604020202020204" pitchFamily="34" charset="0"/>
+              <a:rPr lang="en-US" sz="2000" spc="-40" dirty="0">
+                <a:latin typeface="Times New Roman" panose="02020603050405020304" pitchFamily="18" charset="0"/>
+                <a:cs typeface="Times New Roman" panose="02020603050405020304" pitchFamily="18" charset="0"/>
               </a:rPr>
               <a:t> </a:t>
             </a:r>
             <a:r>
-              <a:rPr lang="en-US" sz="1400" dirty="0">
-                <a:latin typeface="Arial" panose="020B0604020202020204" pitchFamily="34" charset="0"/>
-                <a:cs typeface="Arial" panose="020B0604020202020204" pitchFamily="34" charset="0"/>
+              <a:rPr lang="en-US" sz="2000" dirty="0">
+                <a:latin typeface="Times New Roman" panose="02020603050405020304" pitchFamily="18" charset="0"/>
+                <a:cs typeface="Times New Roman" panose="02020603050405020304" pitchFamily="18" charset="0"/>
               </a:rPr>
               <a:t>Group</a:t>
             </a:r>
             <a:r>
-              <a:rPr lang="en-US" sz="1400" spc="-40" dirty="0">
-                <a:latin typeface="Arial" panose="020B0604020202020204" pitchFamily="34" charset="0"/>
-                <a:cs typeface="Arial" panose="020B0604020202020204" pitchFamily="34" charset="0"/>
+              <a:rPr lang="en-US" sz="2000" spc="-40" dirty="0">
+                <a:latin typeface="Times New Roman" panose="02020603050405020304" pitchFamily="18" charset="0"/>
+                <a:cs typeface="Times New Roman" panose="02020603050405020304" pitchFamily="18" charset="0"/>
               </a:rPr>
               <a:t> </a:t>
             </a:r>
             <a:r>
-              <a:rPr lang="en-US" sz="1400" spc="-25" dirty="0">
-                <a:latin typeface="Arial" panose="020B0604020202020204" pitchFamily="34" charset="0"/>
-                <a:cs typeface="Arial" panose="020B0604020202020204" pitchFamily="34" charset="0"/>
+              <a:rPr lang="en-US" sz="2000" spc="-25" dirty="0">
+                <a:latin typeface="Times New Roman" panose="02020603050405020304" pitchFamily="18" charset="0"/>
+                <a:cs typeface="Times New Roman" panose="02020603050405020304" pitchFamily="18" charset="0"/>
               </a:rPr>
               <a:t>Team MSL:</a:t>
             </a:r>
-            <a:endParaRPr lang="en-US" sz="1400" dirty="0">
-              <a:latin typeface="Arial" panose="020B0604020202020204" pitchFamily="34" charset="0"/>
-              <a:cs typeface="Arial" panose="020B0604020202020204" pitchFamily="34" charset="0"/>
+            <a:endParaRPr lang="en-US" sz="2000" dirty="0">
+              <a:latin typeface="Times New Roman" panose="02020603050405020304" pitchFamily="18" charset="0"/>
+              <a:cs typeface="Times New Roman" panose="02020603050405020304" pitchFamily="18" charset="0"/>
             </a:endParaRPr>
           </a:p>
           <a:p>
@@ -3123,9 +3123,9 @@
                 <a:spcPts val="15"/>
               </a:spcBef>
             </a:pPr>
-            <a:endParaRPr lang="en-US" sz="1400" dirty="0">
-              <a:latin typeface="Arial" panose="020B0604020202020204" pitchFamily="34" charset="0"/>
-              <a:cs typeface="Arial" panose="020B0604020202020204" pitchFamily="34" charset="0"/>
+            <a:endParaRPr lang="en-US" sz="2000" dirty="0">
+              <a:latin typeface="Times New Roman" panose="02020603050405020304" pitchFamily="18" charset="0"/>
+              <a:cs typeface="Times New Roman" panose="02020603050405020304" pitchFamily="18" charset="0"/>
             </a:endParaRPr>
           </a:p>
           <a:p>
@@ -3146,9 +3146,9 @@
               </a:tabLst>
             </a:pPr>
             <a:r>
-              <a:rPr lang="en-US" sz="1400" dirty="0">
-                <a:latin typeface="Arial" panose="020B0604020202020204" pitchFamily="34" charset="0"/>
-                <a:cs typeface="Arial" panose="020B0604020202020204" pitchFamily="34" charset="0"/>
+              <a:rPr lang="en-US" sz="2000" dirty="0">
+                <a:latin typeface="Times New Roman" panose="02020603050405020304" pitchFamily="18" charset="0"/>
+                <a:cs typeface="Times New Roman" panose="02020603050405020304" pitchFamily="18" charset="0"/>
               </a:rPr>
               <a:t>Poonam Dashrath Paraskar(1427297)</a:t>
             </a:r>
@@ -3171,23 +3171,23 @@
               </a:tabLst>
             </a:pPr>
             <a:r>
-              <a:rPr lang="en-US" sz="1400" dirty="0">
-                <a:latin typeface="Arial" panose="020B0604020202020204" pitchFamily="34" charset="0"/>
-                <a:cs typeface="Arial" panose="020B0604020202020204" pitchFamily="34" charset="0"/>
+              <a:rPr lang="en-US" sz="2000" dirty="0">
+                <a:latin typeface="Times New Roman" panose="02020603050405020304" pitchFamily="18" charset="0"/>
+                <a:cs typeface="Times New Roman" panose="02020603050405020304" pitchFamily="18" charset="0"/>
               </a:rPr>
               <a:t>Ankita</a:t>
             </a:r>
             <a:r>
-              <a:rPr lang="en-US" sz="1400" spc="-30" dirty="0">
-                <a:latin typeface="Arial" panose="020B0604020202020204" pitchFamily="34" charset="0"/>
-                <a:cs typeface="Arial" panose="020B0604020202020204" pitchFamily="34" charset="0"/>
+              <a:rPr lang="en-US" sz="2000" spc="-30" dirty="0">
+                <a:latin typeface="Times New Roman" panose="02020603050405020304" pitchFamily="18" charset="0"/>
+                <a:cs typeface="Times New Roman" panose="02020603050405020304" pitchFamily="18" charset="0"/>
               </a:rPr>
               <a:t> </a:t>
             </a:r>
             <a:r>
-              <a:rPr lang="en-US" sz="1400" spc="-10" dirty="0">
-                <a:latin typeface="Arial" panose="020B0604020202020204" pitchFamily="34" charset="0"/>
-                <a:cs typeface="Arial" panose="020B0604020202020204" pitchFamily="34" charset="0"/>
+              <a:rPr lang="en-US" sz="2000" spc="-10" dirty="0">
+                <a:latin typeface="Times New Roman" panose="02020603050405020304" pitchFamily="18" charset="0"/>
+                <a:cs typeface="Times New Roman" panose="02020603050405020304" pitchFamily="18" charset="0"/>
               </a:rPr>
               <a:t>Talande(1427349)</a:t>
             </a:r>
@@ -3210,19 +3210,16 @@
               </a:tabLst>
             </a:pPr>
             <a:r>
-              <a:rPr lang="en-US" sz="1400" spc="-10" dirty="0">
-                <a:latin typeface="Arial" panose="020B0604020202020204" pitchFamily="34" charset="0"/>
-                <a:cs typeface="Arial" panose="020B0604020202020204" pitchFamily="34" charset="0"/>
+              <a:rPr lang="en-US" sz="2000" spc="-10" dirty="0">
+                <a:latin typeface="Times New Roman" panose="02020603050405020304" pitchFamily="18" charset="0"/>
+                <a:cs typeface="Times New Roman" panose="02020603050405020304" pitchFamily="18" charset="0"/>
               </a:rPr>
               <a:t>Pratik Desai(1438367)</a:t>
             </a:r>
-            <a:endParaRPr lang="en-US" sz="1400" dirty="0">
-              <a:latin typeface="Arial" panose="020B0604020202020204" pitchFamily="34" charset="0"/>
-              <a:cs typeface="Arial" panose="020B0604020202020204" pitchFamily="34" charset="0"/>
+            <a:endParaRPr lang="en-US" sz="2000" dirty="0">
+              <a:latin typeface="Times New Roman" panose="02020603050405020304" pitchFamily="18" charset="0"/>
+              <a:cs typeface="Times New Roman" panose="02020603050405020304" pitchFamily="18" charset="0"/>
             </a:endParaRPr>
-          </a:p>
-          <a:p>
-            <a:endParaRPr lang="en-IN" dirty="0"/>
           </a:p>
         </p:txBody>
       </p:sp>
@@ -3387,7 +3384,7 @@
               </a:spcAft>
               <a:buNone/>
             </a:pPr>
-            <a:endParaRPr lang="en-US" sz="1800" dirty="0">
+            <a:endParaRPr lang="en-US" sz="2000" dirty="0">
               <a:latin typeface="Times New Roman" panose="02020603050405020304" pitchFamily="18" charset="0"/>
               <a:ea typeface="SimSun" panose="02010600030101010101" pitchFamily="2" charset="-122"/>
             </a:endParaRPr>
@@ -3400,7 +3397,7 @@
               <a:buNone/>
             </a:pPr>
             <a:r>
-              <a:rPr lang="en-US" sz="1800" dirty="0">
+              <a:rPr lang="en-US" sz="2000" dirty="0">
                 <a:effectLst/>
                 <a:latin typeface="Times New Roman" panose="02020603050405020304" pitchFamily="18" charset="0"/>
                 <a:ea typeface="SimSun" panose="02010600030101010101" pitchFamily="2" charset="-122"/>
@@ -3408,12 +3405,12 @@
               <a:t>3. </a:t>
             </a:r>
             <a:r>
-              <a:rPr lang="en-US" sz="1800" spc="-5" dirty="0">
+              <a:rPr lang="en-US" sz="2000" spc="-5" dirty="0">
                 <a:effectLst/>
                 <a:latin typeface="Times New Roman" panose="02020603050405020304" pitchFamily="18" charset="0"/>
                 <a:ea typeface="SimSun" panose="02010600030101010101" pitchFamily="2" charset="-122"/>
               </a:rPr>
-              <a:t>Result of Accuracy Calculation Phase</a:t>
+              <a:t>Result of Accuracy Calculation Phase:</a:t>
             </a:r>
           </a:p>
           <a:p>
@@ -3447,7 +3444,7 @@
         </p:nvSpPr>
         <p:spPr>
           <a:xfrm>
-            <a:off x="701755" y="561052"/>
+            <a:off x="3327836" y="291214"/>
             <a:ext cx="5571907" cy="809074"/>
           </a:xfrm>
           <a:prstGeom prst="rect">
@@ -3478,8 +3475,12 @@
             </a:lvl1pPr>
           </a:lstStyle>
           <a:p>
-            <a:r>
-              <a:rPr lang="en-IN" dirty="0"/>
+            <a:pPr algn="ctr"/>
+            <a:r>
+              <a:rPr lang="en-IN" sz="3600" dirty="0">
+                <a:latin typeface="Times New Roman" panose="02020603050405020304" pitchFamily="18" charset="0"/>
+                <a:cs typeface="Times New Roman" panose="02020603050405020304" pitchFamily="18" charset="0"/>
+              </a:rPr>
               <a:t>Results</a:t>
             </a:r>
           </a:p>
@@ -3499,8 +3500,8 @@
         </p:nvSpPr>
         <p:spPr>
           <a:xfrm>
-            <a:off x="6113790" y="2293032"/>
-            <a:ext cx="4768948" cy="2982355"/>
+            <a:off x="6263309" y="2135227"/>
+            <a:ext cx="4768948" cy="3508653"/>
           </a:xfrm>
           <a:prstGeom prst="rect">
             <a:avLst/>
@@ -3530,7 +3531,7 @@
               </a:tabLst>
             </a:pPr>
             <a:r>
-              <a:rPr lang="en-US" sz="1800" spc="-5" dirty="0">
+              <a:rPr lang="en-US" sz="2000" spc="-5" dirty="0">
                 <a:effectLst/>
                 <a:latin typeface="Times New Roman" panose="02020603050405020304" pitchFamily="18" charset="0"/>
                 <a:ea typeface="SimSun" panose="02010600030101010101" pitchFamily="2" charset="-122"/>
@@ -3556,7 +3557,7 @@
               </a:tabLst>
             </a:pPr>
             <a:r>
-              <a:rPr lang="en-US" sz="1800" spc="-5" dirty="0">
+              <a:rPr lang="en-US" sz="2000" spc="-5" dirty="0">
                 <a:effectLst/>
                 <a:latin typeface="Times New Roman" panose="02020603050405020304" pitchFamily="18" charset="0"/>
                 <a:ea typeface="SimSun" panose="02010600030101010101" pitchFamily="2" charset="-122"/>
@@ -3582,13 +3583,13 @@
               </a:tabLst>
             </a:pPr>
             <a:r>
-              <a:rPr lang="en-US" spc="-5" dirty="0">
+              <a:rPr lang="en-US" sz="2000" spc="-5" dirty="0">
                 <a:latin typeface="Times New Roman" panose="02020603050405020304" pitchFamily="18" charset="0"/>
                 <a:ea typeface="SimSun" panose="02010600030101010101" pitchFamily="2" charset="-122"/>
               </a:rPr>
               <a:t>Count of match is a counter for each detected match this gets incremented. Figure 1.4 shows result of accuracy calculation</a:t>
             </a:r>
-            <a:endParaRPr lang="en-US" sz="1800" spc="-5" dirty="0">
+            <a:endParaRPr lang="en-US" sz="2000" spc="-5" dirty="0">
               <a:effectLst/>
               <a:latin typeface="Times New Roman" panose="02020603050405020304" pitchFamily="18" charset="0"/>
               <a:ea typeface="SimSun" panose="02010600030101010101" pitchFamily="2" charset="-122"/>
@@ -3641,7 +3642,10 @@
           <a:lstStyle/>
           <a:p>
             <a:r>
-              <a:rPr lang="en-US" dirty="0"/>
+              <a:rPr lang="en-US" dirty="0">
+                <a:latin typeface="Times New Roman" panose="02020603050405020304" pitchFamily="18" charset="0"/>
+                <a:cs typeface="Times New Roman" panose="02020603050405020304" pitchFamily="18" charset="0"/>
+              </a:rPr>
               <a:t>figure 1.4. Accuracy Calculation </a:t>
             </a:r>
           </a:p>
@@ -3731,7 +3735,7 @@
         </p:nvSpPr>
         <p:spPr>
           <a:xfrm>
-            <a:off x="701755" y="1214120"/>
+            <a:off x="701755" y="1270390"/>
             <a:ext cx="10515600" cy="4984173"/>
           </a:xfrm>
         </p:spPr>
@@ -3901,7 +3905,7 @@
         </p:nvSpPr>
         <p:spPr>
           <a:xfrm>
-            <a:off x="701755" y="405046"/>
+            <a:off x="3310046" y="156286"/>
             <a:ext cx="5571907" cy="809074"/>
           </a:xfrm>
           <a:prstGeom prst="rect">
@@ -3932,8 +3936,12 @@
             </a:lvl1pPr>
           </a:lstStyle>
           <a:p>
-            <a:r>
-              <a:rPr lang="en-IN" dirty="0"/>
+            <a:pPr algn="ctr"/>
+            <a:r>
+              <a:rPr lang="en-IN" sz="3600" dirty="0">
+                <a:latin typeface="Times New Roman" panose="02020603050405020304" pitchFamily="18" charset="0"/>
+                <a:cs typeface="Times New Roman" panose="02020603050405020304" pitchFamily="18" charset="0"/>
+              </a:rPr>
               <a:t>Results</a:t>
             </a:r>
           </a:p>
@@ -3961,7 +3969,7 @@
         </p:blipFill>
         <p:spPr>
           <a:xfrm>
-            <a:off x="1565488" y="3245131"/>
+            <a:off x="2514099" y="3090386"/>
             <a:ext cx="7163800" cy="2832112"/>
           </a:xfrm>
           <a:prstGeom prst="rect">
@@ -4015,13 +4023,22 @@
             <p:ph type="title"/>
           </p:nvPr>
         </p:nvSpPr>
-        <p:spPr/>
+        <p:spPr>
+          <a:xfrm>
+            <a:off x="838200" y="393261"/>
+            <a:ext cx="10515600" cy="1325563"/>
+          </a:xfrm>
+        </p:spPr>
         <p:txBody>
           <a:bodyPr/>
           <a:lstStyle/>
           <a:p>
-            <a:r>
-              <a:rPr lang="en-US" dirty="0"/>
+            <a:pPr algn="ctr"/>
+            <a:r>
+              <a:rPr lang="en-US" dirty="0">
+                <a:latin typeface="Times New Roman" panose="02020603050405020304" pitchFamily="18" charset="0"/>
+                <a:cs typeface="Times New Roman" panose="02020603050405020304" pitchFamily="18" charset="0"/>
+              </a:rPr>
               <a:t>Conclusion</a:t>
             </a:r>
           </a:p>
@@ -4065,7 +4082,7 @@
               </a:tabLst>
             </a:pPr>
             <a:r>
-              <a:rPr lang="en-US" sz="2000" spc="-5" dirty="0">
+              <a:rPr lang="en-US" sz="1800" spc="-5" dirty="0">
                 <a:effectLst/>
                 <a:latin typeface="Times New Roman" panose="02020603050405020304" pitchFamily="18" charset="0"/>
                 <a:ea typeface="SimSun" panose="02010600030101010101" pitchFamily="2" charset="-122"/>
@@ -4090,7 +4107,7 @@
               </a:tabLst>
             </a:pPr>
             <a:r>
-              <a:rPr lang="en-US" sz="2000" spc="-5" dirty="0">
+              <a:rPr lang="en-US" sz="1800" spc="-5" dirty="0">
                 <a:effectLst/>
                 <a:latin typeface="Times New Roman" panose="02020603050405020304" pitchFamily="18" charset="0"/>
                 <a:ea typeface="SimSun" panose="02010600030101010101" pitchFamily="2" charset="-122"/>
@@ -4116,12 +4133,12 @@
               </a:tabLst>
             </a:pPr>
             <a:r>
-              <a:rPr lang="en-US" sz="2000" spc="-5" dirty="0">
+              <a:rPr lang="en-US" sz="1800" spc="-5" dirty="0">
                 <a:effectLst/>
                 <a:latin typeface="Times New Roman" panose="02020603050405020304" pitchFamily="18" charset="0"/>
                 <a:ea typeface="SimSun" panose="02010600030101010101" pitchFamily="2" charset="-122"/>
               </a:rPr>
-              <a:t> Different methods are created to predict the trained sequences by comparing the generated similarity matrix with each of the SDRs of the learned sequence from the training phase, and the accuracy percentage of the predicted sequences was calculated and stored in a file. </a:t>
+              <a:t> Different methods are created to predict the trained sequences by comparing it with every learned sequence from the training phase, and the accuracy percentage of the predicted sequences was calculated and stored in a file. </a:t>
             </a:r>
           </a:p>
           <a:p>
@@ -4140,7 +4157,7 @@
                 <a:tab pos="182880" algn="l"/>
               </a:tabLst>
             </a:pPr>
-            <a:endParaRPr lang="en-US" sz="2000" spc="-5" dirty="0">
+            <a:endParaRPr lang="en-US" sz="1800" spc="-5" dirty="0">
               <a:effectLst/>
               <a:latin typeface="Times New Roman" panose="02020603050405020304" pitchFamily="18" charset="0"/>
               <a:ea typeface="SimSun" panose="02010600030101010101" pitchFamily="2" charset="-122"/>
@@ -4164,7 +4181,7 @@
               </a:tabLst>
             </a:pPr>
             <a:r>
-              <a:rPr lang="en-US" sz="2000" spc="-5" dirty="0">
+              <a:rPr lang="en-US" sz="1800" spc="-5" dirty="0">
                 <a:effectLst/>
                 <a:latin typeface="Times New Roman" panose="02020603050405020304" pitchFamily="18" charset="0"/>
                 <a:ea typeface="SimSun" panose="02010600030101010101" pitchFamily="2" charset="-122"/>
@@ -4189,7 +4206,7 @@
                 <a:tab pos="182880" algn="l"/>
               </a:tabLst>
             </a:pPr>
-            <a:endParaRPr lang="en-US" sz="2000" spc="-5" dirty="0">
+            <a:endParaRPr lang="en-US" sz="1800" spc="-5" dirty="0">
               <a:effectLst/>
               <a:latin typeface="Times New Roman" panose="02020603050405020304" pitchFamily="18" charset="0"/>
               <a:ea typeface="SimSun" panose="02010600030101010101" pitchFamily="2" charset="-122"/>
@@ -4213,13 +4230,13 @@
               </a:tabLst>
             </a:pPr>
             <a:r>
-              <a:rPr lang="en-US" sz="2000" spc="-5" dirty="0">
+              <a:rPr lang="en-US" sz="1800" spc="-5" dirty="0">
                 <a:latin typeface="Times New Roman" panose="02020603050405020304" pitchFamily="18" charset="0"/>
                 <a:ea typeface="SimSun" panose="02010600030101010101" pitchFamily="2" charset="-122"/>
               </a:rPr>
               <a:t>Unit test cases can be added as a future scope.</a:t>
             </a:r>
-            <a:endParaRPr lang="en-US" sz="2000" spc="-5" dirty="0">
+            <a:endParaRPr lang="en-US" sz="1800" spc="-5" dirty="0">
               <a:effectLst/>
               <a:latin typeface="Times New Roman" panose="02020603050405020304" pitchFamily="18" charset="0"/>
               <a:ea typeface="SimSun" panose="02010600030101010101" pitchFamily="2" charset="-122"/>
@@ -4312,7 +4329,10 @@
           <a:lstStyle/>
           <a:p>
             <a:r>
-              <a:rPr lang="en-IN" dirty="0"/>
+              <a:rPr lang="en-IN" dirty="0">
+                <a:latin typeface="Times New Roman" panose="02020603050405020304" pitchFamily="18" charset="0"/>
+                <a:cs typeface="Times New Roman" panose="02020603050405020304" pitchFamily="18" charset="0"/>
+              </a:rPr>
               <a:t>Index</a:t>
             </a:r>
           </a:p>
@@ -4345,64 +4365,110 @@
           <a:lstStyle/>
           <a:p>
             <a:pPr marL="514350" indent="-514350" algn="l">
-              <a:buAutoNum type="romanLcPeriod"/>
-            </a:pPr>
-            <a:r>
-              <a:rPr lang="en-IN" dirty="0"/>
+              <a:lnSpc>
+                <a:spcPct val="150000"/>
+              </a:lnSpc>
+              <a:buFont typeface="+mj-lt"/>
+              <a:buAutoNum type="arabicPeriod"/>
+            </a:pPr>
+            <a:r>
+              <a:rPr lang="en-IN" sz="2000" dirty="0">
+                <a:latin typeface="Times New Roman" panose="02020603050405020304" pitchFamily="18" charset="0"/>
+                <a:cs typeface="Times New Roman" panose="02020603050405020304" pitchFamily="18" charset="0"/>
+              </a:rPr>
               <a:t>Introduction</a:t>
             </a:r>
           </a:p>
           <a:p>
             <a:pPr marL="514350" indent="-514350" algn="l">
-              <a:buAutoNum type="romanLcPeriod"/>
-            </a:pPr>
-            <a:r>
-              <a:rPr lang="en-IN" dirty="0"/>
+              <a:lnSpc>
+                <a:spcPct val="150000"/>
+              </a:lnSpc>
+              <a:buFont typeface="+mj-lt"/>
+              <a:buAutoNum type="arabicPeriod"/>
+            </a:pPr>
+            <a:r>
+              <a:rPr lang="en-IN" sz="2000" dirty="0">
+                <a:latin typeface="Times New Roman" panose="02020603050405020304" pitchFamily="18" charset="0"/>
+                <a:cs typeface="Times New Roman" panose="02020603050405020304" pitchFamily="18" charset="0"/>
+              </a:rPr>
               <a:t>High Level Flow</a:t>
             </a:r>
           </a:p>
           <a:p>
             <a:pPr marL="514350" indent="-514350" algn="l">
-              <a:buAutoNum type="romanLcPeriod"/>
-            </a:pPr>
-            <a:r>
-              <a:rPr lang="en-IN" dirty="0"/>
+              <a:lnSpc>
+                <a:spcPct val="150000"/>
+              </a:lnSpc>
+              <a:buFont typeface="+mj-lt"/>
+              <a:buAutoNum type="arabicPeriod"/>
+            </a:pPr>
+            <a:r>
+              <a:rPr lang="en-IN" sz="2000" dirty="0">
+                <a:latin typeface="Times New Roman" panose="02020603050405020304" pitchFamily="18" charset="0"/>
+                <a:cs typeface="Times New Roman" panose="02020603050405020304" pitchFamily="18" charset="0"/>
+              </a:rPr>
               <a:t>Methodology</a:t>
             </a:r>
           </a:p>
           <a:p>
             <a:pPr marL="514350" indent="-514350" algn="l">
-              <a:buAutoNum type="romanLcPeriod"/>
-            </a:pPr>
-            <a:r>
-              <a:rPr lang="en-US" sz="2400" dirty="0"/>
+              <a:lnSpc>
+                <a:spcPct val="150000"/>
+              </a:lnSpc>
+              <a:buFont typeface="+mj-lt"/>
+              <a:buAutoNum type="arabicPeriod"/>
+            </a:pPr>
+            <a:r>
+              <a:rPr lang="en-US" sz="2000" dirty="0">
+                <a:latin typeface="Times New Roman" panose="02020603050405020304" pitchFamily="18" charset="0"/>
+                <a:cs typeface="Times New Roman" panose="02020603050405020304" pitchFamily="18" charset="0"/>
+              </a:rPr>
               <a:t>Flow chart of Implementation</a:t>
             </a:r>
-            <a:endParaRPr lang="en-IN" dirty="0"/>
+            <a:endParaRPr lang="en-IN" sz="2000" dirty="0">
+              <a:latin typeface="Times New Roman" panose="02020603050405020304" pitchFamily="18" charset="0"/>
+              <a:cs typeface="Times New Roman" panose="02020603050405020304" pitchFamily="18" charset="0"/>
+            </a:endParaRPr>
           </a:p>
           <a:p>
             <a:pPr marL="514350" indent="-514350" algn="l">
-              <a:buFont typeface="Arial" panose="020B0604020202020204" pitchFamily="34" charset="0"/>
-              <a:buAutoNum type="romanLcPeriod"/>
-            </a:pPr>
-            <a:r>
-              <a:rPr lang="en-IN" dirty="0"/>
+              <a:lnSpc>
+                <a:spcPct val="150000"/>
+              </a:lnSpc>
+              <a:buFont typeface="+mj-lt"/>
+              <a:buAutoNum type="arabicPeriod"/>
+            </a:pPr>
+            <a:r>
+              <a:rPr lang="en-IN" sz="2000" dirty="0">
+                <a:latin typeface="Times New Roman" panose="02020603050405020304" pitchFamily="18" charset="0"/>
+                <a:cs typeface="Times New Roman" panose="02020603050405020304" pitchFamily="18" charset="0"/>
+              </a:rPr>
               <a:t>Results </a:t>
             </a:r>
           </a:p>
           <a:p>
             <a:pPr marL="514350" indent="-514350" algn="l">
-              <a:buFont typeface="Arial" panose="020B0604020202020204" pitchFamily="34" charset="0"/>
-              <a:buAutoNum type="romanLcPeriod"/>
-            </a:pPr>
-            <a:r>
-              <a:rPr lang="en-IN" dirty="0"/>
+              <a:lnSpc>
+                <a:spcPct val="150000"/>
+              </a:lnSpc>
+              <a:buFont typeface="+mj-lt"/>
+              <a:buAutoNum type="arabicPeriod"/>
+            </a:pPr>
+            <a:r>
+              <a:rPr lang="en-IN" sz="2000" dirty="0">
+                <a:latin typeface="Times New Roman" panose="02020603050405020304" pitchFamily="18" charset="0"/>
+                <a:cs typeface="Times New Roman" panose="02020603050405020304" pitchFamily="18" charset="0"/>
+              </a:rPr>
               <a:t>Conclusion</a:t>
             </a:r>
           </a:p>
           <a:p>
             <a:pPr marL="514350" indent="-514350" algn="l">
-              <a:buAutoNum type="romanLcPeriod"/>
+              <a:lnSpc>
+                <a:spcPct val="150000"/>
+              </a:lnSpc>
+              <a:buAutoNum type="arabicPeriod"/>
             </a:pPr>
             <a:endParaRPr lang="en-IN" dirty="0">
               <a:latin typeface="Calibri" panose="020F0502020204030204" pitchFamily="34" charset="0"/>
@@ -4411,7 +4477,10 @@
           </a:p>
           <a:p>
             <a:pPr marL="514350" indent="-514350" algn="l">
-              <a:buAutoNum type="romanLcPeriod"/>
+              <a:lnSpc>
+                <a:spcPct val="150000"/>
+              </a:lnSpc>
+              <a:buAutoNum type="arabicPeriod"/>
             </a:pPr>
             <a:endParaRPr lang="en-IN" dirty="0">
               <a:latin typeface="Calibri" panose="020F0502020204030204" pitchFamily="34" charset="0"/>
@@ -4421,7 +4490,10 @@
           </a:p>
           <a:p>
             <a:pPr marL="514350" indent="-514350" algn="l">
-              <a:buAutoNum type="romanLcPeriod"/>
+              <a:lnSpc>
+                <a:spcPct val="150000"/>
+              </a:lnSpc>
+              <a:buAutoNum type="arabicPeriod"/>
             </a:pPr>
             <a:endParaRPr lang="en-IN" sz="2400" dirty="0">
               <a:effectLst/>
@@ -4432,7 +4504,10 @@
           </a:p>
           <a:p>
             <a:pPr marL="514350" indent="-514350" algn="l">
-              <a:buAutoNum type="romanLcPeriod"/>
+              <a:lnSpc>
+                <a:spcPct val="150000"/>
+              </a:lnSpc>
+              <a:buAutoNum type="arabicPeriod"/>
             </a:pPr>
             <a:endParaRPr lang="en-IN" dirty="0"/>
           </a:p>
@@ -4491,14 +4566,22 @@
           </a:xfrm>
         </p:spPr>
         <p:txBody>
-          <a:bodyPr/>
-          <a:lstStyle/>
-          <a:p>
-            <a:r>
-              <a:rPr lang="en-US" dirty="0"/>
+          <a:bodyPr>
+            <a:normAutofit/>
+          </a:bodyPr>
+          <a:lstStyle/>
+          <a:p>
+            <a:r>
+              <a:rPr lang="en-US" sz="5400" dirty="0">
+                <a:latin typeface="Times New Roman" panose="02020603050405020304" pitchFamily="18" charset="0"/>
+                <a:cs typeface="Times New Roman" panose="02020603050405020304" pitchFamily="18" charset="0"/>
+              </a:rPr>
               <a:t>Introduction</a:t>
             </a:r>
-            <a:endParaRPr lang="en-IN" dirty="0"/>
+            <a:endParaRPr lang="en-IN" sz="5400" dirty="0">
+              <a:latin typeface="Times New Roman" panose="02020603050405020304" pitchFamily="18" charset="0"/>
+              <a:cs typeface="Times New Roman" panose="02020603050405020304" pitchFamily="18" charset="0"/>
+            </a:endParaRPr>
           </a:p>
         </p:txBody>
       </p:sp>
@@ -4537,7 +4620,8 @@
             <a:r>
               <a:rPr lang="en-US" sz="2000" b="0" i="0" dirty="0">
                 <a:effectLst/>
-                <a:latin typeface="Söhne"/>
+                <a:latin typeface="Times New Roman" panose="02020603050405020304" pitchFamily="18" charset="0"/>
+                <a:cs typeface="Times New Roman" panose="02020603050405020304" pitchFamily="18" charset="0"/>
               </a:rPr>
               <a:t>Multisequence learning is a machine learning approach in which a model learns temporal patterns of sequences one by one during the experiment and provides the matching sequences as the predicted output. </a:t>
             </a:r>
@@ -4547,28 +4631,11 @@
               <a:buFont typeface="Arial" panose="020B0604020202020204" pitchFamily="34" charset="0"/>
               <a:buChar char="•"/>
             </a:pPr>
-            <a:r>
-              <a:rPr lang="en-US" sz="2000" b="0" i="0" dirty="0">
-                <a:effectLst/>
-                <a:latin typeface="Söhne"/>
-              </a:rPr>
-              <a:t>In this approach, a list </a:t>
-            </a:r>
-            <a:r>
-              <a:rPr lang="en-US" sz="2000" b="0" i="0" dirty="0">
-                <a:effectLst/>
-                <a:latin typeface="Times New Roman" panose="02020603050405020304" pitchFamily="18" charset="0"/>
-                <a:cs typeface="Times New Roman" panose="02020603050405020304" pitchFamily="18" charset="0"/>
-              </a:rPr>
-              <a:t>of</a:t>
-            </a:r>
-            <a:r>
-              <a:rPr lang="en-US" sz="2000" b="0" i="0" dirty="0">
-                <a:effectLst/>
-                <a:latin typeface="Söhne"/>
-              </a:rPr>
-              <a:t> sequences with double data-type are stored in an excel file, which is used as the input sequence file for the model to train itself by storing these values in temporal memory. </a:t>
-            </a:r>
+            <a:endParaRPr lang="en-US" sz="2000" b="0" i="0" dirty="0">
+              <a:effectLst/>
+              <a:latin typeface="Times New Roman" panose="02020603050405020304" pitchFamily="18" charset="0"/>
+              <a:cs typeface="Times New Roman" panose="02020603050405020304" pitchFamily="18" charset="0"/>
+            </a:endParaRPr>
           </a:p>
           <a:p>
             <a:pPr marL="342900" indent="-342900" algn="l">
@@ -4578,11 +4645,40 @@
             <a:r>
               <a:rPr lang="en-US" sz="2000" b="0" i="0" dirty="0">
                 <a:effectLst/>
-                <a:latin typeface="Söhne"/>
+                <a:latin typeface="Times New Roman" panose="02020603050405020304" pitchFamily="18" charset="0"/>
+                <a:cs typeface="Times New Roman" panose="02020603050405020304" pitchFamily="18" charset="0"/>
+              </a:rPr>
+              <a:t>In this approach, a list of sequences with double data-type are stored in an excel file, which is used as the input sequence file for the model to train itself by storing these values in temporal memory.</a:t>
+            </a:r>
+          </a:p>
+          <a:p>
+            <a:pPr algn="l"/>
+            <a:r>
+              <a:rPr lang="en-US" sz="2000" b="0" i="0" dirty="0">
+                <a:effectLst/>
+                <a:latin typeface="Times New Roman" panose="02020603050405020304" pitchFamily="18" charset="0"/>
+                <a:cs typeface="Times New Roman" panose="02020603050405020304" pitchFamily="18" charset="0"/>
+              </a:rPr>
+              <a:t> </a:t>
+            </a:r>
+          </a:p>
+          <a:p>
+            <a:pPr marL="342900" indent="-342900" algn="l">
+              <a:buFont typeface="Arial" panose="020B0604020202020204" pitchFamily="34" charset="0"/>
+              <a:buChar char="•"/>
+            </a:pPr>
+            <a:r>
+              <a:rPr lang="en-US" sz="2000" b="0" i="0" dirty="0">
+                <a:effectLst/>
+                <a:latin typeface="Times New Roman" panose="02020603050405020304" pitchFamily="18" charset="0"/>
+                <a:cs typeface="Times New Roman" panose="02020603050405020304" pitchFamily="18" charset="0"/>
               </a:rPr>
               <a:t>The model then predicts the next element of the predicted sequence based on the patterns learned from the previous sequences. </a:t>
             </a:r>
-            <a:endParaRPr lang="en-IN" sz="2000" dirty="0"/>
+            <a:endParaRPr lang="en-IN" sz="2000" dirty="0">
+              <a:latin typeface="Times New Roman" panose="02020603050405020304" pitchFamily="18" charset="0"/>
+              <a:cs typeface="Times New Roman" panose="02020603050405020304" pitchFamily="18" charset="0"/>
+            </a:endParaRPr>
           </a:p>
         </p:txBody>
       </p:sp>
@@ -4634,11 +4730,17 @@
         </p:nvSpPr>
         <p:spPr/>
         <p:txBody>
-          <a:bodyPr/>
-          <a:lstStyle/>
-          <a:p>
-            <a:r>
-              <a:rPr lang="en-IN" dirty="0"/>
+          <a:bodyPr>
+            <a:normAutofit/>
+          </a:bodyPr>
+          <a:lstStyle/>
+          <a:p>
+            <a:pPr algn="ctr"/>
+            <a:r>
+              <a:rPr lang="en-IN" dirty="0">
+                <a:latin typeface="Times New Roman" panose="02020603050405020304" pitchFamily="18" charset="0"/>
+                <a:cs typeface="Times New Roman" panose="02020603050405020304" pitchFamily="18" charset="0"/>
+              </a:rPr>
               <a:t>High Level Flow</a:t>
             </a:r>
           </a:p>
@@ -4660,7 +4762,7 @@
             <p:ph idx="1"/>
           </p:nvPr>
         </p:nvPicPr>
-        <p:blipFill rotWithShape="1">
+        <p:blipFill>
           <a:blip r:embed="rId2">
             <a:extLst>
               <a:ext uri="{28A0092B-C50C-407E-A947-70E740481C1C}">
@@ -4668,16 +4770,318 @@
               </a:ext>
             </a:extLst>
           </a:blip>
-          <a:srcRect t="86"/>
-          <a:stretch/>
+          <a:stretch>
+            <a:fillRect/>
+          </a:stretch>
         </p:blipFill>
         <p:spPr>
           <a:xfrm>
-            <a:off x="2166424" y="1690688"/>
-            <a:ext cx="7568419" cy="3882396"/>
+            <a:off x="1857121" y="1719504"/>
+            <a:ext cx="8477757" cy="3897974"/>
           </a:xfrm>
         </p:spPr>
       </p:pic>
+      <p:sp>
+        <p:nvSpPr>
+          <p:cNvPr id="3" name="Rectangle 2">
+            <a:extLst>
+              <a:ext uri="{FF2B5EF4-FFF2-40B4-BE49-F238E27FC236}">
+                <a16:creationId xmlns:a16="http://schemas.microsoft.com/office/drawing/2014/main" id="{FC6B0DEB-5D28-6D74-C504-B5B8A5BBF0E0}"/>
+              </a:ext>
+            </a:extLst>
+          </p:cNvPr>
+          <p:cNvSpPr/>
+          <p:nvPr/>
+        </p:nvSpPr>
+        <p:spPr>
+          <a:xfrm>
+            <a:off x="2166425" y="1690688"/>
+            <a:ext cx="7582486" cy="3795712"/>
+          </a:xfrm>
+          <a:prstGeom prst="rect">
+            <a:avLst/>
+          </a:prstGeom>
+          <a:noFill/>
+          <a:ln>
+            <a:noFill/>
+          </a:ln>
+        </p:spPr>
+        <p:style>
+          <a:lnRef idx="2">
+            <a:schemeClr val="accent1">
+              <a:shade val="50000"/>
+            </a:schemeClr>
+          </a:lnRef>
+          <a:fillRef idx="1">
+            <a:schemeClr val="accent1"/>
+          </a:fillRef>
+          <a:effectRef idx="0">
+            <a:schemeClr val="accent1"/>
+          </a:effectRef>
+          <a:fontRef idx="minor">
+            <a:schemeClr val="lt1"/>
+          </a:fontRef>
+        </p:style>
+        <p:txBody>
+          <a:bodyPr rtlCol="0" anchor="ctr"/>
+          <a:lstStyle/>
+          <a:p>
+            <a:pPr algn="ctr"/>
+            <a:endParaRPr lang="en-US"/>
+          </a:p>
+        </p:txBody>
+      </p:sp>
+      <p:sp>
+        <p:nvSpPr>
+          <p:cNvPr id="4" name="Rectangle 3">
+            <a:extLst>
+              <a:ext uri="{FF2B5EF4-FFF2-40B4-BE49-F238E27FC236}">
+                <a16:creationId xmlns:a16="http://schemas.microsoft.com/office/drawing/2014/main" id="{DEC6645A-68DF-721E-8741-5FCD311EF59F}"/>
+              </a:ext>
+            </a:extLst>
+          </p:cNvPr>
+          <p:cNvSpPr/>
+          <p:nvPr/>
+        </p:nvSpPr>
+        <p:spPr>
+          <a:xfrm flipV="1">
+            <a:off x="2304756" y="1612903"/>
+            <a:ext cx="7582488" cy="48969"/>
+          </a:xfrm>
+          <a:prstGeom prst="rect">
+            <a:avLst/>
+          </a:prstGeom>
+          <a:solidFill>
+            <a:schemeClr val="bg1"/>
+          </a:solidFill>
+          <a:ln>
+            <a:noFill/>
+          </a:ln>
+        </p:spPr>
+        <p:style>
+          <a:lnRef idx="2">
+            <a:schemeClr val="accent1">
+              <a:shade val="50000"/>
+            </a:schemeClr>
+          </a:lnRef>
+          <a:fillRef idx="1">
+            <a:schemeClr val="accent1"/>
+          </a:fillRef>
+          <a:effectRef idx="0">
+            <a:schemeClr val="accent1"/>
+          </a:effectRef>
+          <a:fontRef idx="minor">
+            <a:schemeClr val="lt1"/>
+          </a:fontRef>
+        </p:style>
+        <p:txBody>
+          <a:bodyPr rtlCol="0" anchor="ctr"/>
+          <a:lstStyle/>
+          <a:p>
+            <a:pPr algn="ctr"/>
+            <a:endParaRPr lang="en-US"/>
+          </a:p>
+        </p:txBody>
+      </p:sp>
+      <p:sp>
+        <p:nvSpPr>
+          <p:cNvPr id="9" name="Rectangle 8">
+            <a:extLst>
+              <a:ext uri="{FF2B5EF4-FFF2-40B4-BE49-F238E27FC236}">
+                <a16:creationId xmlns:a16="http://schemas.microsoft.com/office/drawing/2014/main" id="{3ABC471E-0EBB-1641-210F-632498973997}"/>
+              </a:ext>
+            </a:extLst>
+          </p:cNvPr>
+          <p:cNvSpPr/>
+          <p:nvPr/>
+        </p:nvSpPr>
+        <p:spPr>
+          <a:xfrm>
+            <a:off x="6710289" y="1637387"/>
+            <a:ext cx="4051496" cy="283121"/>
+          </a:xfrm>
+          <a:prstGeom prst="rect">
+            <a:avLst/>
+          </a:prstGeom>
+          <a:solidFill>
+            <a:schemeClr val="bg1"/>
+          </a:solidFill>
+          <a:ln>
+            <a:noFill/>
+          </a:ln>
+        </p:spPr>
+        <p:style>
+          <a:lnRef idx="2">
+            <a:schemeClr val="accent1">
+              <a:shade val="50000"/>
+            </a:schemeClr>
+          </a:lnRef>
+          <a:fillRef idx="1">
+            <a:schemeClr val="accent1"/>
+          </a:fillRef>
+          <a:effectRef idx="0">
+            <a:schemeClr val="accent1"/>
+          </a:effectRef>
+          <a:fontRef idx="minor">
+            <a:schemeClr val="lt1"/>
+          </a:fontRef>
+        </p:style>
+        <p:txBody>
+          <a:bodyPr rtlCol="0" anchor="ctr"/>
+          <a:lstStyle/>
+          <a:p>
+            <a:pPr algn="ctr"/>
+            <a:endParaRPr lang="en-US"/>
+          </a:p>
+        </p:txBody>
+      </p:sp>
+      <p:sp>
+        <p:nvSpPr>
+          <p:cNvPr id="10" name="Rectangle 9">
+            <a:extLst>
+              <a:ext uri="{FF2B5EF4-FFF2-40B4-BE49-F238E27FC236}">
+                <a16:creationId xmlns:a16="http://schemas.microsoft.com/office/drawing/2014/main" id="{002F693C-F1EF-6EA1-4665-FF28AB1413F2}"/>
+              </a:ext>
+            </a:extLst>
+          </p:cNvPr>
+          <p:cNvSpPr/>
+          <p:nvPr/>
+        </p:nvSpPr>
+        <p:spPr>
+          <a:xfrm>
+            <a:off x="1192237" y="1661872"/>
+            <a:ext cx="4051496" cy="283121"/>
+          </a:xfrm>
+          <a:prstGeom prst="rect">
+            <a:avLst/>
+          </a:prstGeom>
+          <a:solidFill>
+            <a:schemeClr val="bg1"/>
+          </a:solidFill>
+          <a:ln>
+            <a:noFill/>
+          </a:ln>
+        </p:spPr>
+        <p:style>
+          <a:lnRef idx="2">
+            <a:schemeClr val="accent1">
+              <a:shade val="50000"/>
+            </a:schemeClr>
+          </a:lnRef>
+          <a:fillRef idx="1">
+            <a:schemeClr val="accent1"/>
+          </a:fillRef>
+          <a:effectRef idx="0">
+            <a:schemeClr val="accent1"/>
+          </a:effectRef>
+          <a:fontRef idx="minor">
+            <a:schemeClr val="lt1"/>
+          </a:fontRef>
+        </p:style>
+        <p:txBody>
+          <a:bodyPr rtlCol="0" anchor="ctr"/>
+          <a:lstStyle/>
+          <a:p>
+            <a:pPr algn="ctr"/>
+            <a:endParaRPr lang="en-US"/>
+          </a:p>
+        </p:txBody>
+      </p:sp>
+      <p:sp>
+        <p:nvSpPr>
+          <p:cNvPr id="11" name="Rectangle 10">
+            <a:extLst>
+              <a:ext uri="{FF2B5EF4-FFF2-40B4-BE49-F238E27FC236}">
+                <a16:creationId xmlns:a16="http://schemas.microsoft.com/office/drawing/2014/main" id="{38A39815-2B8E-CFBB-ECD5-164B7A73C337}"/>
+              </a:ext>
+            </a:extLst>
+          </p:cNvPr>
+          <p:cNvSpPr/>
+          <p:nvPr/>
+        </p:nvSpPr>
+        <p:spPr>
+          <a:xfrm>
+            <a:off x="5401994" y="1690688"/>
+            <a:ext cx="1181686" cy="48969"/>
+          </a:xfrm>
+          <a:prstGeom prst="rect">
+            <a:avLst/>
+          </a:prstGeom>
+          <a:solidFill>
+            <a:schemeClr val="bg1"/>
+          </a:solidFill>
+          <a:ln>
+            <a:noFill/>
+          </a:ln>
+        </p:spPr>
+        <p:style>
+          <a:lnRef idx="2">
+            <a:schemeClr val="accent1">
+              <a:shade val="50000"/>
+            </a:schemeClr>
+          </a:lnRef>
+          <a:fillRef idx="1">
+            <a:schemeClr val="accent1"/>
+          </a:fillRef>
+          <a:effectRef idx="0">
+            <a:schemeClr val="accent1"/>
+          </a:effectRef>
+          <a:fontRef idx="minor">
+            <a:schemeClr val="lt1"/>
+          </a:fontRef>
+        </p:style>
+        <p:txBody>
+          <a:bodyPr rtlCol="0" anchor="ctr"/>
+          <a:lstStyle/>
+          <a:p>
+            <a:pPr algn="ctr"/>
+            <a:endParaRPr lang="en-US"/>
+          </a:p>
+        </p:txBody>
+      </p:sp>
+      <p:cxnSp>
+        <p:nvCxnSpPr>
+          <p:cNvPr id="14" name="Straight Connector 13">
+            <a:extLst>
+              <a:ext uri="{FF2B5EF4-FFF2-40B4-BE49-F238E27FC236}">
+                <a16:creationId xmlns:a16="http://schemas.microsoft.com/office/drawing/2014/main" id="{6B2EE7F9-3AE1-F396-3AB9-8437641FF44F}"/>
+              </a:ext>
+            </a:extLst>
+          </p:cNvPr>
+          <p:cNvCxnSpPr>
+            <a:cxnSpLocks/>
+          </p:cNvCxnSpPr>
+          <p:nvPr/>
+        </p:nvCxnSpPr>
+        <p:spPr>
+          <a:xfrm flipV="1">
+            <a:off x="5029988" y="1727414"/>
+            <a:ext cx="2035309" cy="12243"/>
+          </a:xfrm>
+          <a:prstGeom prst="line">
+            <a:avLst/>
+          </a:prstGeom>
+          <a:ln w="28575">
+            <a:solidFill>
+              <a:schemeClr val="bg1"/>
+            </a:solidFill>
+          </a:ln>
+        </p:spPr>
+        <p:style>
+          <a:lnRef idx="3">
+            <a:schemeClr val="dk1"/>
+          </a:lnRef>
+          <a:fillRef idx="0">
+            <a:schemeClr val="dk1"/>
+          </a:fillRef>
+          <a:effectRef idx="2">
+            <a:schemeClr val="dk1"/>
+          </a:effectRef>
+          <a:fontRef idx="minor">
+            <a:schemeClr val="tx1"/>
+          </a:fontRef>
+        </p:style>
+      </p:cxnSp>
     </p:spTree>
     <p:extLst>
       <p:ext uri="{BB962C8B-B14F-4D97-AF65-F5344CB8AC3E}">
@@ -4726,7 +5130,7 @@
         </p:nvSpPr>
         <p:spPr>
           <a:xfrm>
-            <a:off x="865287" y="532218"/>
+            <a:off x="1497563" y="158620"/>
             <a:ext cx="9144000" cy="883719"/>
           </a:xfrm>
         </p:spPr>
@@ -4736,12 +5140,17 @@
           </a:bodyPr>
           <a:lstStyle/>
           <a:p>
-            <a:pPr algn="l"/>
-            <a:r>
-              <a:rPr lang="en-US" sz="4400" dirty="0"/>
+            <a:r>
+              <a:rPr lang="en-US" sz="4400" dirty="0">
+                <a:latin typeface="Times New Roman" panose="02020603050405020304" pitchFamily="18" charset="0"/>
+                <a:cs typeface="Times New Roman" panose="02020603050405020304" pitchFamily="18" charset="0"/>
+              </a:rPr>
               <a:t>High Level Flow</a:t>
             </a:r>
-            <a:endParaRPr lang="en-IN" sz="4400" dirty="0"/>
+            <a:endParaRPr lang="en-IN" sz="4400" dirty="0">
+              <a:latin typeface="Times New Roman" panose="02020603050405020304" pitchFamily="18" charset="0"/>
+              <a:cs typeface="Times New Roman" panose="02020603050405020304" pitchFamily="18" charset="0"/>
+            </a:endParaRPr>
           </a:p>
         </p:txBody>
       </p:sp>
@@ -4763,8 +5172,8 @@
         </p:nvSpPr>
         <p:spPr>
           <a:xfrm>
-            <a:off x="756104" y="1306755"/>
-            <a:ext cx="10679791" cy="5438677"/>
+            <a:off x="326571" y="1042339"/>
+            <a:ext cx="11485984" cy="5657041"/>
           </a:xfrm>
         </p:spPr>
         <p:txBody>
@@ -4779,14 +5188,20 @@
           <a:p>
             <a:pPr algn="l"/>
             <a:r>
-              <a:rPr lang="en-IN" sz="2000" dirty="0"/>
+              <a:rPr lang="en-IN" sz="2000" dirty="0">
+                <a:latin typeface="Times New Roman" panose="02020603050405020304" pitchFamily="18" charset="0"/>
+                <a:cs typeface="Times New Roman" panose="02020603050405020304" pitchFamily="18" charset="0"/>
+              </a:rPr>
               <a:t>The Multisequence Learning experiment executes in two phases:</a:t>
             </a:r>
           </a:p>
           <a:p>
             <a:pPr algn="just"/>
             <a:r>
-              <a:rPr lang="en-IN" sz="2000" dirty="0"/>
+              <a:rPr lang="en-IN" sz="2000" dirty="0">
+                <a:latin typeface="Times New Roman" panose="02020603050405020304" pitchFamily="18" charset="0"/>
+                <a:cs typeface="Times New Roman" panose="02020603050405020304" pitchFamily="18" charset="0"/>
+              </a:rPr>
               <a:t>1. Learning/Training Phase : </a:t>
             </a:r>
           </a:p>
@@ -4796,15 +5211,24 @@
               <a:buChar char="•"/>
             </a:pPr>
             <a:r>
-              <a:rPr lang="en-US" sz="2000" dirty="0"/>
+              <a:rPr lang="en-US" sz="2000" dirty="0">
+                <a:latin typeface="Times New Roman" panose="02020603050405020304" pitchFamily="18" charset="0"/>
+                <a:cs typeface="Times New Roman" panose="02020603050405020304" pitchFamily="18" charset="0"/>
+              </a:rPr>
               <a:t>In learning phase input data sequences are getting passed to </a:t>
             </a:r>
             <a:r>
-              <a:rPr lang="en-US" sz="2000" i="1" dirty="0"/>
+              <a:rPr lang="en-US" sz="2000" i="1" dirty="0">
+                <a:latin typeface="Times New Roman" panose="02020603050405020304" pitchFamily="18" charset="0"/>
+                <a:cs typeface="Times New Roman" panose="02020603050405020304" pitchFamily="18" charset="0"/>
+              </a:rPr>
               <a:t>RunExperiment</a:t>
             </a:r>
             <a:r>
-              <a:rPr lang="en-US" sz="2000" dirty="0"/>
+              <a:rPr lang="en-US" sz="2000" dirty="0">
+                <a:latin typeface="Times New Roman" panose="02020603050405020304" pitchFamily="18" charset="0"/>
+                <a:cs typeface="Times New Roman" panose="02020603050405020304" pitchFamily="18" charset="0"/>
+              </a:rPr>
               <a:t>() method.  </a:t>
             </a:r>
           </a:p>
@@ -4814,15 +5238,24 @@
               <a:buChar char="•"/>
             </a:pPr>
             <a:r>
-              <a:rPr lang="en-US" sz="2000" dirty="0"/>
+              <a:rPr lang="en-US" sz="2000" dirty="0">
+                <a:latin typeface="Times New Roman" panose="02020603050405020304" pitchFamily="18" charset="0"/>
+                <a:cs typeface="Times New Roman" panose="02020603050405020304" pitchFamily="18" charset="0"/>
+              </a:rPr>
               <a:t>In </a:t>
             </a:r>
             <a:r>
-              <a:rPr lang="en-US" sz="2000" i="1" dirty="0"/>
+              <a:rPr lang="en-US" sz="2000" i="1" dirty="0">
+                <a:latin typeface="Times New Roman" panose="02020603050405020304" pitchFamily="18" charset="0"/>
+                <a:cs typeface="Times New Roman" panose="02020603050405020304" pitchFamily="18" charset="0"/>
+              </a:rPr>
               <a:t>RunExperiment</a:t>
             </a:r>
             <a:r>
-              <a:rPr lang="en-US" sz="2000" dirty="0"/>
+              <a:rPr lang="en-US" sz="2000" dirty="0">
+                <a:latin typeface="Times New Roman" panose="02020603050405020304" pitchFamily="18" charset="0"/>
+                <a:cs typeface="Times New Roman" panose="02020603050405020304" pitchFamily="18" charset="0"/>
+              </a:rPr>
               <a:t>() method training of input sequences is done using Spatial Pooler, Homeostatic Plasticity Controller which checks the stability of spatial pooler.</a:t>
             </a:r>
           </a:p>
@@ -4832,18 +5265,27 @@
               <a:buChar char="•"/>
             </a:pPr>
             <a:r>
-              <a:rPr lang="en-US" sz="2000" dirty="0"/>
+              <a:rPr lang="en-US" sz="2000" dirty="0">
+                <a:latin typeface="Times New Roman" panose="02020603050405020304" pitchFamily="18" charset="0"/>
+                <a:cs typeface="Times New Roman" panose="02020603050405020304" pitchFamily="18" charset="0"/>
+              </a:rPr>
               <a:t>Training of input sequences is required to get the stable state of Spatial pooler. Once spatial pooler and Temporal memory gets trained training phase is completed.</a:t>
             </a:r>
           </a:p>
           <a:p>
             <a:pPr algn="just"/>
-            <a:endParaRPr lang="en-US" sz="2000" dirty="0"/>
+            <a:endParaRPr lang="en-US" sz="2000" dirty="0">
+              <a:latin typeface="Times New Roman" panose="02020603050405020304" pitchFamily="18" charset="0"/>
+              <a:cs typeface="Times New Roman" panose="02020603050405020304" pitchFamily="18" charset="0"/>
+            </a:endParaRPr>
           </a:p>
           <a:p>
             <a:pPr algn="just"/>
             <a:r>
-              <a:rPr lang="en-US" sz="2000" dirty="0"/>
+              <a:rPr lang="en-US" sz="2000" dirty="0">
+                <a:latin typeface="Times New Roman" panose="02020603050405020304" pitchFamily="18" charset="0"/>
+                <a:cs typeface="Times New Roman" panose="02020603050405020304" pitchFamily="18" charset="0"/>
+              </a:rPr>
               <a:t>2. Prediction Phase: </a:t>
             </a:r>
           </a:p>
@@ -4859,15 +5301,24 @@
               <a:buChar char="•"/>
             </a:pPr>
             <a:r>
-              <a:rPr lang="en-US" sz="2000" dirty="0"/>
+              <a:rPr lang="en-US" sz="2000" dirty="0">
+                <a:latin typeface="Times New Roman" panose="02020603050405020304" pitchFamily="18" charset="0"/>
+                <a:cs typeface="Times New Roman" panose="02020603050405020304" pitchFamily="18" charset="0"/>
+              </a:rPr>
               <a:t>After the learning process, the algorithm returns the instance of Predictor class. This class provides </a:t>
             </a:r>
             <a:r>
-              <a:rPr lang="en-US" sz="2000" i="1" dirty="0"/>
+              <a:rPr lang="en-US" sz="2000" i="1" dirty="0">
+                <a:latin typeface="Times New Roman" panose="02020603050405020304" pitchFamily="18" charset="0"/>
+                <a:cs typeface="Times New Roman" panose="02020603050405020304" pitchFamily="18" charset="0"/>
+              </a:rPr>
               <a:t>Predict</a:t>
             </a:r>
             <a:r>
-              <a:rPr lang="en-US" sz="2000" dirty="0"/>
+              <a:rPr lang="en-US" sz="2000" dirty="0">
+                <a:latin typeface="Times New Roman" panose="02020603050405020304" pitchFamily="18" charset="0"/>
+                <a:cs typeface="Times New Roman" panose="02020603050405020304" pitchFamily="18" charset="0"/>
+              </a:rPr>
               <a:t>() method with a list of input elements.</a:t>
             </a:r>
           </a:p>
@@ -4883,7 +5334,10 @@
               <a:buChar char="•"/>
             </a:pPr>
             <a:r>
-              <a:rPr lang="en-US" sz="2000" dirty="0"/>
+              <a:rPr lang="en-US" sz="2000" dirty="0">
+                <a:latin typeface="Times New Roman" panose="02020603050405020304" pitchFamily="18" charset="0"/>
+                <a:cs typeface="Times New Roman" panose="02020603050405020304" pitchFamily="18" charset="0"/>
+              </a:rPr>
               <a:t>For every presented input element, the predictor tries to predict the next element. </a:t>
             </a:r>
           </a:p>
@@ -4899,18 +5353,26 @@
               <a:buChar char="•"/>
             </a:pPr>
             <a:r>
-              <a:rPr lang="en-US" sz="2000" dirty="0"/>
+              <a:rPr lang="en-US" sz="2000" dirty="0">
+                <a:latin typeface="Times New Roman" panose="02020603050405020304" pitchFamily="18" charset="0"/>
+                <a:cs typeface="Times New Roman" panose="02020603050405020304" pitchFamily="18" charset="0"/>
+              </a:rPr>
               <a:t>In </a:t>
             </a:r>
             <a:r>
-              <a:rPr lang="en-US" sz="2000" i="1" dirty="0" err="1"/>
+              <a:rPr lang="en-US" sz="2000" i="1" dirty="0" err="1">
+                <a:latin typeface="Times New Roman" panose="02020603050405020304" pitchFamily="18" charset="0"/>
+                <a:cs typeface="Times New Roman" panose="02020603050405020304" pitchFamily="18" charset="0"/>
+              </a:rPr>
               <a:t>PredictNextElement</a:t>
             </a:r>
             <a:r>
-              <a:rPr lang="en-US" sz="2000" dirty="0"/>
+              <a:rPr lang="en-US" sz="2000" dirty="0">
+                <a:latin typeface="Times New Roman" panose="02020603050405020304" pitchFamily="18" charset="0"/>
+                <a:cs typeface="Times New Roman" panose="02020603050405020304" pitchFamily="18" charset="0"/>
+              </a:rPr>
               <a:t>() method, team has added implemented accuracy calculation logic.</a:t>
             </a:r>
-            <a:endParaRPr lang="en-US" dirty="0"/>
           </a:p>
           <a:p>
             <a:pPr algn="just"/>
@@ -4972,7 +5434,7 @@
         </p:nvSpPr>
         <p:spPr>
           <a:xfrm>
-            <a:off x="326571" y="417927"/>
+            <a:off x="1497563" y="158620"/>
             <a:ext cx="9144000" cy="883719"/>
           </a:xfrm>
         </p:spPr>
@@ -4982,12 +5444,17 @@
           </a:bodyPr>
           <a:lstStyle/>
           <a:p>
-            <a:pPr algn="l"/>
-            <a:r>
-              <a:rPr lang="en-US" dirty="0"/>
+            <a:r>
+              <a:rPr lang="en-US" dirty="0">
+                <a:latin typeface="Times New Roman" panose="02020603050405020304" pitchFamily="18" charset="0"/>
+                <a:cs typeface="Times New Roman" panose="02020603050405020304" pitchFamily="18" charset="0"/>
+              </a:rPr>
               <a:t>Methodology</a:t>
             </a:r>
-            <a:endParaRPr lang="en-IN" dirty="0"/>
+            <a:endParaRPr lang="en-IN" dirty="0">
+              <a:latin typeface="Times New Roman" panose="02020603050405020304" pitchFamily="18" charset="0"/>
+              <a:cs typeface="Times New Roman" panose="02020603050405020304" pitchFamily="18" charset="0"/>
+            </a:endParaRPr>
           </a:p>
         </p:txBody>
       </p:sp>
@@ -5009,8 +5476,8 @@
         </p:nvSpPr>
         <p:spPr>
           <a:xfrm>
-            <a:off x="326571" y="1301646"/>
-            <a:ext cx="11485984" cy="5397734"/>
+            <a:off x="326571" y="1042339"/>
+            <a:ext cx="11485984" cy="5657041"/>
           </a:xfrm>
         </p:spPr>
         <p:txBody>
@@ -5025,151 +5492,154 @@
           <a:p>
             <a:pPr algn="l"/>
             <a:r>
-              <a:rPr lang="en-IN" sz="2000" dirty="0"/>
+              <a:rPr lang="en-IN" sz="2000" dirty="0">
+                <a:latin typeface="Times New Roman" panose="02020603050405020304" pitchFamily="18" charset="0"/>
+                <a:cs typeface="Times New Roman" panose="02020603050405020304" pitchFamily="18" charset="0"/>
+              </a:rPr>
               <a:t>Team has implemented below methods and changes in existing application:</a:t>
             </a:r>
           </a:p>
           <a:p>
             <a:pPr algn="l"/>
-            <a:endParaRPr lang="en-IN" sz="2000" dirty="0"/>
+            <a:endParaRPr lang="en-IN" sz="2000" dirty="0">
+              <a:latin typeface="Times New Roman" panose="02020603050405020304" pitchFamily="18" charset="0"/>
+              <a:cs typeface="Times New Roman" panose="02020603050405020304" pitchFamily="18" charset="0"/>
+            </a:endParaRPr>
           </a:p>
           <a:p>
             <a:pPr marL="342900" indent="-342900" algn="l">
               <a:buAutoNum type="arabicPeriod"/>
             </a:pPr>
             <a:r>
+              <a:rPr lang="en-US" sz="2000" dirty="0">
+                <a:effectLst/>
+                <a:latin typeface="Times New Roman" panose="02020603050405020304" pitchFamily="18" charset="0"/>
+                <a:ea typeface="SimSun" panose="02010600030101010101" pitchFamily="2" charset="-122"/>
+                <a:cs typeface="Times New Roman" panose="02020603050405020304" pitchFamily="18" charset="0"/>
+              </a:rPr>
+              <a:t>  GetInputFromTextFile( )</a:t>
+            </a:r>
+          </a:p>
+          <a:p>
+            <a:pPr marL="457200" indent="-457200" algn="l">
+              <a:buAutoNum type="arabicPeriod"/>
+            </a:pPr>
+            <a:r>
+              <a:rPr lang="en-US" sz="2000" dirty="0">
+                <a:effectLst/>
+                <a:latin typeface="Times New Roman" panose="02020603050405020304" pitchFamily="18" charset="0"/>
+                <a:ea typeface="SimSun" panose="02010600030101010101" pitchFamily="2" charset="-122"/>
+                <a:cs typeface="Times New Roman" panose="02020603050405020304" pitchFamily="18" charset="0"/>
+              </a:rPr>
+              <a:t>GetInputFromCsvFile( )</a:t>
+            </a:r>
+            <a:endParaRPr lang="en-US" sz="2000" dirty="0">
+              <a:latin typeface="Times New Roman" panose="02020603050405020304" pitchFamily="18" charset="0"/>
+              <a:ea typeface="SimSun" panose="02010600030101010101" pitchFamily="2" charset="-122"/>
+              <a:cs typeface="Times New Roman" panose="02020603050405020304" pitchFamily="18" charset="0"/>
+            </a:endParaRPr>
+          </a:p>
+          <a:p>
+            <a:pPr marL="457200" indent="-457200" algn="l">
+              <a:buAutoNum type="arabicPeriod"/>
+            </a:pPr>
+            <a:r>
+              <a:rPr lang="en-US" sz="2000" dirty="0">
+                <a:effectLst/>
+                <a:latin typeface="Times New Roman" panose="02020603050405020304" pitchFamily="18" charset="0"/>
+                <a:ea typeface="SimSun" panose="02010600030101010101" pitchFamily="2" charset="-122"/>
+                <a:cs typeface="Times New Roman" panose="02020603050405020304" pitchFamily="18" charset="0"/>
+              </a:rPr>
+              <a:t>GetInputFromExcelFile()</a:t>
+            </a:r>
+          </a:p>
+          <a:p>
+            <a:pPr marL="457200" indent="-457200" algn="l">
+              <a:buAutoNum type="arabicPeriod"/>
+            </a:pPr>
+            <a:r>
+              <a:rPr lang="en-US" sz="2000" dirty="0">
+                <a:effectLst/>
+                <a:latin typeface="Times New Roman" panose="02020603050405020304" pitchFamily="18" charset="0"/>
+                <a:ea typeface="SimSun" panose="02010600030101010101" pitchFamily="2" charset="-122"/>
+                <a:cs typeface="Times New Roman" panose="02020603050405020304" pitchFamily="18" charset="0"/>
+              </a:rPr>
+              <a:t>GetSubSequencesInputFromExcelFile( )</a:t>
+            </a:r>
+          </a:p>
+          <a:p>
+            <a:pPr marL="457200" indent="-457200" algn="l">
+              <a:buAutoNum type="arabicPeriod"/>
+            </a:pPr>
+            <a:r>
+              <a:rPr lang="en-US" sz="2000" dirty="0">
+                <a:latin typeface="Times New Roman" panose="02020603050405020304" pitchFamily="18" charset="0"/>
+                <a:ea typeface="SimSun" panose="02010600030101010101" pitchFamily="2" charset="-122"/>
+                <a:cs typeface="Times New Roman" panose="02020603050405020304" pitchFamily="18" charset="0"/>
+              </a:rPr>
+              <a:t>Accuracy Calculation and writing final accuracy in CSV file.</a:t>
+            </a:r>
+          </a:p>
+          <a:p>
+            <a:pPr marL="457200" indent="-457200" algn="l">
+              <a:buAutoNum type="arabicPeriod"/>
+            </a:pPr>
+            <a:r>
+              <a:rPr lang="en-US" sz="2000" dirty="0">
+                <a:effectLst/>
+                <a:latin typeface="Times New Roman" panose="02020603050405020304" pitchFamily="18" charset="0"/>
+                <a:ea typeface="SimSun" panose="02010600030101010101" pitchFamily="2" charset="-122"/>
+                <a:cs typeface="Times New Roman" panose="02020603050405020304" pitchFamily="18" charset="0"/>
+              </a:rPr>
+              <a:t>Encoder Settings updated for min-max valu</a:t>
+            </a:r>
+            <a:r>
+              <a:rPr lang="en-US" sz="2000" dirty="0">
+                <a:latin typeface="Times New Roman" panose="02020603050405020304" pitchFamily="18" charset="0"/>
+                <a:ea typeface="SimSun" panose="02010600030101010101" pitchFamily="2" charset="-122"/>
+                <a:cs typeface="Times New Roman" panose="02020603050405020304" pitchFamily="18" charset="0"/>
+              </a:rPr>
+              <a:t>e in the range of 0-99</a:t>
+            </a:r>
+          </a:p>
+          <a:p>
+            <a:pPr marL="457200" indent="-457200" algn="l">
+              <a:buAutoNum type="arabicPeriod"/>
+            </a:pPr>
+            <a:r>
+              <a:rPr lang="en-US" sz="2000" dirty="0">
+                <a:latin typeface="Times New Roman" panose="02020603050405020304" pitchFamily="18" charset="0"/>
+                <a:ea typeface="SimSun" panose="02010600030101010101" pitchFamily="2" charset="-122"/>
+                <a:cs typeface="Times New Roman" panose="02020603050405020304" pitchFamily="18" charset="0"/>
+              </a:rPr>
+              <a:t>Utilization of relative file path – In which </a:t>
+            </a:r>
+            <a:r>
+              <a:rPr lang="en-US" sz="2000" i="1" dirty="0">
+                <a:effectLst/>
+                <a:latin typeface="Times New Roman" panose="02020603050405020304" pitchFamily="18" charset="0"/>
+                <a:ea typeface="SimSun" panose="02010600030101010101" pitchFamily="2" charset="-122"/>
+                <a:cs typeface="Times New Roman" panose="02020603050405020304" pitchFamily="18" charset="0"/>
+              </a:rPr>
+              <a:t>Environment.CurrentDirectory</a:t>
+            </a:r>
+            <a:r>
+              <a:rPr lang="en-US" sz="2000" dirty="0">
+                <a:effectLst/>
+                <a:latin typeface="Times New Roman" panose="02020603050405020304" pitchFamily="18" charset="0"/>
+                <a:ea typeface="SimSun" panose="02010600030101010101" pitchFamily="2" charset="-122"/>
+                <a:cs typeface="Times New Roman" panose="02020603050405020304" pitchFamily="18" charset="0"/>
+              </a:rPr>
+              <a:t> property of  C#, is used for providing input files to methods mentioned above</a:t>
+            </a:r>
+            <a:r>
               <a:rPr lang="en-US" sz="1800" dirty="0">
                 <a:effectLst/>
                 <a:latin typeface="Times New Roman" panose="02020603050405020304" pitchFamily="18" charset="0"/>
                 <a:ea typeface="SimSun" panose="02010600030101010101" pitchFamily="2" charset="-122"/>
               </a:rPr>
-              <a:t>  GetInputFromTextFile( )</a:t>
-            </a:r>
-          </a:p>
-          <a:p>
-            <a:pPr marL="457200" indent="-457200" algn="l">
-              <a:buAutoNum type="arabicPeriod"/>
-            </a:pPr>
-            <a:r>
-              <a:rPr lang="en-US" sz="1800" dirty="0">
-                <a:effectLst/>
-                <a:latin typeface="Times New Roman" panose="02020603050405020304" pitchFamily="18" charset="0"/>
-                <a:ea typeface="SimSun" panose="02010600030101010101" pitchFamily="2" charset="-122"/>
-              </a:rPr>
-              <a:t>GetInputFromCsvFile( )</a:t>
-            </a:r>
-            <a:endParaRPr lang="en-US" sz="1800" dirty="0">
-              <a:latin typeface="Times New Roman" panose="02020603050405020304" pitchFamily="18" charset="0"/>
-              <a:ea typeface="SimSun" panose="02010600030101010101" pitchFamily="2" charset="-122"/>
-            </a:endParaRPr>
-          </a:p>
-          <a:p>
-            <a:pPr marL="457200" indent="-457200" algn="l">
-              <a:buAutoNum type="arabicPeriod"/>
-            </a:pPr>
-            <a:r>
-              <a:rPr lang="en-US" sz="1800" dirty="0" err="1">
-                <a:effectLst/>
-                <a:latin typeface="Times New Roman" panose="02020603050405020304" pitchFamily="18" charset="0"/>
-                <a:ea typeface="SimSun" panose="02010600030101010101" pitchFamily="2" charset="-122"/>
-              </a:rPr>
-              <a:t>GetInputFromExcelFile</a:t>
-            </a:r>
-            <a:r>
-              <a:rPr lang="en-US" sz="1800" dirty="0">
-                <a:effectLst/>
-                <a:latin typeface="Times New Roman" panose="02020603050405020304" pitchFamily="18" charset="0"/>
-                <a:ea typeface="SimSun" panose="02010600030101010101" pitchFamily="2" charset="-122"/>
-              </a:rPr>
-              <a:t>( )</a:t>
-            </a:r>
-          </a:p>
-          <a:p>
-            <a:pPr marL="457200" indent="-457200" algn="l">
-              <a:buAutoNum type="arabicPeriod"/>
-            </a:pPr>
-            <a:r>
-              <a:rPr lang="en-US" sz="1800" dirty="0">
-                <a:effectLst/>
-                <a:latin typeface="Times New Roman" panose="02020603050405020304" pitchFamily="18" charset="0"/>
-                <a:ea typeface="SimSun" panose="02010600030101010101" pitchFamily="2" charset="-122"/>
-              </a:rPr>
-              <a:t>GetSubSequencesInputFromExcelFile( )</a:t>
-            </a:r>
-          </a:p>
-          <a:p>
-            <a:pPr marL="457200" indent="-457200" algn="l">
-              <a:buAutoNum type="arabicPeriod"/>
-            </a:pPr>
-            <a:r>
-              <a:rPr lang="en-US" sz="1800" dirty="0">
-                <a:latin typeface="Times New Roman" panose="02020603050405020304" pitchFamily="18" charset="0"/>
-                <a:ea typeface="SimSun" panose="02010600030101010101" pitchFamily="2" charset="-122"/>
-              </a:rPr>
-              <a:t>Accuracy Calculation and writing final accuracy in CSV file.</a:t>
-            </a:r>
-          </a:p>
-          <a:p>
-            <a:pPr marL="457200" indent="-457200" algn="l">
-              <a:buAutoNum type="arabicPeriod"/>
-            </a:pPr>
-            <a:r>
-              <a:rPr lang="en-US" sz="1800" dirty="0">
-                <a:effectLst/>
-                <a:latin typeface="Times New Roman" panose="02020603050405020304" pitchFamily="18" charset="0"/>
-                <a:ea typeface="SimSun" panose="02010600030101010101" pitchFamily="2" charset="-122"/>
-              </a:rPr>
-              <a:t>Encoder Settings updated for min-max valu</a:t>
-            </a:r>
-            <a:r>
-              <a:rPr lang="en-US" sz="1800" dirty="0">
-                <a:latin typeface="Times New Roman" panose="02020603050405020304" pitchFamily="18" charset="0"/>
-                <a:ea typeface="SimSun" panose="02010600030101010101" pitchFamily="2" charset="-122"/>
-              </a:rPr>
-              <a:t>e in the range of 0-99</a:t>
-            </a:r>
-          </a:p>
-          <a:p>
-            <a:pPr marL="457200" indent="-457200" algn="l">
-              <a:buAutoNum type="arabicPeriod"/>
-            </a:pPr>
-            <a:r>
-              <a:rPr lang="en-US" sz="1800" dirty="0">
-                <a:latin typeface="Times New Roman" panose="02020603050405020304" pitchFamily="18" charset="0"/>
-                <a:ea typeface="SimSun" panose="02010600030101010101" pitchFamily="2" charset="-122"/>
-              </a:rPr>
-              <a:t>Utilization of relative file path – In which </a:t>
-            </a:r>
-            <a:r>
-              <a:rPr lang="en-US" sz="1800" i="1" dirty="0">
-                <a:effectLst/>
-                <a:latin typeface="Times New Roman" panose="02020603050405020304" pitchFamily="18" charset="0"/>
-                <a:ea typeface="SimSun" panose="02010600030101010101" pitchFamily="2" charset="-122"/>
-              </a:rPr>
-              <a:t>Environment.CurrentDirectory</a:t>
-            </a:r>
-            <a:r>
-              <a:rPr lang="en-US" sz="1800" dirty="0">
-                <a:effectLst/>
-                <a:latin typeface="Times New Roman" panose="02020603050405020304" pitchFamily="18" charset="0"/>
-                <a:ea typeface="SimSun" panose="02010600030101010101" pitchFamily="2" charset="-122"/>
-              </a:rPr>
-              <a:t> property of  C#, is used for providing input files to methods mentioned above.</a:t>
-            </a:r>
-            <a:endParaRPr lang="en-US" sz="1800" dirty="0">
-              <a:latin typeface="Times New Roman" panose="02020603050405020304" pitchFamily="18" charset="0"/>
-              <a:ea typeface="SimSun" panose="02010600030101010101" pitchFamily="2" charset="-122"/>
-            </a:endParaRPr>
-          </a:p>
-          <a:p>
-            <a:pPr marL="457200" indent="-457200" algn="l">
-              <a:buAutoNum type="arabicPeriod"/>
-            </a:pPr>
-            <a:endParaRPr lang="en-US" sz="1800" dirty="0">
-              <a:effectLst/>
-              <a:latin typeface="Times New Roman" panose="02020603050405020304" pitchFamily="18" charset="0"/>
-              <a:ea typeface="SimSun" panose="02010600030101010101" pitchFamily="2" charset="-122"/>
-            </a:endParaRPr>
+              <a:t>.</a:t>
+            </a:r>
           </a:p>
           <a:p>
             <a:pPr marL="457200" indent="-457200" algn="l">
@@ -5235,16 +5705,25 @@
             <p:ph type="title"/>
           </p:nvPr>
         </p:nvSpPr>
-        <p:spPr/>
+        <p:spPr>
+          <a:xfrm>
+            <a:off x="838200" y="365125"/>
+            <a:ext cx="10515600" cy="1013509"/>
+          </a:xfrm>
+        </p:spPr>
         <p:txBody>
           <a:bodyPr>
             <a:normAutofit/>
           </a:bodyPr>
           <a:lstStyle/>
           <a:p>
-            <a:r>
-              <a:rPr lang="en-US" sz="3200" dirty="0"/>
-              <a:t>Flow chart of Implementation:</a:t>
+            <a:pPr algn="ctr"/>
+            <a:r>
+              <a:rPr lang="en-US" sz="3200" dirty="0">
+                <a:latin typeface="Times New Roman" panose="02020603050405020304" pitchFamily="18" charset="0"/>
+                <a:cs typeface="Times New Roman" panose="02020603050405020304" pitchFamily="18" charset="0"/>
+              </a:rPr>
+              <a:t>Flow chart of Implementation</a:t>
             </a:r>
           </a:p>
         </p:txBody>
@@ -5279,8 +5758,8 @@
         </p:blipFill>
         <p:spPr>
           <a:xfrm>
-            <a:off x="4698610" y="1507508"/>
-            <a:ext cx="2516910" cy="4891354"/>
+            <a:off x="4628271" y="1378634"/>
+            <a:ext cx="2686929" cy="5359348"/>
           </a:xfrm>
         </p:spPr>
       </p:pic>
@@ -5337,7 +5816,9 @@
           </a:xfrm>
         </p:spPr>
         <p:txBody>
-          <a:bodyPr/>
+          <a:bodyPr>
+            <a:normAutofit/>
+          </a:bodyPr>
           <a:lstStyle/>
           <a:p>
             <a:pPr marL="0" marR="0" indent="0" algn="just">
@@ -5350,7 +5831,7 @@
               <a:buNone/>
             </a:pPr>
             <a:r>
-              <a:rPr lang="en-US" sz="1800" dirty="0">
+              <a:rPr lang="en-US" sz="2000" dirty="0">
                 <a:effectLst/>
                 <a:latin typeface="Times New Roman" panose="02020603050405020304" pitchFamily="18" charset="0"/>
                 <a:ea typeface="SimSun" panose="02010600030101010101" pitchFamily="2" charset="-122"/>
@@ -5368,7 +5849,7 @@
               </a:spcAft>
               <a:buNone/>
             </a:pPr>
-            <a:endParaRPr lang="en-US" sz="1800" dirty="0">
+            <a:endParaRPr lang="en-US" sz="2000" dirty="0">
               <a:latin typeface="Times New Roman" panose="02020603050405020304" pitchFamily="18" charset="0"/>
               <a:ea typeface="SimSun" panose="02010600030101010101" pitchFamily="2" charset="-122"/>
             </a:endParaRPr>
@@ -5381,7 +5862,7 @@
               <a:buAutoNum type="arabicPeriod"/>
             </a:pPr>
             <a:r>
-              <a:rPr lang="en-US" sz="1800" dirty="0">
+              <a:rPr lang="en-US" sz="2000" dirty="0">
                 <a:effectLst/>
                 <a:latin typeface="Times New Roman" panose="02020603050405020304" pitchFamily="18" charset="0"/>
                 <a:ea typeface="SimSun" panose="02010600030101010101" pitchFamily="2" charset="-122"/>
@@ -5389,14 +5870,14 @@
               <a:t>Result of training phase</a:t>
             </a:r>
             <a:r>
-              <a:rPr lang="en-IN" sz="1800" dirty="0">
+              <a:rPr lang="en-IN" sz="2000" dirty="0">
                 <a:effectLst/>
                 <a:latin typeface="Times New Roman" panose="02020603050405020304" pitchFamily="18" charset="0"/>
                 <a:ea typeface="SimSun" panose="02010600030101010101" pitchFamily="2" charset="-122"/>
               </a:rPr>
               <a:t>:</a:t>
             </a:r>
-            <a:endParaRPr lang="en-US" sz="1800" dirty="0">
+            <a:endParaRPr lang="en-US" sz="2000" dirty="0">
               <a:effectLst/>
               <a:latin typeface="Times New Roman" panose="02020603050405020304" pitchFamily="18" charset="0"/>
               <a:ea typeface="SimSun" panose="02010600030101010101" pitchFamily="2" charset="-122"/>
@@ -5420,7 +5901,7 @@
         </p:nvSpPr>
         <p:spPr>
           <a:xfrm>
-            <a:off x="701755" y="451583"/>
+            <a:off x="3173601" y="514619"/>
             <a:ext cx="5571907" cy="809074"/>
           </a:xfrm>
           <a:prstGeom prst="rect">
@@ -5451,8 +5932,12 @@
             </a:lvl1pPr>
           </a:lstStyle>
           <a:p>
-            <a:r>
-              <a:rPr lang="en-IN" dirty="0"/>
+            <a:pPr algn="ctr"/>
+            <a:r>
+              <a:rPr lang="en-IN" sz="3600" dirty="0">
+                <a:latin typeface="Times New Roman" panose="02020603050405020304" pitchFamily="18" charset="0"/>
+                <a:cs typeface="Times New Roman" panose="02020603050405020304" pitchFamily="18" charset="0"/>
+              </a:rPr>
               <a:t>Results</a:t>
             </a:r>
           </a:p>
@@ -5509,7 +5994,7 @@
         <p:spPr>
           <a:xfrm>
             <a:off x="5282967" y="2307101"/>
-            <a:ext cx="4768948" cy="3139321"/>
+            <a:ext cx="4768948" cy="3724096"/>
           </a:xfrm>
           <a:prstGeom prst="rect">
             <a:avLst/>
@@ -5528,7 +6013,7 @@
               </a:spcBef>
             </a:pPr>
             <a:r>
-              <a:rPr lang="en-US" sz="1800" spc="-5" dirty="0">
+              <a:rPr lang="en-US" sz="2000" spc="-5" dirty="0">
                 <a:effectLst/>
                 <a:latin typeface="Times New Roman" panose="02020603050405020304" pitchFamily="18" charset="0"/>
                 <a:ea typeface="SimSun" panose="02010600030101010101" pitchFamily="2" charset="-122"/>
@@ -5542,7 +6027,7 @@
                 <a:spcPts val="0"/>
               </a:spcBef>
             </a:pPr>
-            <a:endParaRPr lang="en-US" spc="-5" dirty="0">
+            <a:endParaRPr lang="en-US" sz="2000" spc="-5" dirty="0">
               <a:latin typeface="Times New Roman" panose="02020603050405020304" pitchFamily="18" charset="0"/>
               <a:ea typeface="SimSun" panose="02010600030101010101" pitchFamily="2" charset="-122"/>
             </a:endParaRPr>
@@ -5554,7 +6039,7 @@
               </a:spcBef>
             </a:pPr>
             <a:r>
-              <a:rPr lang="en-US" sz="1800" spc="-5" dirty="0">
+              <a:rPr lang="en-US" sz="2000" spc="-5" dirty="0">
                 <a:effectLst/>
                 <a:latin typeface="Times New Roman" panose="02020603050405020304" pitchFamily="18" charset="0"/>
                 <a:ea typeface="SimSun" panose="02010600030101010101" pitchFamily="2" charset="-122"/>
@@ -5609,7 +6094,10 @@
           <a:lstStyle/>
           <a:p>
             <a:r>
-              <a:rPr lang="en-US" dirty="0"/>
+              <a:rPr lang="en-US" dirty="0">
+                <a:latin typeface="Times New Roman" panose="02020603050405020304" pitchFamily="18" charset="0"/>
+                <a:cs typeface="Times New Roman" panose="02020603050405020304" pitchFamily="18" charset="0"/>
+              </a:rPr>
               <a:t>figure 1.1. Training Phase</a:t>
             </a:r>
           </a:p>
@@ -5663,13 +6151,26 @@
         </p:nvSpPr>
         <p:spPr>
           <a:xfrm>
-            <a:off x="701755" y="1187355"/>
-            <a:ext cx="10515600" cy="4849789"/>
+            <a:off x="701755" y="1052971"/>
+            <a:ext cx="10515600" cy="4984173"/>
           </a:xfrm>
         </p:spPr>
         <p:txBody>
           <a:bodyPr/>
           <a:lstStyle/>
+          <a:p>
+            <a:pPr marL="0" indent="0" algn="just">
+              <a:spcBef>
+                <a:spcPts val="0"/>
+              </a:spcBef>
+              <a:buNone/>
+            </a:pPr>
+            <a:endParaRPr lang="en-US" sz="1800" dirty="0">
+              <a:effectLst/>
+              <a:latin typeface="Times New Roman" panose="02020603050405020304" pitchFamily="18" charset="0"/>
+              <a:ea typeface="SimSun" panose="02010600030101010101" pitchFamily="2" charset="-122"/>
+            </a:endParaRPr>
+          </a:p>
           <a:p>
             <a:pPr marL="0" indent="0" algn="just">
               <a:spcBef>
@@ -5779,8 +6280,8 @@
         </p:nvSpPr>
         <p:spPr>
           <a:xfrm>
-            <a:off x="701755" y="378281"/>
-            <a:ext cx="5571907" cy="809074"/>
+            <a:off x="3310046" y="333352"/>
+            <a:ext cx="5571907" cy="513651"/>
           </a:xfrm>
           <a:prstGeom prst="rect">
             <a:avLst/>
@@ -5788,7 +6289,7 @@
         </p:spPr>
         <p:txBody>
           <a:bodyPr vert="horz" lIns="91440" tIns="45720" rIns="91440" bIns="45720" rtlCol="0" anchor="ctr">
-            <a:normAutofit fontScale="97500"/>
+            <a:normAutofit fontScale="82500" lnSpcReduction="20000"/>
           </a:bodyPr>
           <a:lstStyle>
             <a:lvl1pPr algn="l" defTabSz="914400" rtl="0" eaLnBrk="1" latinLnBrk="0" hangingPunct="1">
@@ -5810,8 +6311,12 @@
             </a:lvl1pPr>
           </a:lstStyle>
           <a:p>
-            <a:r>
-              <a:rPr lang="en-IN" dirty="0"/>
+            <a:pPr algn="ctr"/>
+            <a:r>
+              <a:rPr lang="en-IN" dirty="0">
+                <a:latin typeface="Times New Roman" panose="02020603050405020304" pitchFamily="18" charset="0"/>
+                <a:cs typeface="Times New Roman" panose="02020603050405020304" pitchFamily="18" charset="0"/>
+              </a:rPr>
               <a:t>Results</a:t>
             </a:r>
           </a:p>
@@ -5903,7 +6408,7 @@
         </p:nvSpPr>
         <p:spPr>
           <a:xfrm>
-            <a:off x="3783180" y="3854653"/>
+            <a:off x="3898638" y="3860071"/>
             <a:ext cx="4121834" cy="369332"/>
           </a:xfrm>
           <a:prstGeom prst="rect">
@@ -5917,8 +6422,12 @@
           </a:bodyPr>
           <a:lstStyle/>
           <a:p>
-            <a:r>
-              <a:rPr lang="en-US" dirty="0"/>
+            <a:pPr algn="ctr"/>
+            <a:r>
+              <a:rPr lang="en-US" dirty="0">
+                <a:latin typeface="Times New Roman" panose="02020603050405020304" pitchFamily="18" charset="0"/>
+                <a:cs typeface="Times New Roman" panose="02020603050405020304" pitchFamily="18" charset="0"/>
+              </a:rPr>
               <a:t>Figure 1.2. Match Detection</a:t>
             </a:r>
           </a:p>
@@ -5938,7 +6447,7 @@
         </p:nvSpPr>
         <p:spPr>
           <a:xfrm>
-            <a:off x="3783180" y="5584218"/>
+            <a:off x="4035082" y="5594330"/>
             <a:ext cx="4121834" cy="369332"/>
           </a:xfrm>
           <a:prstGeom prst="rect">
@@ -5952,8 +6461,12 @@
           </a:bodyPr>
           <a:lstStyle/>
           <a:p>
-            <a:r>
-              <a:rPr lang="en-US" dirty="0"/>
+            <a:pPr algn="ctr"/>
+            <a:r>
+              <a:rPr lang="en-US" dirty="0">
+                <a:latin typeface="Times New Roman" panose="02020603050405020304" pitchFamily="18" charset="0"/>
+                <a:cs typeface="Times New Roman" panose="02020603050405020304" pitchFamily="18" charset="0"/>
+              </a:rPr>
               <a:t>Figure 1.3. Mismatch Detection</a:t>
             </a:r>
           </a:p>

</xml_diff>